<commit_message>
updates to week 14 SDA
</commit_message>
<xml_diff>
--- a/static/files/SDA/week13/lecture_week_13.pptx
+++ b/static/files/SDA/week13/lecture_week_13.pptx
@@ -5,7 +5,7 @@
     <p:sldMasterId id="2147483648" r:id="rId1"/>
   </p:sldMasterIdLst>
   <p:notesMasterIdLst>
-    <p:notesMasterId r:id="rId40"/>
+    <p:notesMasterId r:id="rId41"/>
   </p:notesMasterIdLst>
   <p:sldIdLst>
     <p:sldId id="256" r:id="rId2"/>
@@ -36,16 +36,17 @@
     <p:sldId id="429" r:id="rId27"/>
     <p:sldId id="430" r:id="rId28"/>
     <p:sldId id="431" r:id="rId29"/>
-    <p:sldId id="437" r:id="rId30"/>
-    <p:sldId id="414" r:id="rId31"/>
-    <p:sldId id="424" r:id="rId32"/>
-    <p:sldId id="433" r:id="rId33"/>
-    <p:sldId id="434" r:id="rId34"/>
-    <p:sldId id="435" r:id="rId35"/>
-    <p:sldId id="432" r:id="rId36"/>
-    <p:sldId id="425" r:id="rId37"/>
-    <p:sldId id="315" r:id="rId38"/>
-    <p:sldId id="436" r:id="rId39"/>
+    <p:sldId id="449" r:id="rId30"/>
+    <p:sldId id="437" r:id="rId31"/>
+    <p:sldId id="414" r:id="rId32"/>
+    <p:sldId id="424" r:id="rId33"/>
+    <p:sldId id="433" r:id="rId34"/>
+    <p:sldId id="434" r:id="rId35"/>
+    <p:sldId id="435" r:id="rId36"/>
+    <p:sldId id="432" r:id="rId37"/>
+    <p:sldId id="425" r:id="rId38"/>
+    <p:sldId id="315" r:id="rId39"/>
+    <p:sldId id="436" r:id="rId40"/>
   </p:sldIdLst>
   <p:sldSz cx="9144000" cy="6858000" type="screen4x3"/>
   <p:notesSz cx="7099300" cy="10234613"/>
@@ -245,7 +246,7 @@
           <a:p>
             <a:fld id="{8FEAE804-2177-420F-80EC-8435C849749E}" type="datetimeFigureOut">
               <a:rPr lang="nl-NL" smtClean="0"/>
-              <a:t>24-11-2022</a:t>
+              <a:t>28-11-2022</a:t>
             </a:fld>
             <a:endParaRPr lang="nl-NL"/>
           </a:p>
@@ -951,7 +952,7 @@
           <a:p>
             <a:fld id="{BE4419BF-0988-5041-849D-CCAE4562448A}" type="datetime1">
               <a:rPr lang="nl-NL" smtClean="0"/>
-              <a:t>24-11-2022</a:t>
+              <a:t>28-11-2022</a:t>
             </a:fld>
             <a:endParaRPr lang="nl-NL"/>
           </a:p>
@@ -1121,7 +1122,7 @@
           <a:p>
             <a:fld id="{AABA79A9-1707-F749-AFAB-D3AE0F0A7000}" type="datetime1">
               <a:rPr lang="nl-NL" smtClean="0"/>
-              <a:t>24-11-2022</a:t>
+              <a:t>28-11-2022</a:t>
             </a:fld>
             <a:endParaRPr lang="nl-NL"/>
           </a:p>
@@ -1301,7 +1302,7 @@
           <a:p>
             <a:fld id="{68AD5175-163A-714F-BE3A-A8BABE7278DB}" type="datetime1">
               <a:rPr lang="nl-NL" smtClean="0"/>
-              <a:t>24-11-2022</a:t>
+              <a:t>28-11-2022</a:t>
             </a:fld>
             <a:endParaRPr lang="nl-NL"/>
           </a:p>
@@ -1471,7 +1472,7 @@
           <a:p>
             <a:fld id="{E119E6F7-B48E-3F4C-9246-DCD48679BCAC}" type="datetime1">
               <a:rPr lang="nl-NL" smtClean="0"/>
-              <a:t>24-11-2022</a:t>
+              <a:t>28-11-2022</a:t>
             </a:fld>
             <a:endParaRPr lang="nl-NL"/>
           </a:p>
@@ -1717,7 +1718,7 @@
           <a:p>
             <a:fld id="{A7A3B712-CD7A-CF48-BFDA-15B328A9FB74}" type="datetime1">
               <a:rPr lang="nl-NL" smtClean="0"/>
-              <a:t>24-11-2022</a:t>
+              <a:t>28-11-2022</a:t>
             </a:fld>
             <a:endParaRPr lang="nl-NL"/>
           </a:p>
@@ -2005,7 +2006,7 @@
           <a:p>
             <a:fld id="{B8C83DA2-6A21-F34C-899C-E311570C4F1D}" type="datetime1">
               <a:rPr lang="nl-NL" smtClean="0"/>
-              <a:t>24-11-2022</a:t>
+              <a:t>28-11-2022</a:t>
             </a:fld>
             <a:endParaRPr lang="nl-NL"/>
           </a:p>
@@ -2427,7 +2428,7 @@
           <a:p>
             <a:fld id="{CC82CAC4-B0F0-F54C-BD8A-CFD62BBF3270}" type="datetime1">
               <a:rPr lang="nl-NL" smtClean="0"/>
-              <a:t>24-11-2022</a:t>
+              <a:t>28-11-2022</a:t>
             </a:fld>
             <a:endParaRPr lang="nl-NL"/>
           </a:p>
@@ -2545,7 +2546,7 @@
           <a:p>
             <a:fld id="{9269ECA5-48E4-B14A-9087-9AA13C407AC2}" type="datetime1">
               <a:rPr lang="nl-NL" smtClean="0"/>
-              <a:t>24-11-2022</a:t>
+              <a:t>28-11-2022</a:t>
             </a:fld>
             <a:endParaRPr lang="nl-NL"/>
           </a:p>
@@ -2640,7 +2641,7 @@
           <a:p>
             <a:fld id="{042BD14D-CE85-174E-A898-5C8A393C8915}" type="datetime1">
               <a:rPr lang="nl-NL" smtClean="0"/>
-              <a:t>24-11-2022</a:t>
+              <a:t>28-11-2022</a:t>
             </a:fld>
             <a:endParaRPr lang="nl-NL"/>
           </a:p>
@@ -2917,7 +2918,7 @@
           <a:p>
             <a:fld id="{8F6C17A1-BF10-7A4E-A106-B6F3AE2E53AB}" type="datetime1">
               <a:rPr lang="nl-NL" smtClean="0"/>
-              <a:t>24-11-2022</a:t>
+              <a:t>28-11-2022</a:t>
             </a:fld>
             <a:endParaRPr lang="nl-NL"/>
           </a:p>
@@ -3170,7 +3171,7 @@
           <a:p>
             <a:fld id="{29B36605-E9D1-4645-A7FD-0E06E51E3836}" type="datetime1">
               <a:rPr lang="nl-NL" smtClean="0"/>
-              <a:t>24-11-2022</a:t>
+              <a:t>28-11-2022</a:t>
             </a:fld>
             <a:endParaRPr lang="nl-NL"/>
           </a:p>
@@ -3383,7 +3384,7 @@
           <a:p>
             <a:fld id="{46338401-6E79-A845-AEE2-42D22570613F}" type="datetime1">
               <a:rPr lang="nl-NL" smtClean="0"/>
-              <a:t>24-11-2022</a:t>
+              <a:t>28-11-2022</a:t>
             </a:fld>
             <a:endParaRPr lang="nl-NL"/>
           </a:p>
@@ -7912,6 +7913,46 @@
           <a:p>
             <a:r>
               <a:rPr lang="nl-NL" dirty="0" err="1"/>
+              <a:t>Questions</a:t>
+            </a:r>
+            <a:r>
+              <a:rPr lang="nl-NL" dirty="0"/>
+              <a:t> </a:t>
+            </a:r>
+            <a:r>
+              <a:rPr lang="nl-NL" dirty="0" err="1"/>
+              <a:t>about</a:t>
+            </a:r>
+            <a:r>
+              <a:rPr lang="nl-NL" dirty="0"/>
+              <a:t> </a:t>
+            </a:r>
+            <a:r>
+              <a:rPr lang="nl-NL" dirty="0" err="1"/>
+              <a:t>assignment</a:t>
+            </a:r>
+            <a:r>
+              <a:rPr lang="nl-NL" dirty="0"/>
+              <a:t> 2</a:t>
+            </a:r>
+          </a:p>
+          <a:p>
+            <a:r>
+              <a:rPr lang="nl-NL" dirty="0"/>
+              <a:t>Group </a:t>
+            </a:r>
+            <a:r>
+              <a:rPr lang="nl-NL" dirty="0" err="1"/>
+              <a:t>assignment</a:t>
+            </a:r>
+            <a:endParaRPr lang="nl-NL" dirty="0"/>
+          </a:p>
+          <a:p>
+            <a:endParaRPr lang="nl-NL" dirty="0"/>
+          </a:p>
+          <a:p>
+            <a:r>
+              <a:rPr lang="nl-NL" dirty="0" err="1"/>
               <a:t>Lecture</a:t>
             </a:r>
             <a:r>
@@ -17750,6 +17791,635 @@
       </p:grpSpPr>
       <p:sp>
         <p:nvSpPr>
+          <p:cNvPr id="2" name="Title 1">
+            <a:extLst>
+              <a:ext uri="{FF2B5EF4-FFF2-40B4-BE49-F238E27FC236}">
+                <a16:creationId xmlns:a16="http://schemas.microsoft.com/office/drawing/2014/main" id="{8112107D-AE7F-4719-BFBE-14C47FB92043}"/>
+              </a:ext>
+            </a:extLst>
+          </p:cNvPr>
+          <p:cNvSpPr>
+            <a:spLocks noGrp="1"/>
+          </p:cNvSpPr>
+          <p:nvPr>
+            <p:ph type="title"/>
+          </p:nvPr>
+        </p:nvSpPr>
+        <p:spPr/>
+        <p:txBody>
+          <a:bodyPr/>
+          <a:lstStyle/>
+          <a:p>
+            <a:r>
+              <a:rPr lang="en-US" dirty="0"/>
+              <a:t>2.1 traditional calibration</a:t>
+            </a:r>
+            <a:endParaRPr lang="nl-NL" dirty="0"/>
+          </a:p>
+        </p:txBody>
+      </p:sp>
+      <p:sp>
+        <p:nvSpPr>
+          <p:cNvPr id="3" name="Content Placeholder 2">
+            <a:extLst>
+              <a:ext uri="{FF2B5EF4-FFF2-40B4-BE49-F238E27FC236}">
+                <a16:creationId xmlns:a16="http://schemas.microsoft.com/office/drawing/2014/main" id="{F1A4D308-67AD-4DD3-9FFB-3FB9F951820D}"/>
+              </a:ext>
+            </a:extLst>
+          </p:cNvPr>
+          <p:cNvSpPr>
+            <a:spLocks noGrp="1"/>
+          </p:cNvSpPr>
+          <p:nvPr>
+            <p:ph idx="1"/>
+          </p:nvPr>
+        </p:nvSpPr>
+        <p:spPr/>
+        <p:txBody>
+          <a:bodyPr/>
+          <a:lstStyle/>
+          <a:p>
+            <a:r>
+              <a:rPr lang="en-US" dirty="0"/>
+              <a:t>Ask potential X variables in non-prob survey</a:t>
+            </a:r>
+          </a:p>
+          <a:p>
+            <a:r>
+              <a:rPr lang="en-US" dirty="0"/>
+              <a:t>Weight to population characteristics</a:t>
+            </a:r>
+          </a:p>
+          <a:p>
+            <a:pPr lvl="1"/>
+            <a:r>
+              <a:rPr lang="en-US" dirty="0"/>
+              <a:t>Every cell of cross-table: calibration</a:t>
+            </a:r>
+          </a:p>
+          <a:p>
+            <a:pPr lvl="1"/>
+            <a:r>
+              <a:rPr lang="en-US" dirty="0"/>
+              <a:t>Margins of cross-table: raking</a:t>
+            </a:r>
+          </a:p>
+          <a:p>
+            <a:pPr>
+              <a:buFontTx/>
+              <a:buChar char="-"/>
+            </a:pPr>
+            <a:r>
+              <a:rPr lang="nl-NL" dirty="0" err="1"/>
+              <a:t>Problem</a:t>
+            </a:r>
+            <a:r>
+              <a:rPr lang="nl-NL" dirty="0"/>
+              <a:t>:</a:t>
+            </a:r>
+          </a:p>
+          <a:p>
+            <a:pPr lvl="1">
+              <a:buFontTx/>
+              <a:buChar char="-"/>
+            </a:pPr>
+            <a:r>
+              <a:rPr lang="nl-NL" dirty="0" err="1">
+                <a:solidFill>
+                  <a:srgbClr val="FF0000"/>
+                </a:solidFill>
+              </a:rPr>
+              <a:t>Lack</a:t>
+            </a:r>
+            <a:r>
+              <a:rPr lang="nl-NL" dirty="0">
+                <a:solidFill>
+                  <a:srgbClr val="FF0000"/>
+                </a:solidFill>
+              </a:rPr>
+              <a:t> of X variables</a:t>
+            </a:r>
+          </a:p>
+          <a:p>
+            <a:pPr lvl="1">
+              <a:buFontTx/>
+              <a:buChar char="-"/>
+            </a:pPr>
+            <a:r>
+              <a:rPr lang="nl-NL" dirty="0">
+                <a:solidFill>
+                  <a:srgbClr val="FF0000"/>
+                </a:solidFill>
+              </a:rPr>
+              <a:t>Small se., but </a:t>
+            </a:r>
+            <a:r>
+              <a:rPr lang="nl-NL" dirty="0" err="1">
+                <a:solidFill>
+                  <a:srgbClr val="FF0000"/>
+                </a:solidFill>
+              </a:rPr>
+              <a:t>still</a:t>
+            </a:r>
+            <a:r>
+              <a:rPr lang="nl-NL" dirty="0">
+                <a:solidFill>
+                  <a:srgbClr val="FF0000"/>
+                </a:solidFill>
+              </a:rPr>
+              <a:t> bias</a:t>
+            </a:r>
+          </a:p>
+          <a:p>
+            <a:pPr lvl="1">
+              <a:buFontTx/>
+              <a:buChar char="-"/>
+            </a:pPr>
+            <a:r>
+              <a:rPr lang="nl-NL" dirty="0" err="1">
+                <a:solidFill>
+                  <a:srgbClr val="92D050"/>
+                </a:solidFill>
+              </a:rPr>
+              <a:t>Use</a:t>
+            </a:r>
+            <a:r>
+              <a:rPr lang="nl-NL" dirty="0">
+                <a:solidFill>
+                  <a:srgbClr val="92D050"/>
+                </a:solidFill>
+              </a:rPr>
+              <a:t> </a:t>
+            </a:r>
+            <a:r>
+              <a:rPr lang="nl-NL" dirty="0" err="1">
+                <a:solidFill>
+                  <a:srgbClr val="92D050"/>
+                </a:solidFill>
+              </a:rPr>
+              <a:t>same</a:t>
+            </a:r>
+            <a:r>
+              <a:rPr lang="nl-NL" dirty="0">
+                <a:solidFill>
+                  <a:srgbClr val="92D050"/>
+                </a:solidFill>
+              </a:rPr>
+              <a:t> NR </a:t>
+            </a:r>
+            <a:r>
+              <a:rPr lang="nl-NL" dirty="0" err="1">
+                <a:solidFill>
+                  <a:srgbClr val="92D050"/>
+                </a:solidFill>
+              </a:rPr>
+              <a:t>methods</a:t>
+            </a:r>
+            <a:r>
+              <a:rPr lang="nl-NL" dirty="0">
+                <a:solidFill>
+                  <a:srgbClr val="92D050"/>
+                </a:solidFill>
+              </a:rPr>
+              <a:t> as </a:t>
+            </a:r>
+            <a:r>
+              <a:rPr lang="nl-NL" dirty="0" err="1">
+                <a:solidFill>
+                  <a:srgbClr val="92D050"/>
+                </a:solidFill>
+              </a:rPr>
+              <a:t>earlier</a:t>
+            </a:r>
+            <a:r>
+              <a:rPr lang="nl-NL" dirty="0">
+                <a:solidFill>
+                  <a:srgbClr val="92D050"/>
+                </a:solidFill>
+              </a:rPr>
+              <a:t> in course</a:t>
+            </a:r>
+          </a:p>
+          <a:p>
+            <a:pPr marL="457200" lvl="1" indent="0">
+              <a:buNone/>
+            </a:pPr>
+            <a:endParaRPr lang="en-US" dirty="0">
+              <a:solidFill>
+                <a:srgbClr val="FF0000"/>
+              </a:solidFill>
+            </a:endParaRPr>
+          </a:p>
+        </p:txBody>
+      </p:sp>
+      <p:sp>
+        <p:nvSpPr>
+          <p:cNvPr id="4" name="Slide Number Placeholder 3">
+            <a:extLst>
+              <a:ext uri="{FF2B5EF4-FFF2-40B4-BE49-F238E27FC236}">
+                <a16:creationId xmlns:a16="http://schemas.microsoft.com/office/drawing/2014/main" id="{2073E3AA-EFF2-4C2A-9409-B5364B2D5ED3}"/>
+              </a:ext>
+            </a:extLst>
+          </p:cNvPr>
+          <p:cNvSpPr>
+            <a:spLocks noGrp="1"/>
+          </p:cNvSpPr>
+          <p:nvPr>
+            <p:ph type="sldNum" sz="quarter" idx="12"/>
+          </p:nvPr>
+        </p:nvSpPr>
+        <p:spPr/>
+        <p:txBody>
+          <a:bodyPr/>
+          <a:lstStyle/>
+          <a:p>
+            <a:fld id="{DBA3E7B4-B031-428C-A875-F1315D524DB8}" type="slidenum">
+              <a:rPr lang="nl-NL" smtClean="0"/>
+              <a:t>29</a:t>
+            </a:fld>
+            <a:endParaRPr lang="nl-NL"/>
+          </a:p>
+        </p:txBody>
+      </p:sp>
+    </p:spTree>
+    <p:extLst>
+      <p:ext uri="{BB962C8B-B14F-4D97-AF65-F5344CB8AC3E}">
+        <p14:creationId xmlns:p14="http://schemas.microsoft.com/office/powerpoint/2010/main" val="2584283834"/>
+      </p:ext>
+    </p:extLst>
+  </p:cSld>
+  <p:clrMapOvr>
+    <a:masterClrMapping/>
+  </p:clrMapOvr>
+  <p:timing>
+    <p:tnLst>
+      <p:par>
+        <p:cTn id="1" dur="indefinite" restart="never" nodeType="tmRoot">
+          <p:childTnLst>
+            <p:seq concurrent="1" nextAc="seek">
+              <p:cTn id="2" dur="indefinite" nodeType="mainSeq">
+                <p:childTnLst>
+                  <p:par>
+                    <p:cTn id="3" fill="hold">
+                      <p:stCondLst>
+                        <p:cond delay="indefinite"/>
+                      </p:stCondLst>
+                      <p:childTnLst>
+                        <p:par>
+                          <p:cTn id="4" fill="hold">
+                            <p:stCondLst>
+                              <p:cond delay="0"/>
+                            </p:stCondLst>
+                            <p:childTnLst>
+                              <p:par>
+                                <p:cTn id="5" presetID="1" presetClass="entr" presetSubtype="0" fill="hold" nodeType="clickEffect">
+                                  <p:stCondLst>
+                                    <p:cond delay="0"/>
+                                  </p:stCondLst>
+                                  <p:childTnLst>
+                                    <p:set>
+                                      <p:cBhvr>
+                                        <p:cTn id="6" dur="1" fill="hold">
+                                          <p:stCondLst>
+                                            <p:cond delay="0"/>
+                                          </p:stCondLst>
+                                        </p:cTn>
+                                        <p:tgtEl>
+                                          <p:spTgt spid="3">
+                                            <p:txEl>
+                                              <p:pRg st="4" end="4"/>
+                                            </p:txEl>
+                                          </p:spTgt>
+                                        </p:tgtEl>
+                                        <p:attrNameLst>
+                                          <p:attrName>style.visibility</p:attrName>
+                                        </p:attrNameLst>
+                                      </p:cBhvr>
+                                      <p:to>
+                                        <p:strVal val="visible"/>
+                                      </p:to>
+                                    </p:set>
+                                  </p:childTnLst>
+                                </p:cTn>
+                              </p:par>
+                              <p:par>
+                                <p:cTn id="7" presetID="1" presetClass="entr" presetSubtype="0" fill="hold" nodeType="withEffect">
+                                  <p:stCondLst>
+                                    <p:cond delay="0"/>
+                                  </p:stCondLst>
+                                  <p:childTnLst>
+                                    <p:set>
+                                      <p:cBhvr>
+                                        <p:cTn id="8" dur="1" fill="hold">
+                                          <p:stCondLst>
+                                            <p:cond delay="0"/>
+                                          </p:stCondLst>
+                                        </p:cTn>
+                                        <p:tgtEl>
+                                          <p:spTgt spid="3">
+                                            <p:txEl>
+                                              <p:pRg st="5" end="5"/>
+                                            </p:txEl>
+                                          </p:spTgt>
+                                        </p:tgtEl>
+                                        <p:attrNameLst>
+                                          <p:attrName>style.visibility</p:attrName>
+                                        </p:attrNameLst>
+                                      </p:cBhvr>
+                                      <p:to>
+                                        <p:strVal val="visible"/>
+                                      </p:to>
+                                    </p:set>
+                                  </p:childTnLst>
+                                </p:cTn>
+                              </p:par>
+                              <p:par>
+                                <p:cTn id="9" presetID="1" presetClass="entr" presetSubtype="0" fill="hold" nodeType="withEffect">
+                                  <p:stCondLst>
+                                    <p:cond delay="0"/>
+                                  </p:stCondLst>
+                                  <p:childTnLst>
+                                    <p:set>
+                                      <p:cBhvr>
+                                        <p:cTn id="10" dur="1" fill="hold">
+                                          <p:stCondLst>
+                                            <p:cond delay="0"/>
+                                          </p:stCondLst>
+                                        </p:cTn>
+                                        <p:tgtEl>
+                                          <p:spTgt spid="3">
+                                            <p:txEl>
+                                              <p:pRg st="6" end="6"/>
+                                            </p:txEl>
+                                          </p:spTgt>
+                                        </p:tgtEl>
+                                        <p:attrNameLst>
+                                          <p:attrName>style.visibility</p:attrName>
+                                        </p:attrNameLst>
+                                      </p:cBhvr>
+                                      <p:to>
+                                        <p:strVal val="visible"/>
+                                      </p:to>
+                                    </p:set>
+                                  </p:childTnLst>
+                                </p:cTn>
+                              </p:par>
+                              <p:par>
+                                <p:cTn id="11" presetID="1" presetClass="entr" presetSubtype="0" fill="hold" nodeType="withEffect">
+                                  <p:stCondLst>
+                                    <p:cond delay="0"/>
+                                  </p:stCondLst>
+                                  <p:childTnLst>
+                                    <p:set>
+                                      <p:cBhvr>
+                                        <p:cTn id="12" dur="1" fill="hold">
+                                          <p:stCondLst>
+                                            <p:cond delay="0"/>
+                                          </p:stCondLst>
+                                        </p:cTn>
+                                        <p:tgtEl>
+                                          <p:spTgt spid="3">
+                                            <p:txEl>
+                                              <p:pRg st="7" end="7"/>
+                                            </p:txEl>
+                                          </p:spTgt>
+                                        </p:tgtEl>
+                                        <p:attrNameLst>
+                                          <p:attrName>style.visibility</p:attrName>
+                                        </p:attrNameLst>
+                                      </p:cBhvr>
+                                      <p:to>
+                                        <p:strVal val="visible"/>
+                                      </p:to>
+                                    </p:set>
+                                  </p:childTnLst>
+                                </p:cTn>
+                              </p:par>
+                            </p:childTnLst>
+                          </p:cTn>
+                        </p:par>
+                      </p:childTnLst>
+                    </p:cTn>
+                  </p:par>
+                </p:childTnLst>
+              </p:cTn>
+              <p:prevCondLst>
+                <p:cond evt="onPrev" delay="0">
+                  <p:tgtEl>
+                    <p:sldTgt/>
+                  </p:tgtEl>
+                </p:cond>
+              </p:prevCondLst>
+              <p:nextCondLst>
+                <p:cond evt="onNext" delay="0">
+                  <p:tgtEl>
+                    <p:sldTgt/>
+                  </p:tgtEl>
+                </p:cond>
+              </p:nextCondLst>
+            </p:seq>
+          </p:childTnLst>
+        </p:cTn>
+      </p:par>
+    </p:tnLst>
+  </p:timing>
+</p:sld>
+</file>
+
+<file path=ppt/slides/slide3.xml><?xml version="1.0" encoding="utf-8"?>
+<p:sld xmlns:a="http://schemas.openxmlformats.org/drawingml/2006/main" xmlns:r="http://schemas.openxmlformats.org/officeDocument/2006/relationships" xmlns:p="http://schemas.openxmlformats.org/presentationml/2006/main">
+  <p:cSld>
+    <p:spTree>
+      <p:nvGrpSpPr>
+        <p:cNvPr id="1" name=""/>
+        <p:cNvGrpSpPr/>
+        <p:nvPr/>
+      </p:nvGrpSpPr>
+      <p:grpSpPr>
+        <a:xfrm>
+          <a:off x="0" y="0"/>
+          <a:ext cx="0" cy="0"/>
+          <a:chOff x="0" y="0"/>
+          <a:chExt cx="0" cy="0"/>
+        </a:xfrm>
+      </p:grpSpPr>
+      <p:sp>
+        <p:nvSpPr>
+          <p:cNvPr id="2" name="Titel 1">
+            <a:extLst>
+              <a:ext uri="{FF2B5EF4-FFF2-40B4-BE49-F238E27FC236}">
+                <a16:creationId xmlns:a16="http://schemas.microsoft.com/office/drawing/2014/main" id="{5E1B4432-44DC-C240-B792-1AB7653CDBD0}"/>
+              </a:ext>
+            </a:extLst>
+          </p:cNvPr>
+          <p:cNvSpPr>
+            <a:spLocks noGrp="1"/>
+          </p:cNvSpPr>
+          <p:nvPr>
+            <p:ph type="title"/>
+          </p:nvPr>
+        </p:nvSpPr>
+        <p:spPr/>
+        <p:txBody>
+          <a:bodyPr/>
+          <a:lstStyle/>
+          <a:p>
+            <a:r>
+              <a:rPr lang="nl-NL" dirty="0"/>
+              <a:t>Back </a:t>
+            </a:r>
+            <a:r>
+              <a:rPr lang="nl-NL" dirty="0" err="1"/>
+              <a:t>to</a:t>
+            </a:r>
+            <a:r>
+              <a:rPr lang="nl-NL" dirty="0"/>
+              <a:t> week 1 </a:t>
+            </a:r>
+          </a:p>
+        </p:txBody>
+      </p:sp>
+      <p:pic>
+        <p:nvPicPr>
+          <p:cNvPr id="6" name="Tijdelijke aanduiding voor inhoud 5">
+            <a:extLst>
+              <a:ext uri="{FF2B5EF4-FFF2-40B4-BE49-F238E27FC236}">
+                <a16:creationId xmlns:a16="http://schemas.microsoft.com/office/drawing/2014/main" id="{6FA35E87-6C25-B24B-A8F7-E5F8814CB99E}"/>
+              </a:ext>
+            </a:extLst>
+          </p:cNvPr>
+          <p:cNvPicPr>
+            <a:picLocks noGrp="1" noChangeAspect="1"/>
+          </p:cNvPicPr>
+          <p:nvPr>
+            <p:ph idx="1"/>
+          </p:nvPr>
+        </p:nvPicPr>
+        <p:blipFill>
+          <a:blip r:embed="rId2" cstate="print">
+            <a:extLst>
+              <a:ext uri="{28A0092B-C50C-407E-A947-70E740481C1C}">
+                <a14:useLocalDpi xmlns:a14="http://schemas.microsoft.com/office/drawing/2010/main" val="0"/>
+              </a:ext>
+            </a:extLst>
+          </a:blip>
+          <a:stretch>
+            <a:fillRect/>
+          </a:stretch>
+        </p:blipFill>
+        <p:spPr>
+          <a:xfrm>
+            <a:off x="179512" y="1052736"/>
+            <a:ext cx="8479464" cy="5040560"/>
+          </a:xfrm>
+        </p:spPr>
+      </p:pic>
+      <p:sp>
+        <p:nvSpPr>
+          <p:cNvPr id="7" name="Tekstvak 6">
+            <a:extLst>
+              <a:ext uri="{FF2B5EF4-FFF2-40B4-BE49-F238E27FC236}">
+                <a16:creationId xmlns:a16="http://schemas.microsoft.com/office/drawing/2014/main" id="{228203BD-48C5-EC46-A88C-09BF28AD62E8}"/>
+              </a:ext>
+            </a:extLst>
+          </p:cNvPr>
+          <p:cNvSpPr txBox="1"/>
+          <p:nvPr/>
+        </p:nvSpPr>
+        <p:spPr>
+          <a:xfrm>
+            <a:off x="107504" y="6165304"/>
+            <a:ext cx="8856984" cy="369332"/>
+          </a:xfrm>
+          <a:prstGeom prst="rect">
+            <a:avLst/>
+          </a:prstGeom>
+          <a:noFill/>
+        </p:spPr>
+        <p:txBody>
+          <a:bodyPr wrap="square" rtlCol="0">
+            <a:spAutoFit/>
+          </a:bodyPr>
+          <a:lstStyle/>
+          <a:p>
+            <a:r>
+              <a:rPr lang="nl-NL" dirty="0"/>
+              <a:t>See: </a:t>
+            </a:r>
+            <a:r>
+              <a:rPr lang="nl-NL" dirty="0">
+                <a:hlinkClick r:id="rId3"/>
+              </a:rPr>
+              <a:t>https://utrecht-university.shinyapps.io/SDA_shinyelectionbias/</a:t>
+            </a:r>
+            <a:r>
+              <a:rPr lang="nl-NL" dirty="0"/>
+              <a:t> </a:t>
+            </a:r>
+          </a:p>
+        </p:txBody>
+      </p:sp>
+      <p:sp>
+        <p:nvSpPr>
+          <p:cNvPr id="3" name="Tijdelijke aanduiding voor dianummer 2">
+            <a:extLst>
+              <a:ext uri="{FF2B5EF4-FFF2-40B4-BE49-F238E27FC236}">
+                <a16:creationId xmlns:a16="http://schemas.microsoft.com/office/drawing/2014/main" id="{5180CCA8-8C91-FF45-A13F-C276EF773990}"/>
+              </a:ext>
+            </a:extLst>
+          </p:cNvPr>
+          <p:cNvSpPr>
+            <a:spLocks noGrp="1"/>
+          </p:cNvSpPr>
+          <p:nvPr>
+            <p:ph type="sldNum" sz="quarter" idx="12"/>
+          </p:nvPr>
+        </p:nvSpPr>
+        <p:spPr/>
+        <p:txBody>
+          <a:bodyPr/>
+          <a:lstStyle/>
+          <a:p>
+            <a:fld id="{DBA3E7B4-B031-428C-A875-F1315D524DB8}" type="slidenum">
+              <a:rPr lang="nl-NL" smtClean="0"/>
+              <a:t>3</a:t>
+            </a:fld>
+            <a:endParaRPr lang="nl-NL"/>
+          </a:p>
+        </p:txBody>
+      </p:sp>
+    </p:spTree>
+    <p:extLst>
+      <p:ext uri="{BB962C8B-B14F-4D97-AF65-F5344CB8AC3E}">
+        <p14:creationId xmlns:p14="http://schemas.microsoft.com/office/powerpoint/2010/main" val="2757794701"/>
+      </p:ext>
+    </p:extLst>
+  </p:cSld>
+  <p:clrMapOvr>
+    <a:masterClrMapping/>
+  </p:clrMapOvr>
+</p:sld>
+</file>
+
+<file path=ppt/slides/slide30.xml><?xml version="1.0" encoding="utf-8"?>
+<p:sld xmlns:a="http://schemas.openxmlformats.org/drawingml/2006/main" xmlns:r="http://schemas.openxmlformats.org/officeDocument/2006/relationships" xmlns:p="http://schemas.openxmlformats.org/presentationml/2006/main">
+  <p:cSld>
+    <p:spTree>
+      <p:nvGrpSpPr>
+        <p:cNvPr id="1" name=""/>
+        <p:cNvGrpSpPr/>
+        <p:nvPr/>
+      </p:nvGrpSpPr>
+      <p:grpSpPr>
+        <a:xfrm>
+          <a:off x="0" y="0"/>
+          <a:ext cx="0" cy="0"/>
+          <a:chOff x="0" y="0"/>
+          <a:chExt cx="0" cy="0"/>
+        </a:xfrm>
+      </p:grpSpPr>
+      <p:sp>
+        <p:nvSpPr>
           <p:cNvPr id="2" name="Titel 1">
             <a:extLst>
               <a:ext uri="{FF2B5EF4-FFF2-40B4-BE49-F238E27FC236}">
@@ -17776,6 +18446,14 @@
             <a:r>
               <a:rPr lang="nl-NL" dirty="0" err="1"/>
               <a:t>Calibration</a:t>
+            </a:r>
+            <a:r>
+              <a:rPr lang="nl-NL" dirty="0"/>
+              <a:t> for non-</a:t>
+            </a:r>
+            <a:r>
+              <a:rPr lang="nl-NL" dirty="0" err="1"/>
+              <a:t>prob</a:t>
             </a:r>
             <a:endParaRPr lang="nl-NL" dirty="0"/>
           </a:p>
@@ -18133,7 +18811,7 @@
           <a:p>
             <a:fld id="{DBA3E7B4-B031-428C-A875-F1315D524DB8}" type="slidenum">
               <a:rPr lang="nl-NL" smtClean="0"/>
-              <a:t>29</a:t>
+              <a:t>30</a:t>
             </a:fld>
             <a:endParaRPr lang="nl-NL"/>
           </a:p>
@@ -18324,182 +19002,7 @@
 </p:sld>
 </file>
 
-<file path=ppt/slides/slide3.xml><?xml version="1.0" encoding="utf-8"?>
-<p:sld xmlns:a="http://schemas.openxmlformats.org/drawingml/2006/main" xmlns:r="http://schemas.openxmlformats.org/officeDocument/2006/relationships" xmlns:p="http://schemas.openxmlformats.org/presentationml/2006/main">
-  <p:cSld>
-    <p:spTree>
-      <p:nvGrpSpPr>
-        <p:cNvPr id="1" name=""/>
-        <p:cNvGrpSpPr/>
-        <p:nvPr/>
-      </p:nvGrpSpPr>
-      <p:grpSpPr>
-        <a:xfrm>
-          <a:off x="0" y="0"/>
-          <a:ext cx="0" cy="0"/>
-          <a:chOff x="0" y="0"/>
-          <a:chExt cx="0" cy="0"/>
-        </a:xfrm>
-      </p:grpSpPr>
-      <p:sp>
-        <p:nvSpPr>
-          <p:cNvPr id="2" name="Titel 1">
-            <a:extLst>
-              <a:ext uri="{FF2B5EF4-FFF2-40B4-BE49-F238E27FC236}">
-                <a16:creationId xmlns:a16="http://schemas.microsoft.com/office/drawing/2014/main" id="{5E1B4432-44DC-C240-B792-1AB7653CDBD0}"/>
-              </a:ext>
-            </a:extLst>
-          </p:cNvPr>
-          <p:cNvSpPr>
-            <a:spLocks noGrp="1"/>
-          </p:cNvSpPr>
-          <p:nvPr>
-            <p:ph type="title"/>
-          </p:nvPr>
-        </p:nvSpPr>
-        <p:spPr/>
-        <p:txBody>
-          <a:bodyPr/>
-          <a:lstStyle/>
-          <a:p>
-            <a:r>
-              <a:rPr lang="nl-NL" dirty="0"/>
-              <a:t>Back </a:t>
-            </a:r>
-            <a:r>
-              <a:rPr lang="nl-NL" dirty="0" err="1"/>
-              <a:t>to</a:t>
-            </a:r>
-            <a:r>
-              <a:rPr lang="nl-NL" dirty="0"/>
-              <a:t> week 1 </a:t>
-            </a:r>
-          </a:p>
-        </p:txBody>
-      </p:sp>
-      <p:pic>
-        <p:nvPicPr>
-          <p:cNvPr id="6" name="Tijdelijke aanduiding voor inhoud 5">
-            <a:extLst>
-              <a:ext uri="{FF2B5EF4-FFF2-40B4-BE49-F238E27FC236}">
-                <a16:creationId xmlns:a16="http://schemas.microsoft.com/office/drawing/2014/main" id="{6FA35E87-6C25-B24B-A8F7-E5F8814CB99E}"/>
-              </a:ext>
-            </a:extLst>
-          </p:cNvPr>
-          <p:cNvPicPr>
-            <a:picLocks noGrp="1" noChangeAspect="1"/>
-          </p:cNvPicPr>
-          <p:nvPr>
-            <p:ph idx="1"/>
-          </p:nvPr>
-        </p:nvPicPr>
-        <p:blipFill>
-          <a:blip r:embed="rId2" cstate="print">
-            <a:extLst>
-              <a:ext uri="{28A0092B-C50C-407E-A947-70E740481C1C}">
-                <a14:useLocalDpi xmlns:a14="http://schemas.microsoft.com/office/drawing/2010/main" val="0"/>
-              </a:ext>
-            </a:extLst>
-          </a:blip>
-          <a:stretch>
-            <a:fillRect/>
-          </a:stretch>
-        </p:blipFill>
-        <p:spPr>
-          <a:xfrm>
-            <a:off x="179512" y="1052736"/>
-            <a:ext cx="8479464" cy="5040560"/>
-          </a:xfrm>
-        </p:spPr>
-      </p:pic>
-      <p:sp>
-        <p:nvSpPr>
-          <p:cNvPr id="7" name="Tekstvak 6">
-            <a:extLst>
-              <a:ext uri="{FF2B5EF4-FFF2-40B4-BE49-F238E27FC236}">
-                <a16:creationId xmlns:a16="http://schemas.microsoft.com/office/drawing/2014/main" id="{228203BD-48C5-EC46-A88C-09BF28AD62E8}"/>
-              </a:ext>
-            </a:extLst>
-          </p:cNvPr>
-          <p:cNvSpPr txBox="1"/>
-          <p:nvPr/>
-        </p:nvSpPr>
-        <p:spPr>
-          <a:xfrm>
-            <a:off x="107504" y="6165304"/>
-            <a:ext cx="8856984" cy="369332"/>
-          </a:xfrm>
-          <a:prstGeom prst="rect">
-            <a:avLst/>
-          </a:prstGeom>
-          <a:noFill/>
-        </p:spPr>
-        <p:txBody>
-          <a:bodyPr wrap="square" rtlCol="0">
-            <a:spAutoFit/>
-          </a:bodyPr>
-          <a:lstStyle/>
-          <a:p>
-            <a:r>
-              <a:rPr lang="nl-NL" dirty="0"/>
-              <a:t>See: </a:t>
-            </a:r>
-            <a:r>
-              <a:rPr lang="nl-NL" dirty="0">
-                <a:hlinkClick r:id="rId3"/>
-              </a:rPr>
-              <a:t>https://utrecht-university.shinyapps.io/SDA_shinyelectionbias/</a:t>
-            </a:r>
-            <a:r>
-              <a:rPr lang="nl-NL" dirty="0"/>
-              <a:t> </a:t>
-            </a:r>
-          </a:p>
-        </p:txBody>
-      </p:sp>
-      <p:sp>
-        <p:nvSpPr>
-          <p:cNvPr id="3" name="Tijdelijke aanduiding voor dianummer 2">
-            <a:extLst>
-              <a:ext uri="{FF2B5EF4-FFF2-40B4-BE49-F238E27FC236}">
-                <a16:creationId xmlns:a16="http://schemas.microsoft.com/office/drawing/2014/main" id="{5180CCA8-8C91-FF45-A13F-C276EF773990}"/>
-              </a:ext>
-            </a:extLst>
-          </p:cNvPr>
-          <p:cNvSpPr>
-            <a:spLocks noGrp="1"/>
-          </p:cNvSpPr>
-          <p:nvPr>
-            <p:ph type="sldNum" sz="quarter" idx="12"/>
-          </p:nvPr>
-        </p:nvSpPr>
-        <p:spPr/>
-        <p:txBody>
-          <a:bodyPr/>
-          <a:lstStyle/>
-          <a:p>
-            <a:fld id="{DBA3E7B4-B031-428C-A875-F1315D524DB8}" type="slidenum">
-              <a:rPr lang="nl-NL" smtClean="0"/>
-              <a:t>3</a:t>
-            </a:fld>
-            <a:endParaRPr lang="nl-NL"/>
-          </a:p>
-        </p:txBody>
-      </p:sp>
-    </p:spTree>
-    <p:extLst>
-      <p:ext uri="{BB962C8B-B14F-4D97-AF65-F5344CB8AC3E}">
-        <p14:creationId xmlns:p14="http://schemas.microsoft.com/office/powerpoint/2010/main" val="2757794701"/>
-      </p:ext>
-    </p:extLst>
-  </p:cSld>
-  <p:clrMapOvr>
-    <a:masterClrMapping/>
-  </p:clrMapOvr>
-</p:sld>
-</file>
-
-<file path=ppt/slides/slide30.xml><?xml version="1.0" encoding="utf-8"?>
+<file path=ppt/slides/slide31.xml><?xml version="1.0" encoding="utf-8"?>
 <p:sld xmlns:a="http://schemas.openxmlformats.org/drawingml/2006/main" xmlns:r="http://schemas.openxmlformats.org/officeDocument/2006/relationships" xmlns:p="http://schemas.openxmlformats.org/presentationml/2006/main" show="0">
   <p:cSld>
     <p:spTree>
@@ -18873,7 +19376,7 @@
           <a:p>
             <a:fld id="{DBA3E7B4-B031-428C-A875-F1315D524DB8}" type="slidenum">
               <a:rPr lang="nl-NL" smtClean="0"/>
-              <a:t>30</a:t>
+              <a:t>31</a:t>
             </a:fld>
             <a:endParaRPr lang="nl-NL"/>
           </a:p>
@@ -18892,7 +19395,7 @@
 </p:sld>
 </file>
 
-<file path=ppt/slides/slide31.xml><?xml version="1.0" encoding="utf-8"?>
+<file path=ppt/slides/slide32.xml><?xml version="1.0" encoding="utf-8"?>
 <p:sld xmlns:a="http://schemas.openxmlformats.org/drawingml/2006/main" xmlns:r="http://schemas.openxmlformats.org/officeDocument/2006/relationships" xmlns:p="http://schemas.openxmlformats.org/presentationml/2006/main">
   <p:cSld>
     <p:spTree>
@@ -19210,7 +19713,7 @@
           <a:p>
             <a:fld id="{DBA3E7B4-B031-428C-A875-F1315D524DB8}" type="slidenum">
               <a:rPr lang="nl-NL" smtClean="0"/>
-              <a:t>31</a:t>
+              <a:t>32</a:t>
             </a:fld>
             <a:endParaRPr lang="nl-NL"/>
           </a:p>
@@ -19229,7 +19732,7 @@
 </p:sld>
 </file>
 
-<file path=ppt/slides/slide32.xml><?xml version="1.0" encoding="utf-8"?>
+<file path=ppt/slides/slide33.xml><?xml version="1.0" encoding="utf-8"?>
 <p:sld xmlns:a="http://schemas.openxmlformats.org/drawingml/2006/main" xmlns:r="http://schemas.openxmlformats.org/officeDocument/2006/relationships" xmlns:p="http://schemas.openxmlformats.org/presentationml/2006/main">
   <p:cSld>
     <p:spTree>
@@ -19644,7 +20147,7 @@
           <a:p>
             <a:fld id="{DBA3E7B4-B031-428C-A875-F1315D524DB8}" type="slidenum">
               <a:rPr lang="nl-NL" smtClean="0"/>
-              <a:t>32</a:t>
+              <a:t>33</a:t>
             </a:fld>
             <a:endParaRPr lang="nl-NL"/>
           </a:p>
@@ -19663,7 +20166,7 @@
 </p:sld>
 </file>
 
-<file path=ppt/slides/slide33.xml><?xml version="1.0" encoding="utf-8"?>
+<file path=ppt/slides/slide34.xml><?xml version="1.0" encoding="utf-8"?>
 <p:sld xmlns:a="http://schemas.openxmlformats.org/drawingml/2006/main" xmlns:r="http://schemas.openxmlformats.org/officeDocument/2006/relationships" xmlns:p="http://schemas.openxmlformats.org/presentationml/2006/main">
   <p:cSld>
     <p:spTree>
@@ -19899,7 +20402,7 @@
           <a:p>
             <a:fld id="{DBA3E7B4-B031-428C-A875-F1315D524DB8}" type="slidenum">
               <a:rPr lang="nl-NL" smtClean="0"/>
-              <a:t>33</a:t>
+              <a:t>34</a:t>
             </a:fld>
             <a:endParaRPr lang="nl-NL"/>
           </a:p>
@@ -19918,7 +20421,7 @@
 </p:sld>
 </file>
 
-<file path=ppt/slides/slide34.xml><?xml version="1.0" encoding="utf-8"?>
+<file path=ppt/slides/slide35.xml><?xml version="1.0" encoding="utf-8"?>
 <p:sld xmlns:a="http://schemas.openxmlformats.org/drawingml/2006/main" xmlns:r="http://schemas.openxmlformats.org/officeDocument/2006/relationships" xmlns:p="http://schemas.openxmlformats.org/presentationml/2006/main">
   <p:cSld>
     <p:spTree>
@@ -21541,7 +22044,7 @@
           <a:p>
             <a:fld id="{DBA3E7B4-B031-428C-A875-F1315D524DB8}" type="slidenum">
               <a:rPr lang="nl-NL" smtClean="0"/>
-              <a:t>34</a:t>
+              <a:t>35</a:t>
             </a:fld>
             <a:endParaRPr lang="nl-NL"/>
           </a:p>
@@ -21560,7 +22063,7 @@
 </p:sld>
 </file>
 
-<file path=ppt/slides/slide35.xml><?xml version="1.0" encoding="utf-8"?>
+<file path=ppt/slides/slide36.xml><?xml version="1.0" encoding="utf-8"?>
 <p:sld xmlns:a="http://schemas.openxmlformats.org/drawingml/2006/main" xmlns:r="http://schemas.openxmlformats.org/officeDocument/2006/relationships" xmlns:p="http://schemas.openxmlformats.org/presentationml/2006/main">
   <p:cSld>
     <p:spTree>
@@ -21909,7 +22412,7 @@
           <a:p>
             <a:fld id="{DBA3E7B4-B031-428C-A875-F1315D524DB8}" type="slidenum">
               <a:rPr lang="nl-NL" smtClean="0"/>
-              <a:t>35</a:t>
+              <a:t>36</a:t>
             </a:fld>
             <a:endParaRPr lang="nl-NL"/>
           </a:p>
@@ -21928,7 +22431,7 @@
 </p:sld>
 </file>
 
-<file path=ppt/slides/slide36.xml><?xml version="1.0" encoding="utf-8"?>
+<file path=ppt/slides/slide37.xml><?xml version="1.0" encoding="utf-8"?>
 <p:sld xmlns:a="http://schemas.openxmlformats.org/drawingml/2006/main" xmlns:r="http://schemas.openxmlformats.org/officeDocument/2006/relationships" xmlns:p="http://schemas.openxmlformats.org/presentationml/2006/main">
   <p:cSld>
     <p:spTree>
@@ -22239,7 +22742,7 @@
           <a:p>
             <a:fld id="{DBA3E7B4-B031-428C-A875-F1315D524DB8}" type="slidenum">
               <a:rPr lang="nl-NL" smtClean="0"/>
-              <a:t>36</a:t>
+              <a:t>37</a:t>
             </a:fld>
             <a:endParaRPr lang="nl-NL"/>
           </a:p>
@@ -22258,7 +22761,7 @@
 </p:sld>
 </file>
 
-<file path=ppt/slides/slide37.xml><?xml version="1.0" encoding="utf-8"?>
+<file path=ppt/slides/slide38.xml><?xml version="1.0" encoding="utf-8"?>
 <p:sld xmlns:a="http://schemas.openxmlformats.org/drawingml/2006/main" xmlns:r="http://schemas.openxmlformats.org/officeDocument/2006/relationships" xmlns:p="http://schemas.openxmlformats.org/presentationml/2006/main">
   <p:cSld>
     <p:spTree>
@@ -22391,7 +22894,7 @@
           <a:p>
             <a:fld id="{DBA3E7B4-B031-428C-A875-F1315D524DB8}" type="slidenum">
               <a:rPr lang="nl-NL" smtClean="0"/>
-              <a:t>37</a:t>
+              <a:t>38</a:t>
             </a:fld>
             <a:endParaRPr lang="nl-NL"/>
           </a:p>
@@ -22410,7 +22913,7 @@
 </p:sld>
 </file>
 
-<file path=ppt/slides/slide38.xml><?xml version="1.0" encoding="utf-8"?>
+<file path=ppt/slides/slide39.xml><?xml version="1.0" encoding="utf-8"?>
 <p:sld xmlns:a="http://schemas.openxmlformats.org/drawingml/2006/main" xmlns:r="http://schemas.openxmlformats.org/officeDocument/2006/relationships" xmlns:p="http://schemas.openxmlformats.org/presentationml/2006/main">
   <p:cSld>
     <p:spTree>
@@ -22982,7 +23485,7 @@
           <a:p>
             <a:fld id="{DBA3E7B4-B031-428C-A875-F1315D524DB8}" type="slidenum">
               <a:rPr lang="nl-NL" smtClean="0"/>
-              <a:t>38</a:t>
+              <a:t>39</a:t>
             </a:fld>
             <a:endParaRPr lang="nl-NL"/>
           </a:p>
@@ -24211,14 +24714,14 @@
           <a:effectLst/>
           <a:extLst>
             <a:ext uri="{909E8E84-426E-40dd-AFC4-6F175D3DCCD1}">
-              <a14:hiddenFill xmlns="" xmlns:a14="http://schemas.microsoft.com/office/drawing/2010/main">
+              <a14:hiddenFill xmlns:a14="http://schemas.microsoft.com/office/drawing/2010/main" xmlns="">
                 <a:solidFill>
                   <a:schemeClr val="accent1"/>
                 </a:solidFill>
               </a14:hiddenFill>
             </a:ext>
             <a:ext uri="{91240B29-F687-4f45-9708-019B960494DF}">
-              <a14:hiddenLine xmlns="" xmlns:a14="http://schemas.microsoft.com/office/drawing/2010/main" w="9525">
+              <a14:hiddenLine xmlns:a14="http://schemas.microsoft.com/office/drawing/2010/main" xmlns="" w="9525">
                 <a:solidFill>
                   <a:schemeClr val="tx1"/>
                 </a:solidFill>
@@ -24228,7 +24731,7 @@
               </a14:hiddenLine>
             </a:ext>
             <a:ext uri="{AF507438-7753-43e0-B8FC-AC1667EBCBE1}">
-              <a14:hiddenEffects xmlns="" xmlns:a14="http://schemas.microsoft.com/office/drawing/2010/main">
+              <a14:hiddenEffects xmlns:a14="http://schemas.microsoft.com/office/drawing/2010/main" xmlns="">
                 <a:effectLst>
                   <a:outerShdw dist="35921" dir="2700000" algn="ctr" rotWithShape="0">
                     <a:schemeClr val="bg2"/>

</xml_diff>

<commit_message>
update week 13 SDA
</commit_message>
<xml_diff>
--- a/static/files/SDA/week13/lecture_week_13.pptx
+++ b/static/files/SDA/week13/lecture_week_13.pptx
@@ -5,7 +5,7 @@
     <p:sldMasterId id="2147483648" r:id="rId1"/>
   </p:sldMasterIdLst>
   <p:notesMasterIdLst>
-    <p:notesMasterId r:id="rId41"/>
+    <p:notesMasterId r:id="rId43"/>
   </p:notesMasterIdLst>
   <p:sldIdLst>
     <p:sldId id="256" r:id="rId2"/>
@@ -16,19 +16,19 @@
     <p:sldId id="420" r:id="rId7"/>
     <p:sldId id="438" r:id="rId8"/>
     <p:sldId id="257" r:id="rId9"/>
-    <p:sldId id="423" r:id="rId10"/>
-    <p:sldId id="426" r:id="rId11"/>
-    <p:sldId id="439" r:id="rId12"/>
-    <p:sldId id="441" r:id="rId13"/>
-    <p:sldId id="442" r:id="rId14"/>
-    <p:sldId id="421" r:id="rId15"/>
-    <p:sldId id="440" r:id="rId16"/>
-    <p:sldId id="444" r:id="rId17"/>
-    <p:sldId id="446" r:id="rId18"/>
-    <p:sldId id="283" r:id="rId19"/>
-    <p:sldId id="448" r:id="rId20"/>
-    <p:sldId id="282" r:id="rId21"/>
-    <p:sldId id="413" r:id="rId22"/>
+    <p:sldId id="450" r:id="rId10"/>
+    <p:sldId id="439" r:id="rId11"/>
+    <p:sldId id="441" r:id="rId12"/>
+    <p:sldId id="442" r:id="rId13"/>
+    <p:sldId id="421" r:id="rId14"/>
+    <p:sldId id="440" r:id="rId15"/>
+    <p:sldId id="444" r:id="rId16"/>
+    <p:sldId id="446" r:id="rId17"/>
+    <p:sldId id="283" r:id="rId18"/>
+    <p:sldId id="448" r:id="rId19"/>
+    <p:sldId id="282" r:id="rId20"/>
+    <p:sldId id="413" r:id="rId21"/>
+    <p:sldId id="451" r:id="rId22"/>
     <p:sldId id="447" r:id="rId23"/>
     <p:sldId id="415" r:id="rId24"/>
     <p:sldId id="427" r:id="rId25"/>
@@ -43,10 +43,12 @@
     <p:sldId id="433" r:id="rId34"/>
     <p:sldId id="434" r:id="rId35"/>
     <p:sldId id="435" r:id="rId36"/>
-    <p:sldId id="432" r:id="rId37"/>
-    <p:sldId id="425" r:id="rId38"/>
-    <p:sldId id="315" r:id="rId39"/>
-    <p:sldId id="436" r:id="rId40"/>
+    <p:sldId id="452" r:id="rId37"/>
+    <p:sldId id="453" r:id="rId38"/>
+    <p:sldId id="432" r:id="rId39"/>
+    <p:sldId id="425" r:id="rId40"/>
+    <p:sldId id="315" r:id="rId41"/>
+    <p:sldId id="436" r:id="rId42"/>
   </p:sldIdLst>
   <p:sldSz cx="9144000" cy="6858000" type="screen4x3"/>
   <p:notesSz cx="7099300" cy="10234613"/>
@@ -246,7 +248,7 @@
           <a:p>
             <a:fld id="{8FEAE804-2177-420F-80EC-8435C849749E}" type="datetimeFigureOut">
               <a:rPr lang="nl-NL" smtClean="0"/>
-              <a:t>28-11-2022</a:t>
+              <a:t>27-11-2023</a:t>
             </a:fld>
             <a:endParaRPr lang="nl-NL"/>
           </a:p>
@@ -668,7 +670,7 @@
           <a:p>
             <a:fld id="{E6F94ABF-C5AA-624B-B3F8-A436392B2D11}" type="slidenum">
               <a:rPr lang="nl-NL" smtClean="0"/>
-              <a:t>18</a:t>
+              <a:t>17</a:t>
             </a:fld>
             <a:endParaRPr lang="nl-NL"/>
           </a:p>
@@ -752,7 +754,7 @@
           <a:p>
             <a:fld id="{E6F94ABF-C5AA-624B-B3F8-A436392B2D11}" type="slidenum">
               <a:rPr lang="nl-NL" smtClean="0"/>
-              <a:t>21</a:t>
+              <a:t>20</a:t>
             </a:fld>
             <a:endParaRPr lang="nl-NL"/>
           </a:p>
@@ -952,7 +954,7 @@
           <a:p>
             <a:fld id="{BE4419BF-0988-5041-849D-CCAE4562448A}" type="datetime1">
               <a:rPr lang="nl-NL" smtClean="0"/>
-              <a:t>28-11-2022</a:t>
+              <a:t>27-11-2023</a:t>
             </a:fld>
             <a:endParaRPr lang="nl-NL"/>
           </a:p>
@@ -1122,7 +1124,7 @@
           <a:p>
             <a:fld id="{AABA79A9-1707-F749-AFAB-D3AE0F0A7000}" type="datetime1">
               <a:rPr lang="nl-NL" smtClean="0"/>
-              <a:t>28-11-2022</a:t>
+              <a:t>27-11-2023</a:t>
             </a:fld>
             <a:endParaRPr lang="nl-NL"/>
           </a:p>
@@ -1302,7 +1304,7 @@
           <a:p>
             <a:fld id="{68AD5175-163A-714F-BE3A-A8BABE7278DB}" type="datetime1">
               <a:rPr lang="nl-NL" smtClean="0"/>
-              <a:t>28-11-2022</a:t>
+              <a:t>27-11-2023</a:t>
             </a:fld>
             <a:endParaRPr lang="nl-NL"/>
           </a:p>
@@ -1472,7 +1474,7 @@
           <a:p>
             <a:fld id="{E119E6F7-B48E-3F4C-9246-DCD48679BCAC}" type="datetime1">
               <a:rPr lang="nl-NL" smtClean="0"/>
-              <a:t>28-11-2022</a:t>
+              <a:t>27-11-2023</a:t>
             </a:fld>
             <a:endParaRPr lang="nl-NL"/>
           </a:p>
@@ -1718,7 +1720,7 @@
           <a:p>
             <a:fld id="{A7A3B712-CD7A-CF48-BFDA-15B328A9FB74}" type="datetime1">
               <a:rPr lang="nl-NL" smtClean="0"/>
-              <a:t>28-11-2022</a:t>
+              <a:t>27-11-2023</a:t>
             </a:fld>
             <a:endParaRPr lang="nl-NL"/>
           </a:p>
@@ -2006,7 +2008,7 @@
           <a:p>
             <a:fld id="{B8C83DA2-6A21-F34C-899C-E311570C4F1D}" type="datetime1">
               <a:rPr lang="nl-NL" smtClean="0"/>
-              <a:t>28-11-2022</a:t>
+              <a:t>27-11-2023</a:t>
             </a:fld>
             <a:endParaRPr lang="nl-NL"/>
           </a:p>
@@ -2428,7 +2430,7 @@
           <a:p>
             <a:fld id="{CC82CAC4-B0F0-F54C-BD8A-CFD62BBF3270}" type="datetime1">
               <a:rPr lang="nl-NL" smtClean="0"/>
-              <a:t>28-11-2022</a:t>
+              <a:t>27-11-2023</a:t>
             </a:fld>
             <a:endParaRPr lang="nl-NL"/>
           </a:p>
@@ -2546,7 +2548,7 @@
           <a:p>
             <a:fld id="{9269ECA5-48E4-B14A-9087-9AA13C407AC2}" type="datetime1">
               <a:rPr lang="nl-NL" smtClean="0"/>
-              <a:t>28-11-2022</a:t>
+              <a:t>27-11-2023</a:t>
             </a:fld>
             <a:endParaRPr lang="nl-NL"/>
           </a:p>
@@ -2641,7 +2643,7 @@
           <a:p>
             <a:fld id="{042BD14D-CE85-174E-A898-5C8A393C8915}" type="datetime1">
               <a:rPr lang="nl-NL" smtClean="0"/>
-              <a:t>28-11-2022</a:t>
+              <a:t>27-11-2023</a:t>
             </a:fld>
             <a:endParaRPr lang="nl-NL"/>
           </a:p>
@@ -2918,7 +2920,7 @@
           <a:p>
             <a:fld id="{8F6C17A1-BF10-7A4E-A106-B6F3AE2E53AB}" type="datetime1">
               <a:rPr lang="nl-NL" smtClean="0"/>
-              <a:t>28-11-2022</a:t>
+              <a:t>27-11-2023</a:t>
             </a:fld>
             <a:endParaRPr lang="nl-NL"/>
           </a:p>
@@ -3171,7 +3173,7 @@
           <a:p>
             <a:fld id="{29B36605-E9D1-4645-A7FD-0E06E51E3836}" type="datetime1">
               <a:rPr lang="nl-NL" smtClean="0"/>
-              <a:t>28-11-2022</a:t>
+              <a:t>27-11-2023</a:t>
             </a:fld>
             <a:endParaRPr lang="nl-NL"/>
           </a:p>
@@ -3384,7 +3386,7 @@
           <a:p>
             <a:fld id="{46338401-6E79-A845-AEE2-42D22570613F}" type="datetime1">
               <a:rPr lang="nl-NL" smtClean="0"/>
-              <a:t>28-11-2022</a:t>
+              <a:t>27-11-2023</a:t>
             </a:fld>
             <a:endParaRPr lang="nl-NL"/>
           </a:p>
@@ -3911,272 +3913,6 @@
           <p:cNvPr id="2" name="Titel 1">
             <a:extLst>
               <a:ext uri="{FF2B5EF4-FFF2-40B4-BE49-F238E27FC236}">
-                <a16:creationId xmlns:a16="http://schemas.microsoft.com/office/drawing/2014/main" id="{0654984B-CB37-5F49-8CDE-A4ABBF337DE6}"/>
-              </a:ext>
-            </a:extLst>
-          </p:cNvPr>
-          <p:cNvSpPr>
-            <a:spLocks noGrp="1"/>
-          </p:cNvSpPr>
-          <p:nvPr>
-            <p:ph type="title"/>
-          </p:nvPr>
-        </p:nvSpPr>
-        <p:spPr/>
-        <p:txBody>
-          <a:bodyPr/>
-          <a:lstStyle/>
-          <a:p>
-            <a:r>
-              <a:rPr lang="nl-NL" dirty="0" err="1"/>
-              <a:t>Cornesse</a:t>
-            </a:r>
-            <a:r>
-              <a:rPr lang="nl-NL" dirty="0"/>
-              <a:t> et al (2020)</a:t>
-            </a:r>
-          </a:p>
-        </p:txBody>
-      </p:sp>
-      <p:sp>
-        <p:nvSpPr>
-          <p:cNvPr id="3" name="Tijdelijke aanduiding voor inhoud 2">
-            <a:extLst>
-              <a:ext uri="{FF2B5EF4-FFF2-40B4-BE49-F238E27FC236}">
-                <a16:creationId xmlns:a16="http://schemas.microsoft.com/office/drawing/2014/main" id="{323AB381-B320-5443-AECF-BC6C57A83709}"/>
-              </a:ext>
-            </a:extLst>
-          </p:cNvPr>
-          <p:cNvSpPr>
-            <a:spLocks noGrp="1"/>
-          </p:cNvSpPr>
-          <p:nvPr>
-            <p:ph idx="1"/>
-          </p:nvPr>
-        </p:nvSpPr>
-        <p:spPr/>
-        <p:txBody>
-          <a:bodyPr>
-            <a:normAutofit lnSpcReduction="10000"/>
-          </a:bodyPr>
-          <a:lstStyle/>
-          <a:p>
-            <a:r>
-              <a:rPr lang="nl-NL" dirty="0" err="1"/>
-              <a:t>When</a:t>
-            </a:r>
-            <a:r>
-              <a:rPr lang="nl-NL" dirty="0"/>
-              <a:t> is a non-</a:t>
-            </a:r>
-            <a:r>
-              <a:rPr lang="nl-NL" dirty="0" err="1"/>
-              <a:t>probability</a:t>
-            </a:r>
-            <a:r>
-              <a:rPr lang="nl-NL" dirty="0"/>
-              <a:t> sample </a:t>
-            </a:r>
-            <a:r>
-              <a:rPr lang="nl-NL" dirty="0" err="1"/>
-              <a:t>not</a:t>
-            </a:r>
-            <a:r>
-              <a:rPr lang="nl-NL" dirty="0"/>
-              <a:t> </a:t>
-            </a:r>
-            <a:r>
-              <a:rPr lang="nl-NL" dirty="0" err="1"/>
-              <a:t>too</a:t>
-            </a:r>
-            <a:r>
-              <a:rPr lang="nl-NL" dirty="0"/>
-              <a:t> bad?</a:t>
-            </a:r>
-          </a:p>
-          <a:p>
-            <a:pPr lvl="1"/>
-            <a:r>
-              <a:rPr lang="nl-NL" dirty="0"/>
-              <a:t>in change </a:t>
-            </a:r>
-            <a:r>
-              <a:rPr lang="nl-NL" dirty="0" err="1"/>
-              <a:t>estimates</a:t>
-            </a:r>
-            <a:r>
-              <a:rPr lang="nl-NL" dirty="0"/>
-              <a:t>? </a:t>
-            </a:r>
-          </a:p>
-          <a:p>
-            <a:pPr lvl="1"/>
-            <a:r>
-              <a:rPr lang="nl-NL" dirty="0"/>
-              <a:t>(</a:t>
-            </a:r>
-            <a:r>
-              <a:rPr lang="nl-NL" dirty="0" err="1"/>
-              <a:t>regression</a:t>
-            </a:r>
-            <a:r>
-              <a:rPr lang="nl-NL" dirty="0"/>
-              <a:t> </a:t>
-            </a:r>
-            <a:r>
-              <a:rPr lang="nl-NL" dirty="0" err="1"/>
-              <a:t>models</a:t>
-            </a:r>
-            <a:r>
-              <a:rPr lang="nl-NL" dirty="0"/>
-              <a:t>)?	</a:t>
-            </a:r>
-          </a:p>
-          <a:p>
-            <a:pPr lvl="1"/>
-            <a:r>
-              <a:rPr lang="nl-NL" dirty="0" err="1"/>
-              <a:t>When</a:t>
-            </a:r>
-            <a:r>
-              <a:rPr lang="nl-NL" dirty="0"/>
-              <a:t> </a:t>
-            </a:r>
-            <a:r>
-              <a:rPr lang="nl-NL" dirty="0" err="1"/>
-              <a:t>controls</a:t>
-            </a:r>
-            <a:r>
-              <a:rPr lang="nl-NL" dirty="0"/>
-              <a:t> are accurate (quota)</a:t>
-            </a:r>
-          </a:p>
-          <a:p>
-            <a:r>
-              <a:rPr lang="nl-NL" dirty="0"/>
-              <a:t>Global </a:t>
-            </a:r>
-            <a:r>
-              <a:rPr lang="nl-NL" dirty="0" err="1"/>
-              <a:t>adjustment</a:t>
-            </a:r>
-            <a:r>
-              <a:rPr lang="nl-NL" dirty="0"/>
-              <a:t> approaches</a:t>
-            </a:r>
-          </a:p>
-          <a:p>
-            <a:pPr lvl="1"/>
-            <a:r>
-              <a:rPr lang="nl-NL" dirty="0"/>
-              <a:t>i.e. </a:t>
-            </a:r>
-            <a:r>
-              <a:rPr lang="nl-NL" dirty="0" err="1"/>
-              <a:t>Conceptualize</a:t>
-            </a:r>
-            <a:r>
-              <a:rPr lang="nl-NL" dirty="0"/>
-              <a:t> as design-</a:t>
-            </a:r>
-            <a:r>
-              <a:rPr lang="nl-NL" dirty="0" err="1"/>
-              <a:t>based</a:t>
-            </a:r>
-            <a:endParaRPr lang="nl-NL" dirty="0"/>
-          </a:p>
-          <a:p>
-            <a:r>
-              <a:rPr lang="nl-NL" dirty="0" err="1"/>
-              <a:t>Estimate-specific</a:t>
-            </a:r>
-            <a:r>
-              <a:rPr lang="nl-NL" dirty="0"/>
-              <a:t> approaches</a:t>
-            </a:r>
-          </a:p>
-          <a:p>
-            <a:pPr lvl="1"/>
-            <a:r>
-              <a:rPr lang="nl-NL" dirty="0" err="1"/>
-              <a:t>Examples</a:t>
-            </a:r>
-            <a:r>
-              <a:rPr lang="nl-NL" dirty="0"/>
-              <a:t> later in </a:t>
-            </a:r>
-            <a:r>
-              <a:rPr lang="nl-NL" dirty="0" err="1"/>
-              <a:t>lecture</a:t>
-            </a:r>
-            <a:endParaRPr lang="nl-NL" dirty="0"/>
-          </a:p>
-        </p:txBody>
-      </p:sp>
-      <p:sp>
-        <p:nvSpPr>
-          <p:cNvPr id="4" name="Tijdelijke aanduiding voor dianummer 3">
-            <a:extLst>
-              <a:ext uri="{FF2B5EF4-FFF2-40B4-BE49-F238E27FC236}">
-                <a16:creationId xmlns:a16="http://schemas.microsoft.com/office/drawing/2014/main" id="{00306D72-8BB6-1246-91B2-56787AC242CA}"/>
-              </a:ext>
-            </a:extLst>
-          </p:cNvPr>
-          <p:cNvSpPr>
-            <a:spLocks noGrp="1"/>
-          </p:cNvSpPr>
-          <p:nvPr>
-            <p:ph type="sldNum" sz="quarter" idx="12"/>
-          </p:nvPr>
-        </p:nvSpPr>
-        <p:spPr/>
-        <p:txBody>
-          <a:bodyPr/>
-          <a:lstStyle/>
-          <a:p>
-            <a:fld id="{DBA3E7B4-B031-428C-A875-F1315D524DB8}" type="slidenum">
-              <a:rPr lang="nl-NL" smtClean="0"/>
-              <a:t>10</a:t>
-            </a:fld>
-            <a:endParaRPr lang="nl-NL"/>
-          </a:p>
-        </p:txBody>
-      </p:sp>
-    </p:spTree>
-    <p:extLst>
-      <p:ext uri="{BB962C8B-B14F-4D97-AF65-F5344CB8AC3E}">
-        <p14:creationId xmlns:p14="http://schemas.microsoft.com/office/powerpoint/2010/main" val="20938290"/>
-      </p:ext>
-    </p:extLst>
-  </p:cSld>
-  <p:clrMapOvr>
-    <a:masterClrMapping/>
-  </p:clrMapOvr>
-</p:sld>
-</file>
-
-<file path=ppt/slides/slide11.xml><?xml version="1.0" encoding="utf-8"?>
-<p:sld xmlns:a="http://schemas.openxmlformats.org/drawingml/2006/main" xmlns:r="http://schemas.openxmlformats.org/officeDocument/2006/relationships" xmlns:p="http://schemas.openxmlformats.org/presentationml/2006/main">
-  <p:cSld>
-    <p:spTree>
-      <p:nvGrpSpPr>
-        <p:cNvPr id="1" name=""/>
-        <p:cNvGrpSpPr/>
-        <p:nvPr/>
-      </p:nvGrpSpPr>
-      <p:grpSpPr>
-        <a:xfrm>
-          <a:off x="0" y="0"/>
-          <a:ext cx="0" cy="0"/>
-          <a:chOff x="0" y="0"/>
-          <a:chExt cx="0" cy="0"/>
-        </a:xfrm>
-      </p:grpSpPr>
-      <p:sp>
-        <p:nvSpPr>
-          <p:cNvPr id="2" name="Titel 1">
-            <a:extLst>
-              <a:ext uri="{FF2B5EF4-FFF2-40B4-BE49-F238E27FC236}">
                 <a16:creationId xmlns:a16="http://schemas.microsoft.com/office/drawing/2014/main" id="{EA39CBEB-3613-D243-8D99-5C5CBB63FA18}"/>
               </a:ext>
             </a:extLst>
@@ -4460,7 +4196,7 @@
           <a:p>
             <a:fld id="{DBA3E7B4-B031-428C-A875-F1315D524DB8}" type="slidenum">
               <a:rPr lang="nl-NL" smtClean="0"/>
-              <a:t>11</a:t>
+              <a:t>10</a:t>
             </a:fld>
             <a:endParaRPr lang="nl-NL"/>
           </a:p>
@@ -4479,7 +4215,7 @@
 </p:sld>
 </file>
 
-<file path=ppt/slides/slide12.xml><?xml version="1.0" encoding="utf-8"?>
+<file path=ppt/slides/slide11.xml><?xml version="1.0" encoding="utf-8"?>
 <p:sld xmlns:a="http://schemas.openxmlformats.org/drawingml/2006/main" xmlns:r="http://schemas.openxmlformats.org/officeDocument/2006/relationships" xmlns:p="http://schemas.openxmlformats.org/presentationml/2006/main">
   <p:cSld>
     <p:spTree>
@@ -5185,7 +4921,7 @@
           <a:p>
             <a:fld id="{DBA3E7B4-B031-428C-A875-F1315D524DB8}" type="slidenum">
               <a:rPr lang="nl-NL" smtClean="0"/>
-              <a:t>12</a:t>
+              <a:t>11</a:t>
             </a:fld>
             <a:endParaRPr lang="nl-NL"/>
           </a:p>
@@ -5204,7 +4940,7 @@
 </p:sld>
 </file>
 
-<file path=ppt/slides/slide13.xml><?xml version="1.0" encoding="utf-8"?>
+<file path=ppt/slides/slide12.xml><?xml version="1.0" encoding="utf-8"?>
 <p:sld xmlns:a="http://schemas.openxmlformats.org/drawingml/2006/main" xmlns:r="http://schemas.openxmlformats.org/officeDocument/2006/relationships" xmlns:p="http://schemas.openxmlformats.org/presentationml/2006/main">
   <p:cSld>
     <p:spTree>
@@ -5910,7 +5646,7 @@
           <a:p>
             <a:fld id="{DBA3E7B4-B031-428C-A875-F1315D524DB8}" type="slidenum">
               <a:rPr lang="nl-NL" smtClean="0"/>
-              <a:t>13</a:t>
+              <a:t>12</a:t>
             </a:fld>
             <a:endParaRPr lang="nl-NL"/>
           </a:p>
@@ -5929,7 +5665,7 @@
 </p:sld>
 </file>
 
-<file path=ppt/slides/slide14.xml><?xml version="1.0" encoding="utf-8"?>
+<file path=ppt/slides/slide13.xml><?xml version="1.0" encoding="utf-8"?>
 <p:sld xmlns:a="http://schemas.openxmlformats.org/drawingml/2006/main" xmlns:r="http://schemas.openxmlformats.org/officeDocument/2006/relationships" xmlns:p="http://schemas.openxmlformats.org/presentationml/2006/main">
   <p:cSld>
     <p:spTree>
@@ -6351,7 +6087,7 @@
           <a:p>
             <a:fld id="{DBA3E7B4-B031-428C-A875-F1315D524DB8}" type="slidenum">
               <a:rPr lang="nl-NL" smtClean="0"/>
-              <a:t>14</a:t>
+              <a:t>13</a:t>
             </a:fld>
             <a:endParaRPr lang="nl-NL"/>
           </a:p>
@@ -6361,6 +6097,303 @@
     <p:extLst>
       <p:ext uri="{BB962C8B-B14F-4D97-AF65-F5344CB8AC3E}">
         <p14:creationId xmlns:p14="http://schemas.microsoft.com/office/powerpoint/2010/main" val="2431247737"/>
+      </p:ext>
+    </p:extLst>
+  </p:cSld>
+  <p:clrMapOvr>
+    <a:masterClrMapping/>
+  </p:clrMapOvr>
+</p:sld>
+</file>
+
+<file path=ppt/slides/slide14.xml><?xml version="1.0" encoding="utf-8"?>
+<p:sld xmlns:a="http://schemas.openxmlformats.org/drawingml/2006/main" xmlns:r="http://schemas.openxmlformats.org/officeDocument/2006/relationships" xmlns:p="http://schemas.openxmlformats.org/presentationml/2006/main">
+  <p:cSld>
+    <p:spTree>
+      <p:nvGrpSpPr>
+        <p:cNvPr id="1" name=""/>
+        <p:cNvGrpSpPr/>
+        <p:nvPr/>
+      </p:nvGrpSpPr>
+      <p:grpSpPr>
+        <a:xfrm>
+          <a:off x="0" y="0"/>
+          <a:ext cx="0" cy="0"/>
+          <a:chOff x="0" y="0"/>
+          <a:chExt cx="0" cy="0"/>
+        </a:xfrm>
+      </p:grpSpPr>
+      <p:sp>
+        <p:nvSpPr>
+          <p:cNvPr id="2" name="Titel 1">
+            <a:extLst>
+              <a:ext uri="{FF2B5EF4-FFF2-40B4-BE49-F238E27FC236}">
+                <a16:creationId xmlns:a16="http://schemas.microsoft.com/office/drawing/2014/main" id="{EA39CBEB-3613-D243-8D99-5C5CBB63FA18}"/>
+              </a:ext>
+            </a:extLst>
+          </p:cNvPr>
+          <p:cNvSpPr>
+            <a:spLocks noGrp="1"/>
+          </p:cNvSpPr>
+          <p:nvPr>
+            <p:ph type="title"/>
+          </p:nvPr>
+        </p:nvSpPr>
+        <p:spPr/>
+        <p:txBody>
+          <a:bodyPr/>
+          <a:lstStyle/>
+          <a:p>
+            <a:r>
+              <a:rPr lang="nl-NL" dirty="0" err="1"/>
+              <a:t>Mercer</a:t>
+            </a:r>
+            <a:r>
+              <a:rPr lang="nl-NL" dirty="0"/>
+              <a:t> et al (2018) on </a:t>
+            </a:r>
+            <a:r>
+              <a:rPr lang="nl-NL" dirty="0" err="1"/>
+              <a:t>paradigm</a:t>
+            </a:r>
+            <a:r>
+              <a:rPr lang="nl-NL" dirty="0"/>
+              <a:t> 1</a:t>
+            </a:r>
+          </a:p>
+        </p:txBody>
+      </p:sp>
+      <p:sp>
+        <p:nvSpPr>
+          <p:cNvPr id="3" name="Tijdelijke aanduiding voor inhoud 2">
+            <a:extLst>
+              <a:ext uri="{FF2B5EF4-FFF2-40B4-BE49-F238E27FC236}">
+                <a16:creationId xmlns:a16="http://schemas.microsoft.com/office/drawing/2014/main" id="{E31142F6-7136-F74B-9C89-2133DF197A24}"/>
+              </a:ext>
+            </a:extLst>
+          </p:cNvPr>
+          <p:cNvSpPr>
+            <a:spLocks noGrp="1"/>
+          </p:cNvSpPr>
+          <p:nvPr>
+            <p:ph idx="1"/>
+          </p:nvPr>
+        </p:nvSpPr>
+        <p:spPr/>
+        <p:txBody>
+          <a:bodyPr>
+            <a:normAutofit/>
+          </a:bodyPr>
+          <a:lstStyle/>
+          <a:p>
+            <a:r>
+              <a:rPr lang="nl-NL" dirty="0" err="1"/>
+              <a:t>Causality</a:t>
+            </a:r>
+            <a:r>
+              <a:rPr lang="nl-NL" dirty="0"/>
+              <a:t>: </a:t>
+            </a:r>
+            <a:r>
+              <a:rPr lang="nl-NL" dirty="0" err="1"/>
+              <a:t>experiments</a:t>
+            </a:r>
+            <a:endParaRPr lang="nl-NL" dirty="0"/>
+          </a:p>
+          <a:p>
+            <a:pPr lvl="1"/>
+            <a:r>
+              <a:rPr lang="nl-NL" dirty="0"/>
+              <a:t>Strong </a:t>
+            </a:r>
+            <a:r>
+              <a:rPr lang="nl-NL" dirty="0" err="1"/>
+              <a:t>ignorability</a:t>
+            </a:r>
+            <a:r>
+              <a:rPr lang="nl-NL" dirty="0"/>
+              <a:t> (random </a:t>
+            </a:r>
+            <a:r>
+              <a:rPr lang="nl-NL" dirty="0" err="1"/>
+              <a:t>assignment</a:t>
+            </a:r>
+            <a:r>
+              <a:rPr lang="nl-NL" dirty="0"/>
+              <a:t>)</a:t>
+            </a:r>
+          </a:p>
+          <a:p>
+            <a:pPr lvl="2"/>
+            <a:r>
+              <a:rPr lang="nl-NL" dirty="0" err="1"/>
+              <a:t>Causal</a:t>
+            </a:r>
+            <a:r>
+              <a:rPr lang="nl-NL" dirty="0"/>
+              <a:t> effect (y) </a:t>
+            </a:r>
+            <a:r>
+              <a:rPr lang="nl-NL" dirty="0" err="1"/>
+              <a:t>not</a:t>
+            </a:r>
+            <a:r>
+              <a:rPr lang="nl-NL" dirty="0"/>
+              <a:t> </a:t>
+            </a:r>
+            <a:r>
+              <a:rPr lang="nl-NL" dirty="0" err="1"/>
+              <a:t>dependent</a:t>
+            </a:r>
+            <a:r>
+              <a:rPr lang="nl-NL" dirty="0"/>
+              <a:t> on X</a:t>
+            </a:r>
+          </a:p>
+          <a:p>
+            <a:pPr lvl="3"/>
+            <a:r>
+              <a:rPr lang="nl-NL" dirty="0" err="1"/>
+              <a:t>Exchangeability</a:t>
+            </a:r>
+            <a:r>
+              <a:rPr lang="nl-NL" dirty="0"/>
+              <a:t> </a:t>
+            </a:r>
+            <a:r>
+              <a:rPr lang="nl-NL" dirty="0" err="1">
+                <a:solidFill>
+                  <a:srgbClr val="FF0000"/>
+                </a:solidFill>
+              </a:rPr>
+              <a:t>and</a:t>
+            </a:r>
+            <a:endParaRPr lang="nl-NL" dirty="0">
+              <a:solidFill>
+                <a:srgbClr val="FF0000"/>
+              </a:solidFill>
+            </a:endParaRPr>
+          </a:p>
+          <a:p>
+            <a:pPr lvl="3"/>
+            <a:r>
+              <a:rPr lang="nl-NL" dirty="0" err="1"/>
+              <a:t>Positivity</a:t>
+            </a:r>
+            <a:r>
+              <a:rPr lang="nl-NL" dirty="0"/>
+              <a:t> </a:t>
+            </a:r>
+          </a:p>
+          <a:p>
+            <a:pPr lvl="1"/>
+            <a:endParaRPr lang="nl-NL" dirty="0"/>
+          </a:p>
+          <a:p>
+            <a:pPr lvl="1"/>
+            <a:r>
+              <a:rPr lang="nl-NL" dirty="0" err="1"/>
+              <a:t>Transportability</a:t>
+            </a:r>
+            <a:r>
+              <a:rPr lang="nl-NL" dirty="0"/>
+              <a:t>: </a:t>
+            </a:r>
+            <a:r>
+              <a:rPr lang="nl-NL" dirty="0" err="1"/>
+              <a:t>composition</a:t>
+            </a:r>
+            <a:r>
+              <a:rPr lang="nl-NL" dirty="0"/>
+              <a:t> of sample </a:t>
+            </a:r>
+          </a:p>
+          <a:p>
+            <a:pPr lvl="2"/>
+            <a:r>
+              <a:rPr lang="nl-NL" dirty="0" err="1"/>
+              <a:t>Not</a:t>
+            </a:r>
+            <a:r>
+              <a:rPr lang="nl-NL" dirty="0"/>
+              <a:t> </a:t>
+            </a:r>
+            <a:r>
+              <a:rPr lang="nl-NL" dirty="0" err="1"/>
+              <a:t>considered</a:t>
+            </a:r>
+            <a:r>
+              <a:rPr lang="nl-NL" dirty="0"/>
+              <a:t> </a:t>
+            </a:r>
+            <a:r>
+              <a:rPr lang="nl-NL" dirty="0" err="1"/>
+              <a:t>an</a:t>
+            </a:r>
+            <a:r>
+              <a:rPr lang="nl-NL" dirty="0"/>
+              <a:t> issue in </a:t>
+            </a:r>
+            <a:r>
+              <a:rPr lang="nl-NL" dirty="0" err="1"/>
+              <a:t>inference</a:t>
+            </a:r>
+            <a:endParaRPr lang="nl-NL" dirty="0"/>
+          </a:p>
+          <a:p>
+            <a:pPr lvl="3"/>
+            <a:r>
+              <a:rPr lang="nl-NL" dirty="0"/>
+              <a:t>WEIRD samples</a:t>
+            </a:r>
+          </a:p>
+          <a:p>
+            <a:pPr lvl="3"/>
+            <a:endParaRPr lang="nl-NL" dirty="0"/>
+          </a:p>
+          <a:p>
+            <a:pPr lvl="1"/>
+            <a:endParaRPr lang="nl-NL" dirty="0"/>
+          </a:p>
+          <a:p>
+            <a:pPr lvl="1"/>
+            <a:endParaRPr lang="nl-NL" dirty="0"/>
+          </a:p>
+        </p:txBody>
+      </p:sp>
+      <p:sp>
+        <p:nvSpPr>
+          <p:cNvPr id="4" name="Tijdelijke aanduiding voor dianummer 3">
+            <a:extLst>
+              <a:ext uri="{FF2B5EF4-FFF2-40B4-BE49-F238E27FC236}">
+                <a16:creationId xmlns:a16="http://schemas.microsoft.com/office/drawing/2014/main" id="{02638BDD-6C8A-AC4F-BF39-E4FA83F36FB5}"/>
+              </a:ext>
+            </a:extLst>
+          </p:cNvPr>
+          <p:cNvSpPr>
+            <a:spLocks noGrp="1"/>
+          </p:cNvSpPr>
+          <p:nvPr>
+            <p:ph type="sldNum" sz="quarter" idx="12"/>
+          </p:nvPr>
+        </p:nvSpPr>
+        <p:spPr/>
+        <p:txBody>
+          <a:bodyPr/>
+          <a:lstStyle/>
+          <a:p>
+            <a:fld id="{DBA3E7B4-B031-428C-A875-F1315D524DB8}" type="slidenum">
+              <a:rPr lang="nl-NL" smtClean="0"/>
+              <a:t>14</a:t>
+            </a:fld>
+            <a:endParaRPr lang="nl-NL"/>
+          </a:p>
+        </p:txBody>
+      </p:sp>
+    </p:spTree>
+    <p:extLst>
+      <p:ext uri="{BB962C8B-B14F-4D97-AF65-F5344CB8AC3E}">
+        <p14:creationId xmlns:p14="http://schemas.microsoft.com/office/powerpoint/2010/main" val="2435279201"/>
       </p:ext>
     </p:extLst>
   </p:cSld>
@@ -6422,7 +6455,7 @@
             </a:r>
             <a:r>
               <a:rPr lang="nl-NL" dirty="0"/>
-              <a:t> 1</a:t>
+              <a:t> 2</a:t>
             </a:r>
           </a:p>
         </p:txBody>
@@ -6446,21 +6479,25 @@
         <p:spPr/>
         <p:txBody>
           <a:bodyPr>
-            <a:normAutofit/>
+            <a:normAutofit lnSpcReduction="10000"/>
           </a:bodyPr>
           <a:lstStyle/>
           <a:p>
             <a:r>
-              <a:rPr lang="nl-NL" dirty="0" err="1"/>
-              <a:t>Causality</a:t>
-            </a:r>
-            <a:r>
-              <a:rPr lang="nl-NL" dirty="0"/>
-              <a:t>: </a:t>
-            </a:r>
-            <a:r>
-              <a:rPr lang="nl-NL" dirty="0" err="1"/>
-              <a:t>experiments</a:t>
+              <a:rPr lang="nl-NL" dirty="0"/>
+              <a:t>Design-</a:t>
+            </a:r>
+            <a:r>
+              <a:rPr lang="nl-NL" dirty="0" err="1"/>
+              <a:t>based</a:t>
+            </a:r>
+            <a:r>
+              <a:rPr lang="nl-NL" dirty="0"/>
+              <a:t> </a:t>
+            </a:r>
+            <a:r>
+              <a:rPr lang="nl-NL" dirty="0" err="1"/>
+              <a:t>surveys</a:t>
             </a:r>
             <a:endParaRPr lang="nl-NL" dirty="0"/>
           </a:p>
@@ -6468,54 +6505,24 @@
             <a:pPr lvl="1"/>
             <a:r>
               <a:rPr lang="nl-NL" dirty="0"/>
-              <a:t>Strong </a:t>
+              <a:t>Random samples leads </a:t>
+            </a:r>
+            <a:r>
+              <a:rPr lang="nl-NL" dirty="0" err="1"/>
+              <a:t>to</a:t>
+            </a:r>
+            <a:r>
+              <a:rPr lang="nl-NL" dirty="0"/>
+              <a:t> </a:t>
             </a:r>
             <a:r>
               <a:rPr lang="nl-NL" dirty="0" err="1"/>
               <a:t>ignorability</a:t>
             </a:r>
-            <a:r>
-              <a:rPr lang="nl-NL" dirty="0"/>
-              <a:t> (random </a:t>
-            </a:r>
-            <a:r>
-              <a:rPr lang="nl-NL" dirty="0" err="1"/>
-              <a:t>assignment</a:t>
-            </a:r>
-            <a:r>
-              <a:rPr lang="nl-NL" dirty="0"/>
-              <a:t>)</a:t>
-            </a:r>
+            <a:endParaRPr lang="nl-NL" dirty="0"/>
           </a:p>
           <a:p>
             <a:pPr lvl="2"/>
-            <a:r>
-              <a:rPr lang="nl-NL" dirty="0" err="1"/>
-              <a:t>Causal</a:t>
-            </a:r>
-            <a:r>
-              <a:rPr lang="nl-NL" dirty="0"/>
-              <a:t> effect (y) </a:t>
-            </a:r>
-            <a:r>
-              <a:rPr lang="nl-NL" dirty="0" err="1"/>
-              <a:t>not</a:t>
-            </a:r>
-            <a:r>
-              <a:rPr lang="nl-NL" dirty="0"/>
-              <a:t> </a:t>
-            </a:r>
-            <a:r>
-              <a:rPr lang="nl-NL" dirty="0" err="1"/>
-              <a:t>dependent</a:t>
-            </a:r>
-            <a:r>
-              <a:rPr lang="nl-NL" dirty="0"/>
-              <a:t> on X</a:t>
-            </a:r>
-          </a:p>
-          <a:p>
-            <a:pPr lvl="3"/>
             <a:r>
               <a:rPr lang="nl-NL" dirty="0" err="1"/>
               <a:t>Exchangeability</a:t>
@@ -6539,7 +6546,7 @@
             </a:endParaRPr>
           </a:p>
           <a:p>
-            <a:pPr lvl="3"/>
+            <a:pPr lvl="2"/>
             <a:r>
               <a:rPr lang="nl-NL" dirty="0" err="1"/>
               <a:t>Positivity</a:t>
@@ -6551,32 +6558,70 @@
           </a:p>
           <a:p>
             <a:pPr lvl="1"/>
+            <a:r>
+              <a:rPr lang="nl-NL" dirty="0" err="1"/>
+              <a:t>And</a:t>
+            </a:r>
+            <a:r>
+              <a:rPr lang="nl-NL" dirty="0"/>
+              <a:t> </a:t>
+            </a:r>
+            <a:r>
+              <a:rPr lang="nl-NL" dirty="0" err="1"/>
+              <a:t>to</a:t>
+            </a:r>
+            <a:r>
+              <a:rPr lang="nl-NL" dirty="0"/>
+              <a:t> </a:t>
+            </a:r>
+            <a:r>
+              <a:rPr lang="nl-NL" dirty="0" err="1"/>
+              <a:t>transportability</a:t>
+            </a:r>
             <a:endParaRPr lang="nl-NL" dirty="0"/>
           </a:p>
           <a:p>
+            <a:pPr lvl="2"/>
+            <a:r>
+              <a:rPr lang="nl-NL" dirty="0" err="1"/>
+              <a:t>Only</a:t>
+            </a:r>
+            <a:r>
+              <a:rPr lang="nl-NL" dirty="0"/>
+              <a:t> sampling error</a:t>
+            </a:r>
+          </a:p>
+          <a:p>
+            <a:r>
+              <a:rPr lang="nl-NL" dirty="0" err="1"/>
+              <a:t>Nonresponse</a:t>
+            </a:r>
+            <a:r>
+              <a:rPr lang="nl-NL" dirty="0"/>
+              <a:t> </a:t>
+            </a:r>
+            <a:r>
+              <a:rPr lang="nl-NL" dirty="0" err="1"/>
+              <a:t>and</a:t>
+            </a:r>
+            <a:r>
+              <a:rPr lang="nl-NL" dirty="0"/>
+              <a:t> </a:t>
+            </a:r>
+            <a:r>
+              <a:rPr lang="nl-NL" dirty="0" err="1"/>
+              <a:t>coverage</a:t>
+            </a:r>
+            <a:r>
+              <a:rPr lang="nl-NL" dirty="0"/>
+              <a:t> error</a:t>
+            </a:r>
+          </a:p>
+          <a:p>
             <a:pPr lvl="1"/>
             <a:r>
               <a:rPr lang="nl-NL" dirty="0" err="1"/>
-              <a:t>Transportability</a:t>
-            </a:r>
-            <a:r>
-              <a:rPr lang="nl-NL" dirty="0"/>
-              <a:t>: </a:t>
-            </a:r>
-            <a:r>
-              <a:rPr lang="nl-NL" dirty="0" err="1"/>
-              <a:t>composition</a:t>
-            </a:r>
-            <a:r>
-              <a:rPr lang="nl-NL" dirty="0"/>
-              <a:t> of sample </a:t>
-            </a:r>
-          </a:p>
-          <a:p>
-            <a:pPr lvl="2"/>
-            <a:r>
-              <a:rPr lang="nl-NL" dirty="0" err="1"/>
-              <a:t>Not</a:t>
+              <a:t>Weighting</a:t>
             </a:r>
             <a:r>
               <a:rPr lang="nl-NL" dirty="0"/>
@@ -6584,7 +6629,7 @@
             </a:r>
             <a:r>
               <a:rPr lang="nl-NL" dirty="0" err="1"/>
-              <a:t>considered</a:t>
+              <a:t>fixes</a:t>
             </a:r>
             <a:r>
               <a:rPr lang="nl-NL" dirty="0"/>
@@ -6592,27 +6637,55 @@
             </a:r>
             <a:r>
               <a:rPr lang="nl-NL" dirty="0" err="1"/>
-              <a:t>an</a:t>
-            </a:r>
-            <a:r>
-              <a:rPr lang="nl-NL" dirty="0"/>
-              <a:t> issue in </a:t>
-            </a:r>
-            <a:r>
-              <a:rPr lang="nl-NL" dirty="0" err="1"/>
-              <a:t>inference</a:t>
+              <a:t>exchangeabilty</a:t>
             </a:r>
             <a:endParaRPr lang="nl-NL" dirty="0"/>
           </a:p>
           <a:p>
-            <a:pPr lvl="3"/>
-            <a:r>
-              <a:rPr lang="nl-NL" dirty="0"/>
-              <a:t>WEIRD samples</a:t>
-            </a:r>
-          </a:p>
-          <a:p>
-            <a:pPr lvl="3"/>
+            <a:pPr lvl="1"/>
+            <a:r>
+              <a:rPr lang="nl-NL" dirty="0" err="1"/>
+              <a:t>Positivity</a:t>
+            </a:r>
+            <a:r>
+              <a:rPr lang="nl-NL" dirty="0"/>
+              <a:t> </a:t>
+            </a:r>
+            <a:r>
+              <a:rPr lang="nl-NL" dirty="0" err="1"/>
+              <a:t>assumed</a:t>
+            </a:r>
+            <a:r>
+              <a:rPr lang="nl-NL" dirty="0"/>
+              <a:t> (</a:t>
+            </a:r>
+            <a:r>
+              <a:rPr lang="nl-NL" dirty="0" err="1"/>
+              <a:t>subgroups</a:t>
+            </a:r>
+            <a:r>
+              <a:rPr lang="nl-NL" dirty="0"/>
+              <a:t> are </a:t>
+            </a:r>
+            <a:r>
+              <a:rPr lang="nl-NL" dirty="0" err="1"/>
+              <a:t>all</a:t>
+            </a:r>
+            <a:r>
+              <a:rPr lang="nl-NL" dirty="0"/>
+              <a:t> </a:t>
+            </a:r>
+            <a:r>
+              <a:rPr lang="nl-NL" dirty="0" err="1"/>
+              <a:t>there</a:t>
+            </a:r>
+            <a:r>
+              <a:rPr lang="nl-NL" dirty="0"/>
+              <a:t>)</a:t>
+            </a:r>
+          </a:p>
+          <a:p>
+            <a:pPr lvl="1"/>
             <a:endParaRPr lang="nl-NL" dirty="0"/>
           </a:p>
           <a:p>
@@ -6630,7 +6703,7 @@
           <p:cNvPr id="4" name="Tijdelijke aanduiding voor dianummer 3">
             <a:extLst>
               <a:ext uri="{FF2B5EF4-FFF2-40B4-BE49-F238E27FC236}">
-                <a16:creationId xmlns:a16="http://schemas.microsoft.com/office/drawing/2014/main" id="{02638BDD-6C8A-AC4F-BF39-E4FA83F36FB5}"/>
+                <a16:creationId xmlns:a16="http://schemas.microsoft.com/office/drawing/2014/main" id="{198F074E-9AA7-DE45-9FFF-3F6E3C2F0BA3}"/>
               </a:ext>
             </a:extLst>
           </p:cNvPr>
@@ -6657,7 +6730,7 @@
     </p:spTree>
     <p:extLst>
       <p:ext uri="{BB962C8B-B14F-4D97-AF65-F5344CB8AC3E}">
-        <p14:creationId xmlns:p14="http://schemas.microsoft.com/office/powerpoint/2010/main" val="2435279201"/>
+        <p14:creationId xmlns:p14="http://schemas.microsoft.com/office/powerpoint/2010/main" val="3793462857"/>
       </p:ext>
     </p:extLst>
   </p:cSld>
@@ -6711,343 +6784,6 @@
             </a:r>
             <a:r>
               <a:rPr lang="nl-NL" dirty="0"/>
-              <a:t> et al (2018) on </a:t>
-            </a:r>
-            <a:r>
-              <a:rPr lang="nl-NL" dirty="0" err="1"/>
-              <a:t>paradigm</a:t>
-            </a:r>
-            <a:r>
-              <a:rPr lang="nl-NL" dirty="0"/>
-              <a:t> 2</a:t>
-            </a:r>
-          </a:p>
-        </p:txBody>
-      </p:sp>
-      <p:sp>
-        <p:nvSpPr>
-          <p:cNvPr id="3" name="Tijdelijke aanduiding voor inhoud 2">
-            <a:extLst>
-              <a:ext uri="{FF2B5EF4-FFF2-40B4-BE49-F238E27FC236}">
-                <a16:creationId xmlns:a16="http://schemas.microsoft.com/office/drawing/2014/main" id="{E31142F6-7136-F74B-9C89-2133DF197A24}"/>
-              </a:ext>
-            </a:extLst>
-          </p:cNvPr>
-          <p:cNvSpPr>
-            <a:spLocks noGrp="1"/>
-          </p:cNvSpPr>
-          <p:nvPr>
-            <p:ph idx="1"/>
-          </p:nvPr>
-        </p:nvSpPr>
-        <p:spPr/>
-        <p:txBody>
-          <a:bodyPr>
-            <a:normAutofit lnSpcReduction="10000"/>
-          </a:bodyPr>
-          <a:lstStyle/>
-          <a:p>
-            <a:r>
-              <a:rPr lang="nl-NL" dirty="0"/>
-              <a:t>Design-</a:t>
-            </a:r>
-            <a:r>
-              <a:rPr lang="nl-NL" dirty="0" err="1"/>
-              <a:t>based</a:t>
-            </a:r>
-            <a:r>
-              <a:rPr lang="nl-NL" dirty="0"/>
-              <a:t> </a:t>
-            </a:r>
-            <a:r>
-              <a:rPr lang="nl-NL" dirty="0" err="1"/>
-              <a:t>surveys</a:t>
-            </a:r>
-            <a:endParaRPr lang="nl-NL" dirty="0"/>
-          </a:p>
-          <a:p>
-            <a:pPr lvl="1"/>
-            <a:r>
-              <a:rPr lang="nl-NL" dirty="0"/>
-              <a:t>Random samples leads </a:t>
-            </a:r>
-            <a:r>
-              <a:rPr lang="nl-NL" dirty="0" err="1"/>
-              <a:t>to</a:t>
-            </a:r>
-            <a:r>
-              <a:rPr lang="nl-NL" dirty="0"/>
-              <a:t> </a:t>
-            </a:r>
-            <a:r>
-              <a:rPr lang="nl-NL" dirty="0" err="1"/>
-              <a:t>ignorability</a:t>
-            </a:r>
-            <a:endParaRPr lang="nl-NL" dirty="0"/>
-          </a:p>
-          <a:p>
-            <a:pPr lvl="2"/>
-            <a:r>
-              <a:rPr lang="nl-NL" dirty="0" err="1"/>
-              <a:t>Exchangeability</a:t>
-            </a:r>
-            <a:r>
-              <a:rPr lang="nl-NL" dirty="0"/>
-              <a:t> </a:t>
-            </a:r>
-            <a:r>
-              <a:rPr lang="nl-NL" dirty="0" err="1">
-                <a:solidFill>
-                  <a:srgbClr val="FF0000"/>
-                </a:solidFill>
-              </a:rPr>
-              <a:t>and</a:t>
-            </a:r>
-            <a:endParaRPr lang="nl-NL" dirty="0">
-              <a:solidFill>
-                <a:srgbClr val="FF0000"/>
-              </a:solidFill>
-            </a:endParaRPr>
-          </a:p>
-          <a:p>
-            <a:pPr lvl="2"/>
-            <a:r>
-              <a:rPr lang="nl-NL" dirty="0" err="1"/>
-              <a:t>Positivity</a:t>
-            </a:r>
-            <a:r>
-              <a:rPr lang="nl-NL" dirty="0"/>
-              <a:t> </a:t>
-            </a:r>
-          </a:p>
-          <a:p>
-            <a:pPr lvl="1"/>
-            <a:r>
-              <a:rPr lang="nl-NL" dirty="0" err="1"/>
-              <a:t>And</a:t>
-            </a:r>
-            <a:r>
-              <a:rPr lang="nl-NL" dirty="0"/>
-              <a:t> </a:t>
-            </a:r>
-            <a:r>
-              <a:rPr lang="nl-NL" dirty="0" err="1"/>
-              <a:t>to</a:t>
-            </a:r>
-            <a:r>
-              <a:rPr lang="nl-NL" dirty="0"/>
-              <a:t> </a:t>
-            </a:r>
-            <a:r>
-              <a:rPr lang="nl-NL" dirty="0" err="1"/>
-              <a:t>transportability</a:t>
-            </a:r>
-            <a:endParaRPr lang="nl-NL" dirty="0"/>
-          </a:p>
-          <a:p>
-            <a:pPr lvl="2"/>
-            <a:r>
-              <a:rPr lang="nl-NL" dirty="0" err="1"/>
-              <a:t>Only</a:t>
-            </a:r>
-            <a:r>
-              <a:rPr lang="nl-NL" dirty="0"/>
-              <a:t> sampling error</a:t>
-            </a:r>
-          </a:p>
-          <a:p>
-            <a:r>
-              <a:rPr lang="nl-NL" dirty="0" err="1"/>
-              <a:t>Nonresponse</a:t>
-            </a:r>
-            <a:r>
-              <a:rPr lang="nl-NL" dirty="0"/>
-              <a:t> </a:t>
-            </a:r>
-            <a:r>
-              <a:rPr lang="nl-NL" dirty="0" err="1"/>
-              <a:t>and</a:t>
-            </a:r>
-            <a:r>
-              <a:rPr lang="nl-NL" dirty="0"/>
-              <a:t> </a:t>
-            </a:r>
-            <a:r>
-              <a:rPr lang="nl-NL" dirty="0" err="1"/>
-              <a:t>coverage</a:t>
-            </a:r>
-            <a:r>
-              <a:rPr lang="nl-NL" dirty="0"/>
-              <a:t> error</a:t>
-            </a:r>
-          </a:p>
-          <a:p>
-            <a:pPr lvl="1"/>
-            <a:r>
-              <a:rPr lang="nl-NL" dirty="0" err="1"/>
-              <a:t>Weighting</a:t>
-            </a:r>
-            <a:r>
-              <a:rPr lang="nl-NL" dirty="0"/>
-              <a:t> </a:t>
-            </a:r>
-            <a:r>
-              <a:rPr lang="nl-NL" dirty="0" err="1"/>
-              <a:t>fixes</a:t>
-            </a:r>
-            <a:r>
-              <a:rPr lang="nl-NL" dirty="0"/>
-              <a:t> </a:t>
-            </a:r>
-            <a:r>
-              <a:rPr lang="nl-NL" dirty="0" err="1"/>
-              <a:t>exchangeabilty</a:t>
-            </a:r>
-            <a:endParaRPr lang="nl-NL" dirty="0"/>
-          </a:p>
-          <a:p>
-            <a:pPr lvl="1"/>
-            <a:r>
-              <a:rPr lang="nl-NL" dirty="0" err="1"/>
-              <a:t>Positivity</a:t>
-            </a:r>
-            <a:r>
-              <a:rPr lang="nl-NL" dirty="0"/>
-              <a:t> </a:t>
-            </a:r>
-            <a:r>
-              <a:rPr lang="nl-NL" dirty="0" err="1"/>
-              <a:t>assumed</a:t>
-            </a:r>
-            <a:r>
-              <a:rPr lang="nl-NL" dirty="0"/>
-              <a:t> (</a:t>
-            </a:r>
-            <a:r>
-              <a:rPr lang="nl-NL" dirty="0" err="1"/>
-              <a:t>subgroups</a:t>
-            </a:r>
-            <a:r>
-              <a:rPr lang="nl-NL" dirty="0"/>
-              <a:t> are </a:t>
-            </a:r>
-            <a:r>
-              <a:rPr lang="nl-NL" dirty="0" err="1"/>
-              <a:t>all</a:t>
-            </a:r>
-            <a:r>
-              <a:rPr lang="nl-NL" dirty="0"/>
-              <a:t> </a:t>
-            </a:r>
-            <a:r>
-              <a:rPr lang="nl-NL" dirty="0" err="1"/>
-              <a:t>there</a:t>
-            </a:r>
-            <a:r>
-              <a:rPr lang="nl-NL" dirty="0"/>
-              <a:t>)</a:t>
-            </a:r>
-          </a:p>
-          <a:p>
-            <a:pPr lvl="1"/>
-            <a:endParaRPr lang="nl-NL" dirty="0"/>
-          </a:p>
-          <a:p>
-            <a:pPr lvl="1"/>
-            <a:endParaRPr lang="nl-NL" dirty="0"/>
-          </a:p>
-          <a:p>
-            <a:pPr lvl="1"/>
-            <a:endParaRPr lang="nl-NL" dirty="0"/>
-          </a:p>
-        </p:txBody>
-      </p:sp>
-      <p:sp>
-        <p:nvSpPr>
-          <p:cNvPr id="4" name="Tijdelijke aanduiding voor dianummer 3">
-            <a:extLst>
-              <a:ext uri="{FF2B5EF4-FFF2-40B4-BE49-F238E27FC236}">
-                <a16:creationId xmlns:a16="http://schemas.microsoft.com/office/drawing/2014/main" id="{198F074E-9AA7-DE45-9FFF-3F6E3C2F0BA3}"/>
-              </a:ext>
-            </a:extLst>
-          </p:cNvPr>
-          <p:cNvSpPr>
-            <a:spLocks noGrp="1"/>
-          </p:cNvSpPr>
-          <p:nvPr>
-            <p:ph type="sldNum" sz="quarter" idx="12"/>
-          </p:nvPr>
-        </p:nvSpPr>
-        <p:spPr/>
-        <p:txBody>
-          <a:bodyPr/>
-          <a:lstStyle/>
-          <a:p>
-            <a:fld id="{DBA3E7B4-B031-428C-A875-F1315D524DB8}" type="slidenum">
-              <a:rPr lang="nl-NL" smtClean="0"/>
-              <a:t>16</a:t>
-            </a:fld>
-            <a:endParaRPr lang="nl-NL"/>
-          </a:p>
-        </p:txBody>
-      </p:sp>
-    </p:spTree>
-    <p:extLst>
-      <p:ext uri="{BB962C8B-B14F-4D97-AF65-F5344CB8AC3E}">
-        <p14:creationId xmlns:p14="http://schemas.microsoft.com/office/powerpoint/2010/main" val="3793462857"/>
-      </p:ext>
-    </p:extLst>
-  </p:cSld>
-  <p:clrMapOvr>
-    <a:masterClrMapping/>
-  </p:clrMapOvr>
-</p:sld>
-</file>
-
-<file path=ppt/slides/slide17.xml><?xml version="1.0" encoding="utf-8"?>
-<p:sld xmlns:a="http://schemas.openxmlformats.org/drawingml/2006/main" xmlns:r="http://schemas.openxmlformats.org/officeDocument/2006/relationships" xmlns:p="http://schemas.openxmlformats.org/presentationml/2006/main">
-  <p:cSld>
-    <p:spTree>
-      <p:nvGrpSpPr>
-        <p:cNvPr id="1" name=""/>
-        <p:cNvGrpSpPr/>
-        <p:nvPr/>
-      </p:nvGrpSpPr>
-      <p:grpSpPr>
-        <a:xfrm>
-          <a:off x="0" y="0"/>
-          <a:ext cx="0" cy="0"/>
-          <a:chOff x="0" y="0"/>
-          <a:chExt cx="0" cy="0"/>
-        </a:xfrm>
-      </p:grpSpPr>
-      <p:sp>
-        <p:nvSpPr>
-          <p:cNvPr id="2" name="Titel 1">
-            <a:extLst>
-              <a:ext uri="{FF2B5EF4-FFF2-40B4-BE49-F238E27FC236}">
-                <a16:creationId xmlns:a16="http://schemas.microsoft.com/office/drawing/2014/main" id="{EA39CBEB-3613-D243-8D99-5C5CBB63FA18}"/>
-              </a:ext>
-            </a:extLst>
-          </p:cNvPr>
-          <p:cNvSpPr>
-            <a:spLocks noGrp="1"/>
-          </p:cNvSpPr>
-          <p:nvPr>
-            <p:ph type="title"/>
-          </p:nvPr>
-        </p:nvSpPr>
-        <p:spPr/>
-        <p:txBody>
-          <a:bodyPr/>
-          <a:lstStyle/>
-          <a:p>
-            <a:r>
-              <a:rPr lang="nl-NL" dirty="0" err="1"/>
-              <a:t>Mercer</a:t>
-            </a:r>
-            <a:r>
-              <a:rPr lang="nl-NL" dirty="0"/>
               <a:t> et al (2018)</a:t>
             </a:r>
           </a:p>
@@ -7267,7 +7003,7 @@
           <a:p>
             <a:fld id="{DBA3E7B4-B031-428C-A875-F1315D524DB8}" type="slidenum">
               <a:rPr lang="nl-NL" smtClean="0"/>
-              <a:t>17</a:t>
+              <a:t>16</a:t>
             </a:fld>
             <a:endParaRPr lang="nl-NL"/>
           </a:p>
@@ -7286,7 +7022,7 @@
 </p:sld>
 </file>
 
-<file path=ppt/slides/slide18.xml><?xml version="1.0" encoding="utf-8"?>
+<file path=ppt/slides/slide17.xml><?xml version="1.0" encoding="utf-8"?>
 <p:sld xmlns:a="http://schemas.openxmlformats.org/drawingml/2006/main" xmlns:r="http://schemas.openxmlformats.org/officeDocument/2006/relationships" xmlns:p="http://schemas.openxmlformats.org/presentationml/2006/main">
   <p:cSld>
     <p:spTree>
@@ -7661,7 +7397,7 @@
           <a:p>
             <a:fld id="{DBA3E7B4-B031-428C-A875-F1315D524DB8}" type="slidenum">
               <a:rPr lang="nl-NL" smtClean="0"/>
-              <a:t>18</a:t>
+              <a:t>17</a:t>
             </a:fld>
             <a:endParaRPr lang="nl-NL"/>
           </a:p>
@@ -7680,7 +7416,7 @@
 </p:sld>
 </file>
 
-<file path=ppt/slides/slide19.xml><?xml version="1.0" encoding="utf-8"?>
+<file path=ppt/slides/slide18.xml><?xml version="1.0" encoding="utf-8"?>
 <p:sld xmlns:a="http://schemas.openxmlformats.org/drawingml/2006/main" xmlns:r="http://schemas.openxmlformats.org/officeDocument/2006/relationships" xmlns:p="http://schemas.openxmlformats.org/presentationml/2006/main">
   <p:cSld>
     <p:spTree>
@@ -7807,7 +7543,7 @@
           <a:p>
             <a:fld id="{DBA3E7B4-B031-428C-A875-F1315D524DB8}" type="slidenum">
               <a:rPr lang="nl-NL" smtClean="0"/>
-              <a:t>19</a:t>
+              <a:t>18</a:t>
             </a:fld>
             <a:endParaRPr lang="nl-NL"/>
           </a:p>
@@ -7856,173 +7592,7 @@
 </p:sld>
 </file>
 
-<file path=ppt/slides/slide2.xml><?xml version="1.0" encoding="utf-8"?>
-<p:sld xmlns:a="http://schemas.openxmlformats.org/drawingml/2006/main" xmlns:r="http://schemas.openxmlformats.org/officeDocument/2006/relationships" xmlns:p="http://schemas.openxmlformats.org/presentationml/2006/main">
-  <p:cSld>
-    <p:spTree>
-      <p:nvGrpSpPr>
-        <p:cNvPr id="1" name=""/>
-        <p:cNvGrpSpPr/>
-        <p:nvPr/>
-      </p:nvGrpSpPr>
-      <p:grpSpPr>
-        <a:xfrm>
-          <a:off x="0" y="0"/>
-          <a:ext cx="0" cy="0"/>
-          <a:chOff x="0" y="0"/>
-          <a:chExt cx="0" cy="0"/>
-        </a:xfrm>
-      </p:grpSpPr>
-      <p:sp>
-        <p:nvSpPr>
-          <p:cNvPr id="2" name="Titel 1"/>
-          <p:cNvSpPr>
-            <a:spLocks noGrp="1"/>
-          </p:cNvSpPr>
-          <p:nvPr>
-            <p:ph type="title"/>
-          </p:nvPr>
-        </p:nvSpPr>
-        <p:spPr/>
-        <p:txBody>
-          <a:bodyPr/>
-          <a:lstStyle/>
-          <a:p>
-            <a:r>
-              <a:rPr lang="nl-NL" dirty="0" err="1"/>
-              <a:t>Today</a:t>
-            </a:r>
-            <a:endParaRPr lang="nl-NL" dirty="0"/>
-          </a:p>
-        </p:txBody>
-      </p:sp>
-      <p:sp>
-        <p:nvSpPr>
-          <p:cNvPr id="3" name="Tijdelijke aanduiding voor inhoud 2"/>
-          <p:cNvSpPr>
-            <a:spLocks noGrp="1"/>
-          </p:cNvSpPr>
-          <p:nvPr>
-            <p:ph idx="1"/>
-          </p:nvPr>
-        </p:nvSpPr>
-        <p:spPr/>
-        <p:txBody>
-          <a:bodyPr/>
-          <a:lstStyle/>
-          <a:p>
-            <a:r>
-              <a:rPr lang="nl-NL" dirty="0" err="1"/>
-              <a:t>Questions</a:t>
-            </a:r>
-            <a:r>
-              <a:rPr lang="nl-NL" dirty="0"/>
-              <a:t> </a:t>
-            </a:r>
-            <a:r>
-              <a:rPr lang="nl-NL" dirty="0" err="1"/>
-              <a:t>about</a:t>
-            </a:r>
-            <a:r>
-              <a:rPr lang="nl-NL" dirty="0"/>
-              <a:t> </a:t>
-            </a:r>
-            <a:r>
-              <a:rPr lang="nl-NL" dirty="0" err="1"/>
-              <a:t>assignment</a:t>
-            </a:r>
-            <a:r>
-              <a:rPr lang="nl-NL" dirty="0"/>
-              <a:t> 2</a:t>
-            </a:r>
-          </a:p>
-          <a:p>
-            <a:r>
-              <a:rPr lang="nl-NL" dirty="0"/>
-              <a:t>Group </a:t>
-            </a:r>
-            <a:r>
-              <a:rPr lang="nl-NL" dirty="0" err="1"/>
-              <a:t>assignment</a:t>
-            </a:r>
-            <a:endParaRPr lang="nl-NL" dirty="0"/>
-          </a:p>
-          <a:p>
-            <a:endParaRPr lang="nl-NL" dirty="0"/>
-          </a:p>
-          <a:p>
-            <a:r>
-              <a:rPr lang="nl-NL" dirty="0" err="1"/>
-              <a:t>Lecture</a:t>
-            </a:r>
-            <a:r>
-              <a:rPr lang="nl-NL" dirty="0"/>
-              <a:t> </a:t>
-            </a:r>
-          </a:p>
-          <a:p>
-            <a:r>
-              <a:rPr lang="nl-NL" dirty="0" err="1"/>
-              <a:t>Inference</a:t>
-            </a:r>
-            <a:r>
-              <a:rPr lang="nl-NL" dirty="0"/>
-              <a:t> ‘</a:t>
-            </a:r>
-            <a:r>
-              <a:rPr lang="nl-NL" dirty="0" err="1"/>
-              <a:t>competition</a:t>
-            </a:r>
-            <a:r>
-              <a:rPr lang="nl-NL" dirty="0"/>
-              <a:t>’</a:t>
-            </a:r>
-          </a:p>
-        </p:txBody>
-      </p:sp>
-      <p:sp>
-        <p:nvSpPr>
-          <p:cNvPr id="4" name="Tijdelijke aanduiding voor dianummer 3">
-            <a:extLst>
-              <a:ext uri="{FF2B5EF4-FFF2-40B4-BE49-F238E27FC236}">
-                <a16:creationId xmlns:a16="http://schemas.microsoft.com/office/drawing/2014/main" id="{5378D171-E5CC-9D43-A5CC-A3D135B7A4E7}"/>
-              </a:ext>
-            </a:extLst>
-          </p:cNvPr>
-          <p:cNvSpPr>
-            <a:spLocks noGrp="1"/>
-          </p:cNvSpPr>
-          <p:nvPr>
-            <p:ph type="sldNum" sz="quarter" idx="12"/>
-          </p:nvPr>
-        </p:nvSpPr>
-        <p:spPr/>
-        <p:txBody>
-          <a:bodyPr/>
-          <a:lstStyle/>
-          <a:p>
-            <a:fld id="{DBA3E7B4-B031-428C-A875-F1315D524DB8}" type="slidenum">
-              <a:rPr lang="nl-NL" smtClean="0"/>
-              <a:t>2</a:t>
-            </a:fld>
-            <a:endParaRPr lang="nl-NL"/>
-          </a:p>
-        </p:txBody>
-      </p:sp>
-    </p:spTree>
-    <p:extLst>
-      <p:ext uri="{BB962C8B-B14F-4D97-AF65-F5344CB8AC3E}">
-        <p14:creationId xmlns:p14="http://schemas.microsoft.com/office/powerpoint/2010/main" val="1843718492"/>
-      </p:ext>
-    </p:extLst>
-  </p:cSld>
-  <p:clrMapOvr>
-    <a:masterClrMapping/>
-  </p:clrMapOvr>
-</p:sld>
-</file>
-
-<file path=ppt/slides/slide20.xml><?xml version="1.0" encoding="utf-8"?>
+<file path=ppt/slides/slide19.xml><?xml version="1.0" encoding="utf-8"?>
 <p:sld xmlns:a="http://schemas.openxmlformats.org/drawingml/2006/main" xmlns:r="http://schemas.openxmlformats.org/officeDocument/2006/relationships" xmlns:p="http://schemas.openxmlformats.org/presentationml/2006/main">
   <p:cSld>
     <p:spTree>
@@ -8385,7 +7955,7 @@
           <a:p>
             <a:fld id="{DBA3E7B4-B031-428C-A875-F1315D524DB8}" type="slidenum">
               <a:rPr lang="nl-NL" smtClean="0"/>
-              <a:t>20</a:t>
+              <a:t>19</a:t>
             </a:fld>
             <a:endParaRPr lang="nl-NL"/>
           </a:p>
@@ -8404,7 +7974,147 @@
 </p:sld>
 </file>
 
-<file path=ppt/slides/slide21.xml><?xml version="1.0" encoding="utf-8"?>
+<file path=ppt/slides/slide2.xml><?xml version="1.0" encoding="utf-8"?>
+<p:sld xmlns:a="http://schemas.openxmlformats.org/drawingml/2006/main" xmlns:r="http://schemas.openxmlformats.org/officeDocument/2006/relationships" xmlns:p="http://schemas.openxmlformats.org/presentationml/2006/main">
+  <p:cSld>
+    <p:spTree>
+      <p:nvGrpSpPr>
+        <p:cNvPr id="1" name=""/>
+        <p:cNvGrpSpPr/>
+        <p:nvPr/>
+      </p:nvGrpSpPr>
+      <p:grpSpPr>
+        <a:xfrm>
+          <a:off x="0" y="0"/>
+          <a:ext cx="0" cy="0"/>
+          <a:chOff x="0" y="0"/>
+          <a:chExt cx="0" cy="0"/>
+        </a:xfrm>
+      </p:grpSpPr>
+      <p:sp>
+        <p:nvSpPr>
+          <p:cNvPr id="2" name="Titel 1"/>
+          <p:cNvSpPr>
+            <a:spLocks noGrp="1"/>
+          </p:cNvSpPr>
+          <p:nvPr>
+            <p:ph type="title"/>
+          </p:nvPr>
+        </p:nvSpPr>
+        <p:spPr/>
+        <p:txBody>
+          <a:bodyPr/>
+          <a:lstStyle/>
+          <a:p>
+            <a:r>
+              <a:rPr lang="nl-NL" dirty="0" err="1"/>
+              <a:t>Today</a:t>
+            </a:r>
+            <a:endParaRPr lang="nl-NL" dirty="0"/>
+          </a:p>
+        </p:txBody>
+      </p:sp>
+      <p:sp>
+        <p:nvSpPr>
+          <p:cNvPr id="3" name="Tijdelijke aanduiding voor inhoud 2"/>
+          <p:cNvSpPr>
+            <a:spLocks noGrp="1"/>
+          </p:cNvSpPr>
+          <p:nvPr>
+            <p:ph idx="1"/>
+          </p:nvPr>
+        </p:nvSpPr>
+        <p:spPr/>
+        <p:txBody>
+          <a:bodyPr/>
+          <a:lstStyle/>
+          <a:p>
+            <a:r>
+              <a:rPr lang="nl-NL" dirty="0"/>
+              <a:t>Group </a:t>
+            </a:r>
+            <a:r>
+              <a:rPr lang="nl-NL" dirty="0" err="1"/>
+              <a:t>assignment</a:t>
+            </a:r>
+            <a:endParaRPr lang="nl-NL" dirty="0"/>
+          </a:p>
+          <a:p>
+            <a:endParaRPr lang="nl-NL" dirty="0"/>
+          </a:p>
+          <a:p>
+            <a:r>
+              <a:rPr lang="nl-NL" dirty="0" err="1"/>
+              <a:t>Lecture</a:t>
+            </a:r>
+            <a:r>
+              <a:rPr lang="nl-NL" dirty="0"/>
+              <a:t> </a:t>
+            </a:r>
+          </a:p>
+          <a:p>
+            <a:r>
+              <a:rPr lang="nl-NL" dirty="0" err="1"/>
+              <a:t>Inference</a:t>
+            </a:r>
+            <a:r>
+              <a:rPr lang="nl-NL" dirty="0"/>
+              <a:t> ‘</a:t>
+            </a:r>
+            <a:r>
+              <a:rPr lang="nl-NL" dirty="0" err="1"/>
+              <a:t>competition</a:t>
+            </a:r>
+            <a:r>
+              <a:rPr lang="nl-NL" dirty="0"/>
+              <a:t>’</a:t>
+            </a:r>
+          </a:p>
+        </p:txBody>
+      </p:sp>
+      <p:sp>
+        <p:nvSpPr>
+          <p:cNvPr id="4" name="Tijdelijke aanduiding voor dianummer 3">
+            <a:extLst>
+              <a:ext uri="{FF2B5EF4-FFF2-40B4-BE49-F238E27FC236}">
+                <a16:creationId xmlns:a16="http://schemas.microsoft.com/office/drawing/2014/main" id="{5378D171-E5CC-9D43-A5CC-A3D135B7A4E7}"/>
+              </a:ext>
+            </a:extLst>
+          </p:cNvPr>
+          <p:cNvSpPr>
+            <a:spLocks noGrp="1"/>
+          </p:cNvSpPr>
+          <p:nvPr>
+            <p:ph type="sldNum" sz="quarter" idx="12"/>
+          </p:nvPr>
+        </p:nvSpPr>
+        <p:spPr/>
+        <p:txBody>
+          <a:bodyPr/>
+          <a:lstStyle/>
+          <a:p>
+            <a:fld id="{DBA3E7B4-B031-428C-A875-F1315D524DB8}" type="slidenum">
+              <a:rPr lang="nl-NL" smtClean="0"/>
+              <a:t>2</a:t>
+            </a:fld>
+            <a:endParaRPr lang="nl-NL"/>
+          </a:p>
+        </p:txBody>
+      </p:sp>
+    </p:spTree>
+    <p:extLst>
+      <p:ext uri="{BB962C8B-B14F-4D97-AF65-F5344CB8AC3E}">
+        <p14:creationId xmlns:p14="http://schemas.microsoft.com/office/powerpoint/2010/main" val="1843718492"/>
+      </p:ext>
+    </p:extLst>
+  </p:cSld>
+  <p:clrMapOvr>
+    <a:masterClrMapping/>
+  </p:clrMapOvr>
+</p:sld>
+</file>
+
+<file path=ppt/slides/slide20.xml><?xml version="1.0" encoding="utf-8"?>
 <p:sld xmlns:a="http://schemas.openxmlformats.org/drawingml/2006/main" xmlns:r="http://schemas.openxmlformats.org/officeDocument/2006/relationships" xmlns:p="http://schemas.openxmlformats.org/presentationml/2006/main">
   <p:cSld>
     <p:spTree>
@@ -8788,7 +8498,7 @@
           <a:p>
             <a:fld id="{DBA3E7B4-B031-428C-A875-F1315D524DB8}" type="slidenum">
               <a:rPr lang="nl-NL" smtClean="0"/>
-              <a:t>21</a:t>
+              <a:t>20</a:t>
             </a:fld>
             <a:endParaRPr lang="nl-NL"/>
           </a:p>
@@ -8798,6 +8508,119 @@
     <p:extLst>
       <p:ext uri="{BB962C8B-B14F-4D97-AF65-F5344CB8AC3E}">
         <p14:creationId xmlns:p14="http://schemas.microsoft.com/office/powerpoint/2010/main" val="3395398890"/>
+      </p:ext>
+    </p:extLst>
+  </p:cSld>
+  <p:clrMapOvr>
+    <a:masterClrMapping/>
+  </p:clrMapOvr>
+</p:sld>
+</file>
+
+<file path=ppt/slides/slide21.xml><?xml version="1.0" encoding="utf-8"?>
+<p:sld xmlns:a="http://schemas.openxmlformats.org/drawingml/2006/main" xmlns:r="http://schemas.openxmlformats.org/officeDocument/2006/relationships" xmlns:p="http://schemas.openxmlformats.org/presentationml/2006/main">
+  <p:cSld>
+    <p:spTree>
+      <p:nvGrpSpPr>
+        <p:cNvPr id="1" name=""/>
+        <p:cNvGrpSpPr/>
+        <p:nvPr/>
+      </p:nvGrpSpPr>
+      <p:grpSpPr>
+        <a:xfrm>
+          <a:off x="0" y="0"/>
+          <a:ext cx="0" cy="0"/>
+          <a:chOff x="0" y="0"/>
+          <a:chExt cx="0" cy="0"/>
+        </a:xfrm>
+      </p:grpSpPr>
+      <p:sp>
+        <p:nvSpPr>
+          <p:cNvPr id="2" name="Title 1">
+            <a:extLst>
+              <a:ext uri="{FF2B5EF4-FFF2-40B4-BE49-F238E27FC236}">
+                <a16:creationId xmlns:a16="http://schemas.microsoft.com/office/drawing/2014/main" id="{E98ABDD5-BD32-2220-166B-88B4D9D1FAC2}"/>
+              </a:ext>
+            </a:extLst>
+          </p:cNvPr>
+          <p:cNvSpPr>
+            <a:spLocks noGrp="1"/>
+          </p:cNvSpPr>
+          <p:nvPr>
+            <p:ph type="title"/>
+          </p:nvPr>
+        </p:nvSpPr>
+        <p:spPr/>
+        <p:txBody>
+          <a:bodyPr/>
+          <a:lstStyle/>
+          <a:p>
+            <a:r>
+              <a:rPr lang="en-US" dirty="0"/>
+              <a:t>Valliant</a:t>
+            </a:r>
+            <a:endParaRPr lang="nl-NL" dirty="0"/>
+          </a:p>
+        </p:txBody>
+      </p:sp>
+      <p:sp>
+        <p:nvSpPr>
+          <p:cNvPr id="3" name="Content Placeholder 2">
+            <a:extLst>
+              <a:ext uri="{FF2B5EF4-FFF2-40B4-BE49-F238E27FC236}">
+                <a16:creationId xmlns:a16="http://schemas.microsoft.com/office/drawing/2014/main" id="{DE9AB466-4690-609B-E4C1-0D615E5B7189}"/>
+              </a:ext>
+            </a:extLst>
+          </p:cNvPr>
+          <p:cNvSpPr>
+            <a:spLocks noGrp="1"/>
+          </p:cNvSpPr>
+          <p:nvPr>
+            <p:ph idx="1"/>
+          </p:nvPr>
+        </p:nvSpPr>
+        <p:spPr/>
+        <p:txBody>
+          <a:bodyPr/>
+          <a:lstStyle/>
+          <a:p>
+            <a:endParaRPr lang="nl-NL"/>
+          </a:p>
+        </p:txBody>
+      </p:sp>
+      <p:sp>
+        <p:nvSpPr>
+          <p:cNvPr id="4" name="Slide Number Placeholder 3">
+            <a:extLst>
+              <a:ext uri="{FF2B5EF4-FFF2-40B4-BE49-F238E27FC236}">
+                <a16:creationId xmlns:a16="http://schemas.microsoft.com/office/drawing/2014/main" id="{4F2D004E-FFF0-8DDC-8536-CBB2A2FBCFB1}"/>
+              </a:ext>
+            </a:extLst>
+          </p:cNvPr>
+          <p:cNvSpPr>
+            <a:spLocks noGrp="1"/>
+          </p:cNvSpPr>
+          <p:nvPr>
+            <p:ph type="sldNum" sz="quarter" idx="12"/>
+          </p:nvPr>
+        </p:nvSpPr>
+        <p:spPr/>
+        <p:txBody>
+          <a:bodyPr/>
+          <a:lstStyle/>
+          <a:p>
+            <a:fld id="{DBA3E7B4-B031-428C-A875-F1315D524DB8}" type="slidenum">
+              <a:rPr lang="nl-NL" smtClean="0"/>
+              <a:t>21</a:t>
+            </a:fld>
+            <a:endParaRPr lang="nl-NL"/>
+          </a:p>
+        </p:txBody>
+      </p:sp>
+    </p:spTree>
+    <p:extLst>
+      <p:ext uri="{BB962C8B-B14F-4D97-AF65-F5344CB8AC3E}">
+        <p14:creationId xmlns:p14="http://schemas.microsoft.com/office/powerpoint/2010/main" val="3222404565"/>
       </p:ext>
     </p:extLst>
   </p:cSld>
@@ -9250,7 +9073,23 @@
             <a:pPr lvl="1"/>
             <a:r>
               <a:rPr lang="nl-NL" dirty="0"/>
-              <a:t>Pseudo design </a:t>
+              <a:t>Quasi-</a:t>
+            </a:r>
+            <a:r>
+              <a:rPr lang="nl-NL" dirty="0" err="1"/>
+              <a:t>randomisation</a:t>
+            </a:r>
+            <a:r>
+              <a:rPr lang="nl-NL" dirty="0"/>
+              <a:t> (</a:t>
+            </a:r>
+            <a:r>
+              <a:rPr lang="nl-NL" dirty="0" err="1"/>
+              <a:t>aka</a:t>
+            </a:r>
+            <a:r>
+              <a:rPr lang="nl-NL" dirty="0"/>
+              <a:t> Pseudo design </a:t>
             </a:r>
             <a:r>
               <a:rPr lang="nl-NL" dirty="0" err="1"/>
@@ -9266,7 +9105,7 @@
             </a:r>
             <a:r>
               <a:rPr lang="nl-NL" dirty="0"/>
-              <a:t> (Elliott &amp; </a:t>
+              <a:t>) (Elliott &amp; </a:t>
             </a:r>
             <a:r>
               <a:rPr lang="nl-NL" dirty="0" err="1"/>
@@ -9300,6 +9139,33 @@
             <a:pPr lvl="1"/>
             <a:r>
               <a:rPr lang="nl-NL" dirty="0" err="1"/>
+              <a:t>Superpopulation</a:t>
+            </a:r>
+            <a:r>
+              <a:rPr lang="nl-NL" dirty="0"/>
+              <a:t> </a:t>
+            </a:r>
+            <a:r>
+              <a:rPr lang="nl-NL" dirty="0" err="1"/>
+              <a:t>modeling</a:t>
+            </a:r>
+            <a:r>
+              <a:rPr lang="nl-NL" dirty="0"/>
+              <a:t> (e.g. Elliott &amp; </a:t>
+            </a:r>
+            <a:r>
+              <a:rPr lang="nl-NL" dirty="0" err="1"/>
+              <a:t>Valliant</a:t>
+            </a:r>
+            <a:r>
+              <a:rPr lang="nl-NL" dirty="0"/>
+              <a:t>, 2020)</a:t>
+            </a:r>
+          </a:p>
+          <a:p>
+            <a:pPr lvl="2"/>
+            <a:r>
+              <a:rPr lang="nl-NL" dirty="0" err="1"/>
               <a:t>Calibration</a:t>
             </a:r>
             <a:r>
@@ -9326,33 +9192,6 @@
               <a:t>probability</a:t>
             </a:r>
             <a:endParaRPr lang="nl-NL" dirty="0"/>
-          </a:p>
-          <a:p>
-            <a:pPr lvl="1"/>
-            <a:r>
-              <a:rPr lang="nl-NL" dirty="0" err="1"/>
-              <a:t>Superpopulation</a:t>
-            </a:r>
-            <a:r>
-              <a:rPr lang="nl-NL" dirty="0"/>
-              <a:t> </a:t>
-            </a:r>
-            <a:r>
-              <a:rPr lang="nl-NL" dirty="0" err="1"/>
-              <a:t>modeling</a:t>
-            </a:r>
-            <a:r>
-              <a:rPr lang="nl-NL" dirty="0"/>
-              <a:t> (e.g. Elliott &amp; </a:t>
-            </a:r>
-            <a:r>
-              <a:rPr lang="nl-NL" dirty="0" err="1"/>
-              <a:t>Valliant</a:t>
-            </a:r>
-            <a:r>
-              <a:rPr lang="nl-NL" dirty="0"/>
-              <a:t>, 2020)</a:t>
-            </a:r>
           </a:p>
           <a:p>
             <a:pPr lvl="1"/>
@@ -9531,16 +9370,18 @@
         </p:nvSpPr>
         <p:spPr/>
         <p:txBody>
-          <a:bodyPr/>
+          <a:bodyPr>
+            <a:normAutofit/>
+          </a:bodyPr>
           <a:lstStyle/>
           <a:p>
             <a:r>
               <a:rPr lang="nl-NL" dirty="0"/>
-              <a:t>1. Pseudo design </a:t>
-            </a:r>
-            <a:r>
-              <a:rPr lang="nl-NL" dirty="0" err="1"/>
-              <a:t>based</a:t>
+              <a:t>1. Quasi-</a:t>
+            </a:r>
+            <a:r>
+              <a:rPr lang="nl-NL" dirty="0" err="1"/>
+              <a:t>randomisation</a:t>
             </a:r>
             <a:r>
               <a:rPr lang="nl-NL" dirty="0"/>
@@ -11036,11 +10877,11 @@
           <a:p>
             <a:r>
               <a:rPr lang="nl-NL" dirty="0"/>
-              <a:t>1.Pseudo design </a:t>
-            </a:r>
-            <a:r>
-              <a:rPr lang="nl-NL" dirty="0" err="1"/>
-              <a:t>based</a:t>
+              <a:t>1. Quasi-</a:t>
+            </a:r>
+            <a:r>
+              <a:rPr lang="nl-NL" dirty="0" err="1"/>
+              <a:t>randomisation</a:t>
             </a:r>
             <a:endParaRPr lang="nl-NL" dirty="0"/>
           </a:p>
@@ -13540,11 +13381,11 @@
           <a:p>
             <a:r>
               <a:rPr lang="nl-NL" dirty="0"/>
-              <a:t>1.Pseudo design </a:t>
-            </a:r>
-            <a:r>
-              <a:rPr lang="nl-NL" dirty="0" err="1"/>
-              <a:t>based</a:t>
+              <a:t>1. Quasi-</a:t>
+            </a:r>
+            <a:r>
+              <a:rPr lang="nl-NL" dirty="0" err="1"/>
+              <a:t>randomisation</a:t>
             </a:r>
             <a:endParaRPr lang="nl-NL" dirty="0"/>
           </a:p>
@@ -15569,11 +15410,11 @@
           <a:p>
             <a:r>
               <a:rPr lang="nl-NL" dirty="0"/>
-              <a:t>1.Pseudo design </a:t>
-            </a:r>
-            <a:r>
-              <a:rPr lang="nl-NL" dirty="0" err="1"/>
-              <a:t>based</a:t>
+              <a:t>1. Quasi-</a:t>
+            </a:r>
+            <a:r>
+              <a:rPr lang="nl-NL" dirty="0" err="1"/>
+              <a:t>randomisation</a:t>
             </a:r>
             <a:endParaRPr lang="nl-NL" dirty="0"/>
           </a:p>
@@ -22082,6 +21923,380 @@
       </p:grpSpPr>
       <p:sp>
         <p:nvSpPr>
+          <p:cNvPr id="2" name="Title 1">
+            <a:extLst>
+              <a:ext uri="{FF2B5EF4-FFF2-40B4-BE49-F238E27FC236}">
+                <a16:creationId xmlns:a16="http://schemas.microsoft.com/office/drawing/2014/main" id="{3CF0FEA0-618E-0FC2-5140-FC23F9613145}"/>
+              </a:ext>
+            </a:extLst>
+          </p:cNvPr>
+          <p:cNvSpPr>
+            <a:spLocks noGrp="1"/>
+          </p:cNvSpPr>
+          <p:nvPr>
+            <p:ph type="title"/>
+          </p:nvPr>
+        </p:nvSpPr>
+        <p:spPr/>
+        <p:txBody>
+          <a:bodyPr/>
+          <a:lstStyle/>
+          <a:p>
+            <a:r>
+              <a:rPr lang="en-US" dirty="0"/>
+              <a:t>Double-robust estimators</a:t>
+            </a:r>
+            <a:endParaRPr lang="nl-NL" dirty="0"/>
+          </a:p>
+        </p:txBody>
+      </p:sp>
+      <p:sp>
+        <p:nvSpPr>
+          <p:cNvPr id="3" name="Content Placeholder 2">
+            <a:extLst>
+              <a:ext uri="{FF2B5EF4-FFF2-40B4-BE49-F238E27FC236}">
+                <a16:creationId xmlns:a16="http://schemas.microsoft.com/office/drawing/2014/main" id="{614C2CE2-E335-4CAD-6B06-25EFC2DEE35C}"/>
+              </a:ext>
+            </a:extLst>
+          </p:cNvPr>
+          <p:cNvSpPr>
+            <a:spLocks noGrp="1"/>
+          </p:cNvSpPr>
+          <p:nvPr>
+            <p:ph idx="1"/>
+          </p:nvPr>
+        </p:nvSpPr>
+        <p:spPr/>
+        <p:txBody>
+          <a:bodyPr/>
+          <a:lstStyle/>
+          <a:p>
+            <a:r>
+              <a:rPr lang="en-US" dirty="0"/>
+              <a:t>Combine</a:t>
+            </a:r>
+          </a:p>
+          <a:p>
+            <a:r>
+              <a:rPr lang="en-US" dirty="0"/>
+              <a:t>Example:</a:t>
+            </a:r>
+          </a:p>
+          <a:p>
+            <a:pPr lvl="1"/>
+            <a:r>
+              <a:rPr lang="en-US" dirty="0"/>
+              <a:t>1 quasi-randomization</a:t>
+            </a:r>
+          </a:p>
+          <a:p>
+            <a:pPr lvl="2"/>
+            <a:r>
+              <a:rPr lang="en-US" dirty="0"/>
+              <a:t>Estimate response propensities</a:t>
+            </a:r>
+          </a:p>
+          <a:p>
+            <a:pPr lvl="1"/>
+            <a:r>
+              <a:rPr lang="en-US" dirty="0"/>
+              <a:t>2. Calibration (superpopulation)</a:t>
+            </a:r>
+          </a:p>
+          <a:p>
+            <a:pPr lvl="1"/>
+            <a:endParaRPr lang="nl-NL" dirty="0"/>
+          </a:p>
+        </p:txBody>
+      </p:sp>
+      <p:sp>
+        <p:nvSpPr>
+          <p:cNvPr id="4" name="Slide Number Placeholder 3">
+            <a:extLst>
+              <a:ext uri="{FF2B5EF4-FFF2-40B4-BE49-F238E27FC236}">
+                <a16:creationId xmlns:a16="http://schemas.microsoft.com/office/drawing/2014/main" id="{CD6569A2-3341-F35E-F848-9B95B289DAEE}"/>
+              </a:ext>
+            </a:extLst>
+          </p:cNvPr>
+          <p:cNvSpPr>
+            <a:spLocks noGrp="1"/>
+          </p:cNvSpPr>
+          <p:nvPr>
+            <p:ph type="sldNum" sz="quarter" idx="12"/>
+          </p:nvPr>
+        </p:nvSpPr>
+        <p:spPr/>
+        <p:txBody>
+          <a:bodyPr/>
+          <a:lstStyle/>
+          <a:p>
+            <a:fld id="{DBA3E7B4-B031-428C-A875-F1315D524DB8}" type="slidenum">
+              <a:rPr lang="nl-NL" smtClean="0"/>
+              <a:t>36</a:t>
+            </a:fld>
+            <a:endParaRPr lang="nl-NL"/>
+          </a:p>
+        </p:txBody>
+      </p:sp>
+    </p:spTree>
+    <p:extLst>
+      <p:ext uri="{BB962C8B-B14F-4D97-AF65-F5344CB8AC3E}">
+        <p14:creationId xmlns:p14="http://schemas.microsoft.com/office/powerpoint/2010/main" val="1129073220"/>
+      </p:ext>
+    </p:extLst>
+  </p:cSld>
+  <p:clrMapOvr>
+    <a:masterClrMapping/>
+  </p:clrMapOvr>
+</p:sld>
+</file>
+
+<file path=ppt/slides/slide37.xml><?xml version="1.0" encoding="utf-8"?>
+<p:sld xmlns:a="http://schemas.openxmlformats.org/drawingml/2006/main" xmlns:r="http://schemas.openxmlformats.org/officeDocument/2006/relationships" xmlns:p="http://schemas.openxmlformats.org/presentationml/2006/main">
+  <p:cSld>
+    <p:spTree>
+      <p:nvGrpSpPr>
+        <p:cNvPr id="1" name=""/>
+        <p:cNvGrpSpPr/>
+        <p:nvPr/>
+      </p:nvGrpSpPr>
+      <p:grpSpPr>
+        <a:xfrm>
+          <a:off x="0" y="0"/>
+          <a:ext cx="0" cy="0"/>
+          <a:chOff x="0" y="0"/>
+          <a:chExt cx="0" cy="0"/>
+        </a:xfrm>
+      </p:grpSpPr>
+      <p:sp>
+        <p:nvSpPr>
+          <p:cNvPr id="2" name="Title 1">
+            <a:extLst>
+              <a:ext uri="{FF2B5EF4-FFF2-40B4-BE49-F238E27FC236}">
+                <a16:creationId xmlns:a16="http://schemas.microsoft.com/office/drawing/2014/main" id="{B3E92E00-0C65-ACE5-A8CE-8447E8B8ED0E}"/>
+              </a:ext>
+            </a:extLst>
+          </p:cNvPr>
+          <p:cNvSpPr>
+            <a:spLocks noGrp="1"/>
+          </p:cNvSpPr>
+          <p:nvPr>
+            <p:ph type="title"/>
+          </p:nvPr>
+        </p:nvSpPr>
+        <p:spPr/>
+        <p:txBody>
+          <a:bodyPr/>
+          <a:lstStyle/>
+          <a:p>
+            <a:r>
+              <a:rPr lang="en-US" dirty="0"/>
+              <a:t>Valliant (2020) simulation</a:t>
+            </a:r>
+            <a:endParaRPr lang="nl-NL" dirty="0"/>
+          </a:p>
+        </p:txBody>
+      </p:sp>
+      <p:sp>
+        <p:nvSpPr>
+          <p:cNvPr id="3" name="Content Placeholder 2">
+            <a:extLst>
+              <a:ext uri="{FF2B5EF4-FFF2-40B4-BE49-F238E27FC236}">
+                <a16:creationId xmlns:a16="http://schemas.microsoft.com/office/drawing/2014/main" id="{12754581-4C61-A725-35ED-838BBB95817B}"/>
+              </a:ext>
+            </a:extLst>
+          </p:cNvPr>
+          <p:cNvSpPr>
+            <a:spLocks noGrp="1"/>
+          </p:cNvSpPr>
+          <p:nvPr>
+            <p:ph idx="1"/>
+          </p:nvPr>
+        </p:nvSpPr>
+        <p:spPr/>
+        <p:txBody>
+          <a:bodyPr/>
+          <a:lstStyle/>
+          <a:p>
+            <a:r>
+              <a:rPr lang="en-US" dirty="0"/>
+              <a:t>Tried out different estimation methods</a:t>
+            </a:r>
+          </a:p>
+          <a:p>
+            <a:pPr lvl="1"/>
+            <a:r>
+              <a:rPr lang="nl-NL" dirty="0"/>
+              <a:t>Different </a:t>
+            </a:r>
+            <a:r>
+              <a:rPr lang="nl-NL" dirty="0" err="1"/>
+              <a:t>methods</a:t>
+            </a:r>
+            <a:endParaRPr lang="nl-NL" dirty="0"/>
+          </a:p>
+          <a:p>
+            <a:pPr lvl="1"/>
+            <a:r>
+              <a:rPr lang="nl-NL" dirty="0" err="1"/>
+              <a:t>Variance</a:t>
+            </a:r>
+            <a:r>
+              <a:rPr lang="nl-NL" dirty="0"/>
+              <a:t> </a:t>
+            </a:r>
+            <a:r>
+              <a:rPr lang="nl-NL" dirty="0" err="1"/>
+              <a:t>estimation</a:t>
+            </a:r>
+            <a:endParaRPr lang="nl-NL" dirty="0"/>
+          </a:p>
+          <a:p>
+            <a:pPr lvl="2"/>
+            <a:r>
+              <a:rPr lang="nl-NL" dirty="0" err="1"/>
+              <a:t>Jackknife</a:t>
+            </a:r>
+            <a:r>
+              <a:rPr lang="nl-NL" dirty="0"/>
+              <a:t>???</a:t>
+            </a:r>
+          </a:p>
+          <a:p>
+            <a:endParaRPr lang="nl-NL" dirty="0"/>
+          </a:p>
+          <a:p>
+            <a:r>
+              <a:rPr lang="nl-NL" dirty="0" err="1"/>
+              <a:t>Result</a:t>
+            </a:r>
+            <a:r>
+              <a:rPr lang="nl-NL" dirty="0"/>
+              <a:t>: </a:t>
+            </a:r>
+          </a:p>
+          <a:p>
+            <a:pPr lvl="1"/>
+            <a:r>
+              <a:rPr lang="nl-NL" dirty="0"/>
+              <a:t>no </a:t>
+            </a:r>
+            <a:r>
+              <a:rPr lang="nl-NL" dirty="0" err="1"/>
+              <a:t>method</a:t>
+            </a:r>
+            <a:r>
+              <a:rPr lang="nl-NL" dirty="0"/>
+              <a:t> </a:t>
+            </a:r>
+            <a:r>
+              <a:rPr lang="nl-NL" dirty="0" err="1"/>
+              <a:t>works</a:t>
+            </a:r>
+            <a:r>
+              <a:rPr lang="nl-NL" dirty="0"/>
+              <a:t> </a:t>
+            </a:r>
+            <a:r>
+              <a:rPr lang="nl-NL" dirty="0" err="1"/>
+              <a:t>perfectly</a:t>
+            </a:r>
+            <a:endParaRPr lang="nl-NL" dirty="0"/>
+          </a:p>
+          <a:p>
+            <a:pPr lvl="1"/>
+            <a:r>
+              <a:rPr lang="nl-NL" dirty="0"/>
+              <a:t>Double </a:t>
+            </a:r>
+            <a:r>
+              <a:rPr lang="nl-NL" dirty="0" err="1"/>
+              <a:t>robust</a:t>
+            </a:r>
+            <a:r>
+              <a:rPr lang="nl-NL" dirty="0"/>
+              <a:t> </a:t>
+            </a:r>
+            <a:r>
+              <a:rPr lang="nl-NL" dirty="0" err="1"/>
+              <a:t>methods</a:t>
+            </a:r>
+            <a:r>
+              <a:rPr lang="nl-NL" dirty="0"/>
+              <a:t> </a:t>
+            </a:r>
+            <a:r>
+              <a:rPr lang="nl-NL" dirty="0" err="1"/>
+              <a:t>generally</a:t>
+            </a:r>
+            <a:r>
+              <a:rPr lang="nl-NL" dirty="0"/>
+              <a:t> best</a:t>
+            </a:r>
+          </a:p>
+        </p:txBody>
+      </p:sp>
+      <p:sp>
+        <p:nvSpPr>
+          <p:cNvPr id="4" name="Slide Number Placeholder 3">
+            <a:extLst>
+              <a:ext uri="{FF2B5EF4-FFF2-40B4-BE49-F238E27FC236}">
+                <a16:creationId xmlns:a16="http://schemas.microsoft.com/office/drawing/2014/main" id="{38DD2E10-4D7E-7AA1-C626-92EFB6590E0F}"/>
+              </a:ext>
+            </a:extLst>
+          </p:cNvPr>
+          <p:cNvSpPr>
+            <a:spLocks noGrp="1"/>
+          </p:cNvSpPr>
+          <p:nvPr>
+            <p:ph type="sldNum" sz="quarter" idx="12"/>
+          </p:nvPr>
+        </p:nvSpPr>
+        <p:spPr/>
+        <p:txBody>
+          <a:bodyPr/>
+          <a:lstStyle/>
+          <a:p>
+            <a:fld id="{DBA3E7B4-B031-428C-A875-F1315D524DB8}" type="slidenum">
+              <a:rPr lang="nl-NL" smtClean="0"/>
+              <a:t>37</a:t>
+            </a:fld>
+            <a:endParaRPr lang="nl-NL"/>
+          </a:p>
+        </p:txBody>
+      </p:sp>
+    </p:spTree>
+    <p:extLst>
+      <p:ext uri="{BB962C8B-B14F-4D97-AF65-F5344CB8AC3E}">
+        <p14:creationId xmlns:p14="http://schemas.microsoft.com/office/powerpoint/2010/main" val="3727711100"/>
+      </p:ext>
+    </p:extLst>
+  </p:cSld>
+  <p:clrMapOvr>
+    <a:masterClrMapping/>
+  </p:clrMapOvr>
+</p:sld>
+</file>
+
+<file path=ppt/slides/slide38.xml><?xml version="1.0" encoding="utf-8"?>
+<p:sld xmlns:a="http://schemas.openxmlformats.org/drawingml/2006/main" xmlns:r="http://schemas.openxmlformats.org/officeDocument/2006/relationships" xmlns:p="http://schemas.openxmlformats.org/presentationml/2006/main">
+  <p:cSld>
+    <p:spTree>
+      <p:nvGrpSpPr>
+        <p:cNvPr id="1" name=""/>
+        <p:cNvGrpSpPr/>
+        <p:nvPr/>
+      </p:nvGrpSpPr>
+      <p:grpSpPr>
+        <a:xfrm>
+          <a:off x="0" y="0"/>
+          <a:ext cx="0" cy="0"/>
+          <a:chOff x="0" y="0"/>
+          <a:chExt cx="0" cy="0"/>
+        </a:xfrm>
+      </p:grpSpPr>
+      <p:sp>
+        <p:nvSpPr>
           <p:cNvPr id="2" name="Titel 1">
             <a:extLst>
               <a:ext uri="{FF2B5EF4-FFF2-40B4-BE49-F238E27FC236}">
@@ -22135,7 +22350,7 @@
         <p:spPr/>
         <p:txBody>
           <a:bodyPr>
-            <a:normAutofit fontScale="92500" lnSpcReduction="10000"/>
+            <a:normAutofit fontScale="92500" lnSpcReduction="20000"/>
           </a:bodyPr>
           <a:lstStyle/>
           <a:p>
@@ -22331,61 +22546,87 @@
               <a:buNone/>
             </a:pPr>
             <a:r>
-              <a:rPr lang="nl-NL" sz="2200" dirty="0"/>
+              <a:rPr lang="nl-NL" sz="1700" dirty="0"/>
               <a:t>See </a:t>
             </a:r>
             <a:r>
-              <a:rPr lang="nl-NL" sz="2200" dirty="0" err="1"/>
+              <a:rPr lang="nl-NL" sz="1700" dirty="0" err="1"/>
               <a:t>Andridge</a:t>
             </a:r>
             <a:r>
-              <a:rPr lang="nl-NL" sz="2200" dirty="0"/>
+              <a:rPr lang="nl-NL" sz="1700" dirty="0"/>
               <a:t>, R. R., &amp; Little, R. J. (2011). Proxy </a:t>
             </a:r>
             <a:r>
-              <a:rPr lang="nl-NL" sz="2200" dirty="0" err="1"/>
+              <a:rPr lang="nl-NL" sz="1700" dirty="0" err="1"/>
               <a:t>pattern</a:t>
             </a:r>
             <a:r>
-              <a:rPr lang="nl-NL" sz="2200" dirty="0"/>
+              <a:rPr lang="nl-NL" sz="1700" dirty="0"/>
               <a:t>-mixture analysis </a:t>
             </a:r>
             <a:r>
-              <a:rPr lang="nl-NL" sz="2200" dirty="0" err="1"/>
+              <a:rPr lang="nl-NL" sz="1700" dirty="0" err="1"/>
               <a:t>for</a:t>
             </a:r>
             <a:r>
-              <a:rPr lang="nl-NL" sz="2200" dirty="0"/>
+              <a:rPr lang="nl-NL" sz="1700" dirty="0"/>
               <a:t> survey </a:t>
             </a:r>
             <a:r>
-              <a:rPr lang="nl-NL" sz="2200" dirty="0" err="1"/>
+              <a:rPr lang="nl-NL" sz="1700" dirty="0" err="1"/>
               <a:t>nonresponse</a:t>
             </a:r>
             <a:r>
-              <a:rPr lang="nl-NL" sz="2200" dirty="0"/>
+              <a:rPr lang="nl-NL" sz="1700" dirty="0"/>
               <a:t>. </a:t>
             </a:r>
             <a:r>
-              <a:rPr lang="nl-NL" sz="2200" i="1" dirty="0"/>
+              <a:rPr lang="nl-NL" sz="1700" i="1" dirty="0"/>
               <a:t>Journal of Official </a:t>
             </a:r>
             <a:r>
-              <a:rPr lang="nl-NL" sz="2200" i="1" dirty="0" err="1"/>
+              <a:rPr lang="nl-NL" sz="1700" i="1" dirty="0" err="1"/>
               <a:t>Statistics</a:t>
             </a:r>
             <a:r>
-              <a:rPr lang="nl-NL" sz="2200" dirty="0"/>
+              <a:rPr lang="nl-NL" sz="1700" dirty="0"/>
               <a:t>, </a:t>
             </a:r>
             <a:r>
-              <a:rPr lang="nl-NL" sz="2200" i="1" dirty="0"/>
+              <a:rPr lang="nl-NL" sz="1700" i="1" dirty="0"/>
               <a:t>27</a:t>
             </a:r>
             <a:r>
-              <a:rPr lang="nl-NL" sz="2200" dirty="0"/>
+              <a:rPr lang="nl-NL" sz="1700" dirty="0"/>
               <a:t>(2), 153.</a:t>
             </a:r>
+          </a:p>
+          <a:p>
+            <a:pPr marL="457200" lvl="1" indent="0">
+              <a:buNone/>
+            </a:pPr>
+            <a:r>
+              <a:rPr lang="en-US" sz="1700" dirty="0"/>
+              <a:t>See West, B. T., &amp; </a:t>
+            </a:r>
+            <a:r>
+              <a:rPr lang="en-US" sz="1700" dirty="0" err="1"/>
+              <a:t>Andridge</a:t>
+            </a:r>
+            <a:r>
+              <a:rPr lang="en-US" sz="1700" dirty="0"/>
+              <a:t>, R. R. (2023). Evaluating Pre-Election Polling Estimates Using a New Measure of Non-Ignorable Selection Bias. </a:t>
+            </a:r>
+            <a:r>
+              <a:rPr lang="en-US" sz="1700" i="1" dirty="0"/>
+              <a:t>Public Opinion Quarterly</a:t>
+            </a:r>
+            <a:r>
+              <a:rPr lang="en-US" sz="1700" dirty="0"/>
+              <a:t>, nfad018.</a:t>
+            </a:r>
+            <a:endParaRPr lang="nl-NL" sz="1700" dirty="0"/>
           </a:p>
         </p:txBody>
       </p:sp>
@@ -22412,7 +22653,7 @@
           <a:p>
             <a:fld id="{DBA3E7B4-B031-428C-A875-F1315D524DB8}" type="slidenum">
               <a:rPr lang="nl-NL" smtClean="0"/>
-              <a:t>36</a:t>
+              <a:t>38</a:t>
             </a:fld>
             <a:endParaRPr lang="nl-NL"/>
           </a:p>
@@ -22431,7 +22672,7 @@
 </p:sld>
 </file>
 
-<file path=ppt/slides/slide37.xml><?xml version="1.0" encoding="utf-8"?>
+<file path=ppt/slides/slide39.xml><?xml version="1.0" encoding="utf-8"?>
 <p:sld xmlns:a="http://schemas.openxmlformats.org/drawingml/2006/main" xmlns:r="http://schemas.openxmlformats.org/officeDocument/2006/relationships" xmlns:p="http://schemas.openxmlformats.org/presentationml/2006/main">
   <p:cSld>
     <p:spTree>
@@ -22742,7 +22983,7 @@
           <a:p>
             <a:fld id="{DBA3E7B4-B031-428C-A875-F1315D524DB8}" type="slidenum">
               <a:rPr lang="nl-NL" smtClean="0"/>
-              <a:t>37</a:t>
+              <a:t>39</a:t>
             </a:fld>
             <a:endParaRPr lang="nl-NL"/>
           </a:p>
@@ -22752,749 +22993,6 @@
     <p:extLst>
       <p:ext uri="{BB962C8B-B14F-4D97-AF65-F5344CB8AC3E}">
         <p14:creationId xmlns:p14="http://schemas.microsoft.com/office/powerpoint/2010/main" val="2133873242"/>
-      </p:ext>
-    </p:extLst>
-  </p:cSld>
-  <p:clrMapOvr>
-    <a:masterClrMapping/>
-  </p:clrMapOvr>
-</p:sld>
-</file>
-
-<file path=ppt/slides/slide38.xml><?xml version="1.0" encoding="utf-8"?>
-<p:sld xmlns:a="http://schemas.openxmlformats.org/drawingml/2006/main" xmlns:r="http://schemas.openxmlformats.org/officeDocument/2006/relationships" xmlns:p="http://schemas.openxmlformats.org/presentationml/2006/main">
-  <p:cSld>
-    <p:spTree>
-      <p:nvGrpSpPr>
-        <p:cNvPr id="1" name=""/>
-        <p:cNvGrpSpPr/>
-        <p:nvPr/>
-      </p:nvGrpSpPr>
-      <p:grpSpPr>
-        <a:xfrm>
-          <a:off x="0" y="0"/>
-          <a:ext cx="0" cy="0"/>
-          <a:chOff x="0" y="0"/>
-          <a:chExt cx="0" cy="0"/>
-        </a:xfrm>
-      </p:grpSpPr>
-      <p:sp>
-        <p:nvSpPr>
-          <p:cNvPr id="2" name="Title 1"/>
-          <p:cNvSpPr>
-            <a:spLocks noGrp="1"/>
-          </p:cNvSpPr>
-          <p:nvPr>
-            <p:ph type="title"/>
-          </p:nvPr>
-        </p:nvSpPr>
-        <p:spPr/>
-        <p:txBody>
-          <a:bodyPr/>
-          <a:lstStyle/>
-          <a:p>
-            <a:r>
-              <a:rPr lang="en-US" dirty="0"/>
-              <a:t>Next week</a:t>
-            </a:r>
-            <a:endParaRPr lang="nl-NL" dirty="0"/>
-          </a:p>
-        </p:txBody>
-      </p:sp>
-      <p:sp>
-        <p:nvSpPr>
-          <p:cNvPr id="3" name="Content Placeholder 2"/>
-          <p:cNvSpPr>
-            <a:spLocks noGrp="1"/>
-          </p:cNvSpPr>
-          <p:nvPr>
-            <p:ph idx="1"/>
-          </p:nvPr>
-        </p:nvSpPr>
-        <p:spPr/>
-        <p:txBody>
-          <a:bodyPr>
-            <a:normAutofit lnSpcReduction="10000"/>
-          </a:bodyPr>
-          <a:lstStyle/>
-          <a:p>
-            <a:r>
-              <a:rPr lang="en-US" dirty="0"/>
-              <a:t>Lecture on “designed big data”</a:t>
-            </a:r>
-          </a:p>
-          <a:p>
-            <a:r>
-              <a:rPr lang="en-US" dirty="0"/>
-              <a:t>Keep working on your group assignments</a:t>
-            </a:r>
-          </a:p>
-          <a:p>
-            <a:r>
-              <a:rPr lang="en-US" dirty="0"/>
-              <a:t>In two weeks -&gt; final meeting</a:t>
-            </a:r>
-          </a:p>
-          <a:p>
-            <a:pPr lvl="1"/>
-            <a:r>
-              <a:rPr lang="en-US" dirty="0"/>
-              <a:t>Prepare an online document that should be readable in 6 minutes</a:t>
-            </a:r>
-          </a:p>
-          <a:p>
-            <a:pPr lvl="2"/>
-            <a:r>
-              <a:rPr lang="en-US" dirty="0"/>
-              <a:t>Video, wiki, website….</a:t>
-            </a:r>
-          </a:p>
-          <a:p>
-            <a:pPr lvl="1"/>
-            <a:r>
-              <a:rPr lang="en-US" dirty="0"/>
-              <a:t>Send around by December 9, 17:00</a:t>
-            </a:r>
-          </a:p>
-          <a:p>
-            <a:pPr lvl="1"/>
-            <a:r>
-              <a:rPr lang="en-US" dirty="0"/>
-              <a:t>Review 1 presentation of other group and prepare 3 questions.</a:t>
-            </a:r>
-          </a:p>
-          <a:p>
-            <a:pPr marL="457200" lvl="1" indent="0">
-              <a:buNone/>
-            </a:pPr>
-            <a:endParaRPr lang="en-US" dirty="0"/>
-          </a:p>
-        </p:txBody>
-      </p:sp>
-      <p:sp>
-        <p:nvSpPr>
-          <p:cNvPr id="4" name="Tijdelijke aanduiding voor dianummer 3">
-            <a:extLst>
-              <a:ext uri="{FF2B5EF4-FFF2-40B4-BE49-F238E27FC236}">
-                <a16:creationId xmlns:a16="http://schemas.microsoft.com/office/drawing/2014/main" id="{D6EF2CDD-F37D-0E4A-9C7F-FAC5F12EE7BF}"/>
-              </a:ext>
-            </a:extLst>
-          </p:cNvPr>
-          <p:cNvSpPr>
-            <a:spLocks noGrp="1"/>
-          </p:cNvSpPr>
-          <p:nvPr>
-            <p:ph type="sldNum" sz="quarter" idx="12"/>
-          </p:nvPr>
-        </p:nvSpPr>
-        <p:spPr/>
-        <p:txBody>
-          <a:bodyPr/>
-          <a:lstStyle/>
-          <a:p>
-            <a:fld id="{DBA3E7B4-B031-428C-A875-F1315D524DB8}" type="slidenum">
-              <a:rPr lang="nl-NL" smtClean="0"/>
-              <a:t>38</a:t>
-            </a:fld>
-            <a:endParaRPr lang="nl-NL"/>
-          </a:p>
-        </p:txBody>
-      </p:sp>
-    </p:spTree>
-    <p:extLst>
-      <p:ext uri="{BB962C8B-B14F-4D97-AF65-F5344CB8AC3E}">
-        <p14:creationId xmlns:p14="http://schemas.microsoft.com/office/powerpoint/2010/main" val="4263769302"/>
-      </p:ext>
-    </p:extLst>
-  </p:cSld>
-  <p:clrMapOvr>
-    <a:masterClrMapping/>
-  </p:clrMapOvr>
-</p:sld>
-</file>
-
-<file path=ppt/slides/slide39.xml><?xml version="1.0" encoding="utf-8"?>
-<p:sld xmlns:a="http://schemas.openxmlformats.org/drawingml/2006/main" xmlns:r="http://schemas.openxmlformats.org/officeDocument/2006/relationships" xmlns:p="http://schemas.openxmlformats.org/presentationml/2006/main">
-  <p:cSld>
-    <p:spTree>
-      <p:nvGrpSpPr>
-        <p:cNvPr id="1" name=""/>
-        <p:cNvGrpSpPr/>
-        <p:nvPr/>
-      </p:nvGrpSpPr>
-      <p:grpSpPr>
-        <a:xfrm>
-          <a:off x="0" y="0"/>
-          <a:ext cx="0" cy="0"/>
-          <a:chOff x="0" y="0"/>
-          <a:chExt cx="0" cy="0"/>
-        </a:xfrm>
-      </p:grpSpPr>
-      <p:sp>
-        <p:nvSpPr>
-          <p:cNvPr id="2" name="Titel 1">
-            <a:extLst>
-              <a:ext uri="{FF2B5EF4-FFF2-40B4-BE49-F238E27FC236}">
-                <a16:creationId xmlns:a16="http://schemas.microsoft.com/office/drawing/2014/main" id="{8F46763A-7CF9-3149-9298-E75487E48A67}"/>
-              </a:ext>
-            </a:extLst>
-          </p:cNvPr>
-          <p:cNvSpPr>
-            <a:spLocks noGrp="1"/>
-          </p:cNvSpPr>
-          <p:nvPr>
-            <p:ph type="title"/>
-          </p:nvPr>
-        </p:nvSpPr>
-        <p:spPr/>
-        <p:txBody>
-          <a:bodyPr/>
-          <a:lstStyle/>
-          <a:p>
-            <a:r>
-              <a:rPr lang="nl-NL" dirty="0"/>
-              <a:t>More reading?</a:t>
-            </a:r>
-          </a:p>
-        </p:txBody>
-      </p:sp>
-      <p:sp>
-        <p:nvSpPr>
-          <p:cNvPr id="3" name="Tijdelijke aanduiding voor inhoud 2">
-            <a:extLst>
-              <a:ext uri="{FF2B5EF4-FFF2-40B4-BE49-F238E27FC236}">
-                <a16:creationId xmlns:a16="http://schemas.microsoft.com/office/drawing/2014/main" id="{AD1FBDDC-7626-C24B-9CCB-C7812ECBC2DF}"/>
-              </a:ext>
-            </a:extLst>
-          </p:cNvPr>
-          <p:cNvSpPr>
-            <a:spLocks noGrp="1"/>
-          </p:cNvSpPr>
-          <p:nvPr>
-            <p:ph idx="1"/>
-          </p:nvPr>
-        </p:nvSpPr>
-        <p:spPr/>
-        <p:txBody>
-          <a:bodyPr>
-            <a:normAutofit fontScale="62500" lnSpcReduction="20000"/>
-          </a:bodyPr>
-          <a:lstStyle/>
-          <a:p>
-            <a:r>
-              <a:rPr lang="nl-NL" dirty="0" err="1"/>
-              <a:t>Andridge</a:t>
-            </a:r>
-            <a:r>
-              <a:rPr lang="nl-NL" dirty="0"/>
-              <a:t>, R. R., &amp; Little, R. J. (2011). Proxy </a:t>
-            </a:r>
-            <a:r>
-              <a:rPr lang="nl-NL" dirty="0" err="1"/>
-              <a:t>pattern</a:t>
-            </a:r>
-            <a:r>
-              <a:rPr lang="nl-NL" dirty="0"/>
-              <a:t>-mixture analysis </a:t>
-            </a:r>
-            <a:r>
-              <a:rPr lang="nl-NL" dirty="0" err="1"/>
-              <a:t>for</a:t>
-            </a:r>
-            <a:r>
-              <a:rPr lang="nl-NL" dirty="0"/>
-              <a:t> survey </a:t>
-            </a:r>
-            <a:r>
-              <a:rPr lang="nl-NL" dirty="0" err="1"/>
-              <a:t>nonresponse</a:t>
-            </a:r>
-            <a:r>
-              <a:rPr lang="nl-NL" dirty="0"/>
-              <a:t>. </a:t>
-            </a:r>
-            <a:r>
-              <a:rPr lang="nl-NL" i="1" dirty="0"/>
-              <a:t>Journal of Official </a:t>
-            </a:r>
-            <a:r>
-              <a:rPr lang="nl-NL" i="1" dirty="0" err="1"/>
-              <a:t>Statistics</a:t>
-            </a:r>
-            <a:r>
-              <a:rPr lang="nl-NL" dirty="0"/>
-              <a:t>, </a:t>
-            </a:r>
-            <a:r>
-              <a:rPr lang="nl-NL" i="1" dirty="0"/>
-              <a:t>27</a:t>
-            </a:r>
-            <a:r>
-              <a:rPr lang="nl-NL" dirty="0"/>
-              <a:t>(2), 153.</a:t>
-            </a:r>
-          </a:p>
-          <a:p>
-            <a:r>
-              <a:rPr lang="nl-NL" dirty="0"/>
-              <a:t>Chen, S., Yang, S., &amp; Kim, J. K. (2020). </a:t>
-            </a:r>
-            <a:r>
-              <a:rPr lang="nl-NL" dirty="0" err="1"/>
-              <a:t>Nonparametric</a:t>
-            </a:r>
-            <a:r>
-              <a:rPr lang="nl-NL" dirty="0"/>
-              <a:t> Mass </a:t>
-            </a:r>
-            <a:r>
-              <a:rPr lang="nl-NL" dirty="0" err="1"/>
-              <a:t>Imputation</a:t>
-            </a:r>
-            <a:r>
-              <a:rPr lang="nl-NL" dirty="0"/>
-              <a:t> </a:t>
-            </a:r>
-            <a:r>
-              <a:rPr lang="nl-NL" dirty="0" err="1"/>
-              <a:t>for</a:t>
-            </a:r>
-            <a:r>
-              <a:rPr lang="nl-NL" dirty="0"/>
-              <a:t> Data Integration. </a:t>
-            </a:r>
-            <a:r>
-              <a:rPr lang="nl-NL" i="1" dirty="0"/>
-              <a:t>Journal of Survey </a:t>
-            </a:r>
-            <a:r>
-              <a:rPr lang="nl-NL" i="1" dirty="0" err="1"/>
-              <a:t>Statistics</a:t>
-            </a:r>
-            <a:r>
-              <a:rPr lang="nl-NL" i="1" dirty="0"/>
-              <a:t> </a:t>
-            </a:r>
-            <a:r>
-              <a:rPr lang="nl-NL" i="1" dirty="0" err="1"/>
-              <a:t>and</a:t>
-            </a:r>
-            <a:r>
-              <a:rPr lang="nl-NL" i="1" dirty="0"/>
-              <a:t> </a:t>
-            </a:r>
-            <a:r>
-              <a:rPr lang="nl-NL" i="1" dirty="0" err="1"/>
-              <a:t>Methodology</a:t>
-            </a:r>
-            <a:r>
-              <a:rPr lang="nl-NL" dirty="0"/>
-              <a:t>.</a:t>
-            </a:r>
-          </a:p>
-          <a:p>
-            <a:r>
-              <a:rPr lang="nl-NL" dirty="0"/>
-              <a:t>Elliott, M. R., &amp; </a:t>
-            </a:r>
-            <a:r>
-              <a:rPr lang="nl-NL" dirty="0" err="1"/>
-              <a:t>Valliant</a:t>
-            </a:r>
-            <a:r>
-              <a:rPr lang="nl-NL" dirty="0"/>
-              <a:t>, R. (2017). </a:t>
-            </a:r>
-            <a:r>
-              <a:rPr lang="nl-NL" dirty="0" err="1"/>
-              <a:t>Inference</a:t>
-            </a:r>
-            <a:r>
-              <a:rPr lang="nl-NL" dirty="0"/>
-              <a:t> </a:t>
-            </a:r>
-            <a:r>
-              <a:rPr lang="nl-NL" dirty="0" err="1"/>
-              <a:t>for</a:t>
-            </a:r>
-            <a:r>
-              <a:rPr lang="nl-NL" dirty="0"/>
-              <a:t> </a:t>
-            </a:r>
-            <a:r>
-              <a:rPr lang="nl-NL" dirty="0" err="1"/>
-              <a:t>nonprobability</a:t>
-            </a:r>
-            <a:r>
-              <a:rPr lang="nl-NL" dirty="0"/>
-              <a:t> samples. </a:t>
-            </a:r>
-            <a:r>
-              <a:rPr lang="nl-NL" i="1" dirty="0"/>
-              <a:t>Statistical </a:t>
-            </a:r>
-            <a:r>
-              <a:rPr lang="nl-NL" i="1" dirty="0" err="1"/>
-              <a:t>Science</a:t>
-            </a:r>
-            <a:r>
-              <a:rPr lang="nl-NL" dirty="0"/>
-              <a:t>, </a:t>
-            </a:r>
-            <a:r>
-              <a:rPr lang="nl-NL" i="1" dirty="0"/>
-              <a:t>32</a:t>
-            </a:r>
-            <a:r>
-              <a:rPr lang="nl-NL" dirty="0"/>
-              <a:t>(2), 249-264.</a:t>
-            </a:r>
-          </a:p>
-          <a:p>
-            <a:r>
-              <a:rPr lang="nl-NL" dirty="0"/>
-              <a:t>Kim, J. K., Park, S., Chen, Y., &amp; </a:t>
-            </a:r>
-            <a:r>
-              <a:rPr lang="nl-NL" dirty="0" err="1"/>
-              <a:t>Wu</a:t>
-            </a:r>
-            <a:r>
-              <a:rPr lang="nl-NL" dirty="0"/>
-              <a:t>, C. (2018). </a:t>
-            </a:r>
-            <a:r>
-              <a:rPr lang="nl-NL" dirty="0" err="1"/>
-              <a:t>Combining</a:t>
-            </a:r>
-            <a:r>
-              <a:rPr lang="nl-NL" dirty="0"/>
-              <a:t> non-</a:t>
-            </a:r>
-            <a:r>
-              <a:rPr lang="nl-NL" dirty="0" err="1"/>
-              <a:t>probability</a:t>
-            </a:r>
-            <a:r>
-              <a:rPr lang="nl-NL" dirty="0"/>
-              <a:t> </a:t>
-            </a:r>
-            <a:r>
-              <a:rPr lang="nl-NL" dirty="0" err="1"/>
-              <a:t>and</a:t>
-            </a:r>
-            <a:r>
-              <a:rPr lang="nl-NL" dirty="0"/>
-              <a:t> </a:t>
-            </a:r>
-            <a:r>
-              <a:rPr lang="nl-NL" dirty="0" err="1"/>
-              <a:t>probability</a:t>
-            </a:r>
-            <a:r>
-              <a:rPr lang="nl-NL" dirty="0"/>
-              <a:t> survey samples </a:t>
-            </a:r>
-            <a:r>
-              <a:rPr lang="nl-NL" dirty="0" err="1"/>
-              <a:t>through</a:t>
-            </a:r>
-            <a:r>
-              <a:rPr lang="nl-NL" dirty="0"/>
-              <a:t> </a:t>
-            </a:r>
-            <a:r>
-              <a:rPr lang="nl-NL" dirty="0" err="1"/>
-              <a:t>mass</a:t>
-            </a:r>
-            <a:r>
-              <a:rPr lang="nl-NL" dirty="0"/>
-              <a:t> </a:t>
-            </a:r>
-            <a:r>
-              <a:rPr lang="nl-NL" dirty="0" err="1"/>
-              <a:t>imputation</a:t>
-            </a:r>
-            <a:r>
-              <a:rPr lang="nl-NL" dirty="0"/>
-              <a:t>. </a:t>
-            </a:r>
-            <a:r>
-              <a:rPr lang="nl-NL" i="1" dirty="0" err="1"/>
-              <a:t>arXiv</a:t>
-            </a:r>
-            <a:r>
-              <a:rPr lang="nl-NL" i="1" dirty="0"/>
-              <a:t> preprint arXiv:1812.10694</a:t>
-            </a:r>
-            <a:r>
-              <a:rPr lang="nl-NL" dirty="0"/>
-              <a:t>.</a:t>
-            </a:r>
-          </a:p>
-          <a:p>
-            <a:r>
-              <a:rPr lang="nl-NL" dirty="0" err="1"/>
-              <a:t>Rafei</a:t>
-            </a:r>
-            <a:r>
-              <a:rPr lang="nl-NL" dirty="0"/>
-              <a:t>, A., </a:t>
-            </a:r>
-            <a:r>
-              <a:rPr lang="nl-NL" dirty="0" err="1"/>
-              <a:t>Flannagan</a:t>
-            </a:r>
-            <a:r>
-              <a:rPr lang="nl-NL" dirty="0"/>
-              <a:t>, C. A., &amp; Elliott, M. R. (2020). Big Data </a:t>
-            </a:r>
-            <a:r>
-              <a:rPr lang="nl-NL" dirty="0" err="1"/>
-              <a:t>for</a:t>
-            </a:r>
-            <a:r>
-              <a:rPr lang="nl-NL" dirty="0"/>
-              <a:t> </a:t>
-            </a:r>
-            <a:r>
-              <a:rPr lang="nl-NL" dirty="0" err="1"/>
-              <a:t>Finite</a:t>
-            </a:r>
-            <a:r>
-              <a:rPr lang="nl-NL" dirty="0"/>
-              <a:t> </a:t>
-            </a:r>
-            <a:r>
-              <a:rPr lang="nl-NL" dirty="0" err="1"/>
-              <a:t>Population</a:t>
-            </a:r>
-            <a:r>
-              <a:rPr lang="nl-NL" dirty="0"/>
-              <a:t> </a:t>
-            </a:r>
-            <a:r>
-              <a:rPr lang="nl-NL" dirty="0" err="1"/>
-              <a:t>Inference</a:t>
-            </a:r>
-            <a:r>
-              <a:rPr lang="nl-NL" dirty="0"/>
-              <a:t>: </a:t>
-            </a:r>
-            <a:r>
-              <a:rPr lang="nl-NL" dirty="0" err="1"/>
-              <a:t>Applying</a:t>
-            </a:r>
-            <a:r>
-              <a:rPr lang="nl-NL" dirty="0"/>
-              <a:t> Quasi-Random Approaches </a:t>
-            </a:r>
-            <a:r>
-              <a:rPr lang="nl-NL" dirty="0" err="1"/>
-              <a:t>to</a:t>
-            </a:r>
-            <a:r>
-              <a:rPr lang="nl-NL" dirty="0"/>
-              <a:t> </a:t>
-            </a:r>
-            <a:r>
-              <a:rPr lang="nl-NL" dirty="0" err="1"/>
-              <a:t>Naturalistic</a:t>
-            </a:r>
-            <a:r>
-              <a:rPr lang="nl-NL" dirty="0"/>
-              <a:t> </a:t>
-            </a:r>
-            <a:r>
-              <a:rPr lang="nl-NL" dirty="0" err="1"/>
-              <a:t>Driving</a:t>
-            </a:r>
-            <a:r>
-              <a:rPr lang="nl-NL" dirty="0"/>
-              <a:t> Data Using </a:t>
-            </a:r>
-            <a:r>
-              <a:rPr lang="nl-NL" dirty="0" err="1"/>
-              <a:t>Bayesian</a:t>
-            </a:r>
-            <a:r>
-              <a:rPr lang="nl-NL" dirty="0"/>
-              <a:t> Additive </a:t>
-            </a:r>
-            <a:r>
-              <a:rPr lang="nl-NL" dirty="0" err="1"/>
-              <a:t>Regression</a:t>
-            </a:r>
-            <a:r>
-              <a:rPr lang="nl-NL" dirty="0"/>
-              <a:t> Trees. </a:t>
-            </a:r>
-            <a:r>
-              <a:rPr lang="nl-NL" i="1" dirty="0"/>
-              <a:t>Journal of Survey </a:t>
-            </a:r>
-            <a:r>
-              <a:rPr lang="nl-NL" i="1" dirty="0" err="1"/>
-              <a:t>Statistics</a:t>
-            </a:r>
-            <a:r>
-              <a:rPr lang="nl-NL" i="1" dirty="0"/>
-              <a:t> </a:t>
-            </a:r>
-            <a:r>
-              <a:rPr lang="nl-NL" i="1" dirty="0" err="1"/>
-              <a:t>and</a:t>
-            </a:r>
-            <a:r>
-              <a:rPr lang="nl-NL" i="1" dirty="0"/>
-              <a:t> </a:t>
-            </a:r>
-            <a:r>
-              <a:rPr lang="nl-NL" i="1" dirty="0" err="1"/>
-              <a:t>Methodology</a:t>
-            </a:r>
-            <a:r>
-              <a:rPr lang="nl-NL" dirty="0"/>
-              <a:t>, </a:t>
-            </a:r>
-            <a:r>
-              <a:rPr lang="nl-NL" i="1" dirty="0"/>
-              <a:t>8</a:t>
-            </a:r>
-            <a:r>
-              <a:rPr lang="nl-NL" dirty="0"/>
-              <a:t>(1), 148-180.</a:t>
-            </a:r>
-          </a:p>
-          <a:p>
-            <a:r>
-              <a:rPr lang="nl-NL" dirty="0" err="1"/>
-              <a:t>Valliant</a:t>
-            </a:r>
-            <a:r>
-              <a:rPr lang="nl-NL" dirty="0"/>
-              <a:t>, R. (2020). </a:t>
-            </a:r>
-            <a:r>
-              <a:rPr lang="nl-NL" dirty="0" err="1"/>
-              <a:t>Comparing</a:t>
-            </a:r>
-            <a:r>
-              <a:rPr lang="nl-NL" dirty="0"/>
-              <a:t> </a:t>
-            </a:r>
-            <a:r>
-              <a:rPr lang="nl-NL" dirty="0" err="1"/>
-              <a:t>alternatives</a:t>
-            </a:r>
-            <a:r>
-              <a:rPr lang="nl-NL" dirty="0"/>
-              <a:t> </a:t>
-            </a:r>
-            <a:r>
-              <a:rPr lang="nl-NL" dirty="0" err="1"/>
-              <a:t>for</a:t>
-            </a:r>
-            <a:r>
-              <a:rPr lang="nl-NL" dirty="0"/>
-              <a:t> </a:t>
-            </a:r>
-            <a:r>
-              <a:rPr lang="nl-NL" dirty="0" err="1"/>
-              <a:t>estimation</a:t>
-            </a:r>
-            <a:r>
-              <a:rPr lang="nl-NL" dirty="0"/>
-              <a:t> </a:t>
-            </a:r>
-            <a:r>
-              <a:rPr lang="nl-NL" dirty="0" err="1"/>
-              <a:t>from</a:t>
-            </a:r>
-            <a:r>
-              <a:rPr lang="nl-NL" dirty="0"/>
-              <a:t> </a:t>
-            </a:r>
-            <a:r>
-              <a:rPr lang="nl-NL" dirty="0" err="1"/>
-              <a:t>nonprobability</a:t>
-            </a:r>
-            <a:r>
-              <a:rPr lang="nl-NL" dirty="0"/>
-              <a:t> samples. </a:t>
-            </a:r>
-            <a:r>
-              <a:rPr lang="nl-NL" i="1" dirty="0"/>
-              <a:t>Journal of Survey </a:t>
-            </a:r>
-            <a:r>
-              <a:rPr lang="nl-NL" i="1" dirty="0" err="1"/>
-              <a:t>Statistics</a:t>
-            </a:r>
-            <a:r>
-              <a:rPr lang="nl-NL" i="1" dirty="0"/>
-              <a:t> </a:t>
-            </a:r>
-            <a:r>
-              <a:rPr lang="nl-NL" i="1" dirty="0" err="1"/>
-              <a:t>and</a:t>
-            </a:r>
-            <a:r>
-              <a:rPr lang="nl-NL" i="1" dirty="0"/>
-              <a:t> </a:t>
-            </a:r>
-            <a:r>
-              <a:rPr lang="nl-NL" i="1" dirty="0" err="1"/>
-              <a:t>Methodology</a:t>
-            </a:r>
-            <a:r>
-              <a:rPr lang="nl-NL" dirty="0"/>
-              <a:t>, </a:t>
-            </a:r>
-            <a:r>
-              <a:rPr lang="nl-NL" i="1" dirty="0"/>
-              <a:t>8</a:t>
-            </a:r>
-            <a:r>
-              <a:rPr lang="nl-NL" dirty="0"/>
-              <a:t>(2), 231-263.</a:t>
-            </a:r>
-          </a:p>
-        </p:txBody>
-      </p:sp>
-      <p:sp>
-        <p:nvSpPr>
-          <p:cNvPr id="4" name="Tijdelijke aanduiding voor dianummer 3">
-            <a:extLst>
-              <a:ext uri="{FF2B5EF4-FFF2-40B4-BE49-F238E27FC236}">
-                <a16:creationId xmlns:a16="http://schemas.microsoft.com/office/drawing/2014/main" id="{46CD17B0-E9CD-2144-A066-E13E2E3F221D}"/>
-              </a:ext>
-            </a:extLst>
-          </p:cNvPr>
-          <p:cNvSpPr>
-            <a:spLocks noGrp="1"/>
-          </p:cNvSpPr>
-          <p:nvPr>
-            <p:ph type="sldNum" sz="quarter" idx="12"/>
-          </p:nvPr>
-        </p:nvSpPr>
-        <p:spPr/>
-        <p:txBody>
-          <a:bodyPr/>
-          <a:lstStyle/>
-          <a:p>
-            <a:fld id="{DBA3E7B4-B031-428C-A875-F1315D524DB8}" type="slidenum">
-              <a:rPr lang="nl-NL" smtClean="0"/>
-              <a:t>39</a:t>
-            </a:fld>
-            <a:endParaRPr lang="nl-NL"/>
-          </a:p>
-        </p:txBody>
-      </p:sp>
-    </p:spTree>
-    <p:extLst>
-      <p:ext uri="{BB962C8B-B14F-4D97-AF65-F5344CB8AC3E}">
-        <p14:creationId xmlns:p14="http://schemas.microsoft.com/office/powerpoint/2010/main" val="2118843225"/>
       </p:ext>
     </p:extLst>
   </p:cSld>
@@ -23743,6 +23241,765 @@
 </p:sld>
 </file>
 
+<file path=ppt/slides/slide40.xml><?xml version="1.0" encoding="utf-8"?>
+<p:sld xmlns:a="http://schemas.openxmlformats.org/drawingml/2006/main" xmlns:r="http://schemas.openxmlformats.org/officeDocument/2006/relationships" xmlns:p="http://schemas.openxmlformats.org/presentationml/2006/main">
+  <p:cSld>
+    <p:spTree>
+      <p:nvGrpSpPr>
+        <p:cNvPr id="1" name=""/>
+        <p:cNvGrpSpPr/>
+        <p:nvPr/>
+      </p:nvGrpSpPr>
+      <p:grpSpPr>
+        <a:xfrm>
+          <a:off x="0" y="0"/>
+          <a:ext cx="0" cy="0"/>
+          <a:chOff x="0" y="0"/>
+          <a:chExt cx="0" cy="0"/>
+        </a:xfrm>
+      </p:grpSpPr>
+      <p:sp>
+        <p:nvSpPr>
+          <p:cNvPr id="2" name="Title 1"/>
+          <p:cNvSpPr>
+            <a:spLocks noGrp="1"/>
+          </p:cNvSpPr>
+          <p:nvPr>
+            <p:ph type="title"/>
+          </p:nvPr>
+        </p:nvSpPr>
+        <p:spPr/>
+        <p:txBody>
+          <a:bodyPr/>
+          <a:lstStyle/>
+          <a:p>
+            <a:r>
+              <a:rPr lang="en-US" dirty="0"/>
+              <a:t>Next week</a:t>
+            </a:r>
+            <a:endParaRPr lang="nl-NL" dirty="0"/>
+          </a:p>
+        </p:txBody>
+      </p:sp>
+      <p:sp>
+        <p:nvSpPr>
+          <p:cNvPr id="3" name="Content Placeholder 2"/>
+          <p:cNvSpPr>
+            <a:spLocks noGrp="1"/>
+          </p:cNvSpPr>
+          <p:nvPr>
+            <p:ph idx="1"/>
+          </p:nvPr>
+        </p:nvSpPr>
+        <p:spPr/>
+        <p:txBody>
+          <a:bodyPr>
+            <a:normAutofit lnSpcReduction="10000"/>
+          </a:bodyPr>
+          <a:lstStyle/>
+          <a:p>
+            <a:r>
+              <a:rPr lang="en-US" dirty="0"/>
+              <a:t>Lecture on “designed big data”</a:t>
+            </a:r>
+          </a:p>
+          <a:p>
+            <a:r>
+              <a:rPr lang="en-US" dirty="0"/>
+              <a:t>Keep working on your group assignments</a:t>
+            </a:r>
+          </a:p>
+          <a:p>
+            <a:r>
+              <a:rPr lang="en-US" dirty="0"/>
+              <a:t>In two weeks -&gt; final meeting</a:t>
+            </a:r>
+          </a:p>
+          <a:p>
+            <a:pPr lvl="1"/>
+            <a:r>
+              <a:rPr lang="en-US" dirty="0"/>
+              <a:t>Prepare an online document that should be readable in 6 minutes</a:t>
+            </a:r>
+          </a:p>
+          <a:p>
+            <a:pPr lvl="2"/>
+            <a:r>
+              <a:rPr lang="en-US" dirty="0"/>
+              <a:t>Video, wiki, website….</a:t>
+            </a:r>
+          </a:p>
+          <a:p>
+            <a:pPr lvl="1"/>
+            <a:r>
+              <a:rPr lang="en-US" dirty="0"/>
+              <a:t>Send around by December 9, 17:00</a:t>
+            </a:r>
+          </a:p>
+          <a:p>
+            <a:pPr lvl="1"/>
+            <a:r>
+              <a:rPr lang="en-US" dirty="0"/>
+              <a:t>Review 1 presentation of other group and prepare 3 questions.</a:t>
+            </a:r>
+          </a:p>
+          <a:p>
+            <a:pPr marL="457200" lvl="1" indent="0">
+              <a:buNone/>
+            </a:pPr>
+            <a:endParaRPr lang="en-US" dirty="0"/>
+          </a:p>
+        </p:txBody>
+      </p:sp>
+      <p:sp>
+        <p:nvSpPr>
+          <p:cNvPr id="4" name="Tijdelijke aanduiding voor dianummer 3">
+            <a:extLst>
+              <a:ext uri="{FF2B5EF4-FFF2-40B4-BE49-F238E27FC236}">
+                <a16:creationId xmlns:a16="http://schemas.microsoft.com/office/drawing/2014/main" id="{D6EF2CDD-F37D-0E4A-9C7F-FAC5F12EE7BF}"/>
+              </a:ext>
+            </a:extLst>
+          </p:cNvPr>
+          <p:cNvSpPr>
+            <a:spLocks noGrp="1"/>
+          </p:cNvSpPr>
+          <p:nvPr>
+            <p:ph type="sldNum" sz="quarter" idx="12"/>
+          </p:nvPr>
+        </p:nvSpPr>
+        <p:spPr/>
+        <p:txBody>
+          <a:bodyPr/>
+          <a:lstStyle/>
+          <a:p>
+            <a:fld id="{DBA3E7B4-B031-428C-A875-F1315D524DB8}" type="slidenum">
+              <a:rPr lang="nl-NL" smtClean="0"/>
+              <a:t>40</a:t>
+            </a:fld>
+            <a:endParaRPr lang="nl-NL"/>
+          </a:p>
+        </p:txBody>
+      </p:sp>
+    </p:spTree>
+    <p:extLst>
+      <p:ext uri="{BB962C8B-B14F-4D97-AF65-F5344CB8AC3E}">
+        <p14:creationId xmlns:p14="http://schemas.microsoft.com/office/powerpoint/2010/main" val="4263769302"/>
+      </p:ext>
+    </p:extLst>
+  </p:cSld>
+  <p:clrMapOvr>
+    <a:masterClrMapping/>
+  </p:clrMapOvr>
+</p:sld>
+</file>
+
+<file path=ppt/slides/slide41.xml><?xml version="1.0" encoding="utf-8"?>
+<p:sld xmlns:a="http://schemas.openxmlformats.org/drawingml/2006/main" xmlns:r="http://schemas.openxmlformats.org/officeDocument/2006/relationships" xmlns:p="http://schemas.openxmlformats.org/presentationml/2006/main">
+  <p:cSld>
+    <p:spTree>
+      <p:nvGrpSpPr>
+        <p:cNvPr id="1" name=""/>
+        <p:cNvGrpSpPr/>
+        <p:nvPr/>
+      </p:nvGrpSpPr>
+      <p:grpSpPr>
+        <a:xfrm>
+          <a:off x="0" y="0"/>
+          <a:ext cx="0" cy="0"/>
+          <a:chOff x="0" y="0"/>
+          <a:chExt cx="0" cy="0"/>
+        </a:xfrm>
+      </p:grpSpPr>
+      <p:sp>
+        <p:nvSpPr>
+          <p:cNvPr id="2" name="Titel 1">
+            <a:extLst>
+              <a:ext uri="{FF2B5EF4-FFF2-40B4-BE49-F238E27FC236}">
+                <a16:creationId xmlns:a16="http://schemas.microsoft.com/office/drawing/2014/main" id="{8F46763A-7CF9-3149-9298-E75487E48A67}"/>
+              </a:ext>
+            </a:extLst>
+          </p:cNvPr>
+          <p:cNvSpPr>
+            <a:spLocks noGrp="1"/>
+          </p:cNvSpPr>
+          <p:nvPr>
+            <p:ph type="title"/>
+          </p:nvPr>
+        </p:nvSpPr>
+        <p:spPr/>
+        <p:txBody>
+          <a:bodyPr/>
+          <a:lstStyle/>
+          <a:p>
+            <a:r>
+              <a:rPr lang="nl-NL" dirty="0"/>
+              <a:t>More reading?</a:t>
+            </a:r>
+          </a:p>
+        </p:txBody>
+      </p:sp>
+      <p:sp>
+        <p:nvSpPr>
+          <p:cNvPr id="3" name="Tijdelijke aanduiding voor inhoud 2">
+            <a:extLst>
+              <a:ext uri="{FF2B5EF4-FFF2-40B4-BE49-F238E27FC236}">
+                <a16:creationId xmlns:a16="http://schemas.microsoft.com/office/drawing/2014/main" id="{AD1FBDDC-7626-C24B-9CCB-C7812ECBC2DF}"/>
+              </a:ext>
+            </a:extLst>
+          </p:cNvPr>
+          <p:cNvSpPr>
+            <a:spLocks noGrp="1"/>
+          </p:cNvSpPr>
+          <p:nvPr>
+            <p:ph idx="1"/>
+          </p:nvPr>
+        </p:nvSpPr>
+        <p:spPr/>
+        <p:txBody>
+          <a:bodyPr>
+            <a:normAutofit fontScale="55000" lnSpcReduction="20000"/>
+          </a:bodyPr>
+          <a:lstStyle/>
+          <a:p>
+            <a:r>
+              <a:rPr lang="nl-NL" dirty="0" err="1"/>
+              <a:t>Andridge</a:t>
+            </a:r>
+            <a:r>
+              <a:rPr lang="nl-NL" dirty="0"/>
+              <a:t>, R. R., &amp; Little, R. J. (2011). Proxy </a:t>
+            </a:r>
+            <a:r>
+              <a:rPr lang="nl-NL" dirty="0" err="1"/>
+              <a:t>pattern</a:t>
+            </a:r>
+            <a:r>
+              <a:rPr lang="nl-NL" dirty="0"/>
+              <a:t>-mixture analysis </a:t>
+            </a:r>
+            <a:r>
+              <a:rPr lang="nl-NL" dirty="0" err="1"/>
+              <a:t>for</a:t>
+            </a:r>
+            <a:r>
+              <a:rPr lang="nl-NL" dirty="0"/>
+              <a:t> survey </a:t>
+            </a:r>
+            <a:r>
+              <a:rPr lang="nl-NL" dirty="0" err="1"/>
+              <a:t>nonresponse</a:t>
+            </a:r>
+            <a:r>
+              <a:rPr lang="nl-NL" dirty="0"/>
+              <a:t>. </a:t>
+            </a:r>
+            <a:r>
+              <a:rPr lang="nl-NL" i="1" dirty="0"/>
+              <a:t>Journal of Official </a:t>
+            </a:r>
+            <a:r>
+              <a:rPr lang="nl-NL" i="1" dirty="0" err="1"/>
+              <a:t>Statistics</a:t>
+            </a:r>
+            <a:r>
+              <a:rPr lang="nl-NL" dirty="0"/>
+              <a:t>, </a:t>
+            </a:r>
+            <a:r>
+              <a:rPr lang="nl-NL" i="1" dirty="0"/>
+              <a:t>27</a:t>
+            </a:r>
+            <a:r>
+              <a:rPr lang="nl-NL" dirty="0"/>
+              <a:t>(2), </a:t>
+            </a:r>
+            <a:r>
+              <a:rPr lang="nl-NL"/>
+              <a:t>153.</a:t>
+            </a:r>
+            <a:endParaRPr lang="nl-NL" dirty="0"/>
+          </a:p>
+          <a:p>
+            <a:r>
+              <a:rPr lang="nl-NL" dirty="0"/>
+              <a:t>Chen, S., Yang, S., &amp; Kim, J. K. (2020). </a:t>
+            </a:r>
+            <a:r>
+              <a:rPr lang="nl-NL" dirty="0" err="1"/>
+              <a:t>Nonparametric</a:t>
+            </a:r>
+            <a:r>
+              <a:rPr lang="nl-NL" dirty="0"/>
+              <a:t> Mass </a:t>
+            </a:r>
+            <a:r>
+              <a:rPr lang="nl-NL" dirty="0" err="1"/>
+              <a:t>Imputation</a:t>
+            </a:r>
+            <a:r>
+              <a:rPr lang="nl-NL" dirty="0"/>
+              <a:t> </a:t>
+            </a:r>
+            <a:r>
+              <a:rPr lang="nl-NL" dirty="0" err="1"/>
+              <a:t>for</a:t>
+            </a:r>
+            <a:r>
+              <a:rPr lang="nl-NL" dirty="0"/>
+              <a:t> Data Integration. </a:t>
+            </a:r>
+            <a:r>
+              <a:rPr lang="nl-NL" i="1" dirty="0"/>
+              <a:t>Journal of Survey </a:t>
+            </a:r>
+            <a:r>
+              <a:rPr lang="nl-NL" i="1" dirty="0" err="1"/>
+              <a:t>Statistics</a:t>
+            </a:r>
+            <a:r>
+              <a:rPr lang="nl-NL" i="1" dirty="0"/>
+              <a:t> </a:t>
+            </a:r>
+            <a:r>
+              <a:rPr lang="nl-NL" i="1" dirty="0" err="1"/>
+              <a:t>and</a:t>
+            </a:r>
+            <a:r>
+              <a:rPr lang="nl-NL" i="1" dirty="0"/>
+              <a:t> </a:t>
+            </a:r>
+            <a:r>
+              <a:rPr lang="nl-NL" i="1" dirty="0" err="1"/>
+              <a:t>Methodology</a:t>
+            </a:r>
+            <a:r>
+              <a:rPr lang="nl-NL" dirty="0"/>
+              <a:t>.</a:t>
+            </a:r>
+          </a:p>
+          <a:p>
+            <a:r>
+              <a:rPr lang="nl-NL" dirty="0"/>
+              <a:t>Elliott, M. R., &amp; </a:t>
+            </a:r>
+            <a:r>
+              <a:rPr lang="nl-NL" dirty="0" err="1"/>
+              <a:t>Valliant</a:t>
+            </a:r>
+            <a:r>
+              <a:rPr lang="nl-NL" dirty="0"/>
+              <a:t>, R. (2017). </a:t>
+            </a:r>
+            <a:r>
+              <a:rPr lang="nl-NL" dirty="0" err="1"/>
+              <a:t>Inference</a:t>
+            </a:r>
+            <a:r>
+              <a:rPr lang="nl-NL" dirty="0"/>
+              <a:t> </a:t>
+            </a:r>
+            <a:r>
+              <a:rPr lang="nl-NL" dirty="0" err="1"/>
+              <a:t>for</a:t>
+            </a:r>
+            <a:r>
+              <a:rPr lang="nl-NL" dirty="0"/>
+              <a:t> </a:t>
+            </a:r>
+            <a:r>
+              <a:rPr lang="nl-NL" dirty="0" err="1"/>
+              <a:t>nonprobability</a:t>
+            </a:r>
+            <a:r>
+              <a:rPr lang="nl-NL" dirty="0"/>
+              <a:t> samples. </a:t>
+            </a:r>
+            <a:r>
+              <a:rPr lang="nl-NL" i="1" dirty="0"/>
+              <a:t>Statistical </a:t>
+            </a:r>
+            <a:r>
+              <a:rPr lang="nl-NL" i="1" dirty="0" err="1"/>
+              <a:t>Science</a:t>
+            </a:r>
+            <a:r>
+              <a:rPr lang="nl-NL" dirty="0"/>
+              <a:t>, </a:t>
+            </a:r>
+            <a:r>
+              <a:rPr lang="nl-NL" i="1" dirty="0"/>
+              <a:t>32</a:t>
+            </a:r>
+            <a:r>
+              <a:rPr lang="nl-NL" dirty="0"/>
+              <a:t>(2), 249-264.</a:t>
+            </a:r>
+          </a:p>
+          <a:p>
+            <a:r>
+              <a:rPr lang="nl-NL" dirty="0"/>
+              <a:t>Kim, J. K., Park, S., Chen, Y., &amp; </a:t>
+            </a:r>
+            <a:r>
+              <a:rPr lang="nl-NL" dirty="0" err="1"/>
+              <a:t>Wu</a:t>
+            </a:r>
+            <a:r>
+              <a:rPr lang="nl-NL" dirty="0"/>
+              <a:t>, C. (2018). </a:t>
+            </a:r>
+            <a:r>
+              <a:rPr lang="nl-NL" dirty="0" err="1"/>
+              <a:t>Combining</a:t>
+            </a:r>
+            <a:r>
+              <a:rPr lang="nl-NL" dirty="0"/>
+              <a:t> non-</a:t>
+            </a:r>
+            <a:r>
+              <a:rPr lang="nl-NL" dirty="0" err="1"/>
+              <a:t>probability</a:t>
+            </a:r>
+            <a:r>
+              <a:rPr lang="nl-NL" dirty="0"/>
+              <a:t> </a:t>
+            </a:r>
+            <a:r>
+              <a:rPr lang="nl-NL" dirty="0" err="1"/>
+              <a:t>and</a:t>
+            </a:r>
+            <a:r>
+              <a:rPr lang="nl-NL" dirty="0"/>
+              <a:t> </a:t>
+            </a:r>
+            <a:r>
+              <a:rPr lang="nl-NL" dirty="0" err="1"/>
+              <a:t>probability</a:t>
+            </a:r>
+            <a:r>
+              <a:rPr lang="nl-NL" dirty="0"/>
+              <a:t> survey samples </a:t>
+            </a:r>
+            <a:r>
+              <a:rPr lang="nl-NL" dirty="0" err="1"/>
+              <a:t>through</a:t>
+            </a:r>
+            <a:r>
+              <a:rPr lang="nl-NL" dirty="0"/>
+              <a:t> </a:t>
+            </a:r>
+            <a:r>
+              <a:rPr lang="nl-NL" dirty="0" err="1"/>
+              <a:t>mass</a:t>
+            </a:r>
+            <a:r>
+              <a:rPr lang="nl-NL" dirty="0"/>
+              <a:t> </a:t>
+            </a:r>
+            <a:r>
+              <a:rPr lang="nl-NL" dirty="0" err="1"/>
+              <a:t>imputation</a:t>
+            </a:r>
+            <a:r>
+              <a:rPr lang="nl-NL" dirty="0"/>
+              <a:t>. </a:t>
+            </a:r>
+            <a:r>
+              <a:rPr lang="nl-NL" i="1" dirty="0" err="1"/>
+              <a:t>arXiv</a:t>
+            </a:r>
+            <a:r>
+              <a:rPr lang="nl-NL" i="1" dirty="0"/>
+              <a:t> preprint arXiv:1812.10694</a:t>
+            </a:r>
+            <a:r>
+              <a:rPr lang="nl-NL" dirty="0"/>
+              <a:t>.</a:t>
+            </a:r>
+          </a:p>
+          <a:p>
+            <a:r>
+              <a:rPr lang="nl-NL" dirty="0" err="1"/>
+              <a:t>Rafei</a:t>
+            </a:r>
+            <a:r>
+              <a:rPr lang="nl-NL" dirty="0"/>
+              <a:t>, A., </a:t>
+            </a:r>
+            <a:r>
+              <a:rPr lang="nl-NL" dirty="0" err="1"/>
+              <a:t>Flannagan</a:t>
+            </a:r>
+            <a:r>
+              <a:rPr lang="nl-NL" dirty="0"/>
+              <a:t>, C. A., &amp; Elliott, M. R. (2020). Big Data </a:t>
+            </a:r>
+            <a:r>
+              <a:rPr lang="nl-NL" dirty="0" err="1"/>
+              <a:t>for</a:t>
+            </a:r>
+            <a:r>
+              <a:rPr lang="nl-NL" dirty="0"/>
+              <a:t> </a:t>
+            </a:r>
+            <a:r>
+              <a:rPr lang="nl-NL" dirty="0" err="1"/>
+              <a:t>Finite</a:t>
+            </a:r>
+            <a:r>
+              <a:rPr lang="nl-NL" dirty="0"/>
+              <a:t> </a:t>
+            </a:r>
+            <a:r>
+              <a:rPr lang="nl-NL" dirty="0" err="1"/>
+              <a:t>Population</a:t>
+            </a:r>
+            <a:r>
+              <a:rPr lang="nl-NL" dirty="0"/>
+              <a:t> </a:t>
+            </a:r>
+            <a:r>
+              <a:rPr lang="nl-NL" dirty="0" err="1"/>
+              <a:t>Inference</a:t>
+            </a:r>
+            <a:r>
+              <a:rPr lang="nl-NL" dirty="0"/>
+              <a:t>: </a:t>
+            </a:r>
+            <a:r>
+              <a:rPr lang="nl-NL" dirty="0" err="1"/>
+              <a:t>Applying</a:t>
+            </a:r>
+            <a:r>
+              <a:rPr lang="nl-NL" dirty="0"/>
+              <a:t> Quasi-Random Approaches </a:t>
+            </a:r>
+            <a:r>
+              <a:rPr lang="nl-NL" dirty="0" err="1"/>
+              <a:t>to</a:t>
+            </a:r>
+            <a:r>
+              <a:rPr lang="nl-NL" dirty="0"/>
+              <a:t> </a:t>
+            </a:r>
+            <a:r>
+              <a:rPr lang="nl-NL" dirty="0" err="1"/>
+              <a:t>Naturalistic</a:t>
+            </a:r>
+            <a:r>
+              <a:rPr lang="nl-NL" dirty="0"/>
+              <a:t> </a:t>
+            </a:r>
+            <a:r>
+              <a:rPr lang="nl-NL" dirty="0" err="1"/>
+              <a:t>Driving</a:t>
+            </a:r>
+            <a:r>
+              <a:rPr lang="nl-NL" dirty="0"/>
+              <a:t> Data Using </a:t>
+            </a:r>
+            <a:r>
+              <a:rPr lang="nl-NL" dirty="0" err="1"/>
+              <a:t>Bayesian</a:t>
+            </a:r>
+            <a:r>
+              <a:rPr lang="nl-NL" dirty="0"/>
+              <a:t> Additive </a:t>
+            </a:r>
+            <a:r>
+              <a:rPr lang="nl-NL" dirty="0" err="1"/>
+              <a:t>Regression</a:t>
+            </a:r>
+            <a:r>
+              <a:rPr lang="nl-NL" dirty="0"/>
+              <a:t> Trees. </a:t>
+            </a:r>
+            <a:r>
+              <a:rPr lang="nl-NL" i="1" dirty="0"/>
+              <a:t>Journal of Survey </a:t>
+            </a:r>
+            <a:r>
+              <a:rPr lang="nl-NL" i="1" dirty="0" err="1"/>
+              <a:t>Statistics</a:t>
+            </a:r>
+            <a:r>
+              <a:rPr lang="nl-NL" i="1" dirty="0"/>
+              <a:t> </a:t>
+            </a:r>
+            <a:r>
+              <a:rPr lang="nl-NL" i="1" dirty="0" err="1"/>
+              <a:t>and</a:t>
+            </a:r>
+            <a:r>
+              <a:rPr lang="nl-NL" i="1" dirty="0"/>
+              <a:t> </a:t>
+            </a:r>
+            <a:r>
+              <a:rPr lang="nl-NL" i="1" dirty="0" err="1"/>
+              <a:t>Methodology</a:t>
+            </a:r>
+            <a:r>
+              <a:rPr lang="nl-NL" dirty="0"/>
+              <a:t>, </a:t>
+            </a:r>
+            <a:r>
+              <a:rPr lang="nl-NL" i="1" dirty="0"/>
+              <a:t>8</a:t>
+            </a:r>
+            <a:r>
+              <a:rPr lang="nl-NL" dirty="0"/>
+              <a:t>(1), 148-180.</a:t>
+            </a:r>
+          </a:p>
+          <a:p>
+            <a:r>
+              <a:rPr lang="nl-NL" dirty="0" err="1"/>
+              <a:t>Valliant</a:t>
+            </a:r>
+            <a:r>
+              <a:rPr lang="nl-NL" dirty="0"/>
+              <a:t>, R. (2020). </a:t>
+            </a:r>
+            <a:r>
+              <a:rPr lang="nl-NL" dirty="0" err="1"/>
+              <a:t>Comparing</a:t>
+            </a:r>
+            <a:r>
+              <a:rPr lang="nl-NL" dirty="0"/>
+              <a:t> </a:t>
+            </a:r>
+            <a:r>
+              <a:rPr lang="nl-NL" dirty="0" err="1"/>
+              <a:t>alternatives</a:t>
+            </a:r>
+            <a:r>
+              <a:rPr lang="nl-NL" dirty="0"/>
+              <a:t> </a:t>
+            </a:r>
+            <a:r>
+              <a:rPr lang="nl-NL" dirty="0" err="1"/>
+              <a:t>for</a:t>
+            </a:r>
+            <a:r>
+              <a:rPr lang="nl-NL" dirty="0"/>
+              <a:t> </a:t>
+            </a:r>
+            <a:r>
+              <a:rPr lang="nl-NL" dirty="0" err="1"/>
+              <a:t>estimation</a:t>
+            </a:r>
+            <a:r>
+              <a:rPr lang="nl-NL" dirty="0"/>
+              <a:t> </a:t>
+            </a:r>
+            <a:r>
+              <a:rPr lang="nl-NL" dirty="0" err="1"/>
+              <a:t>from</a:t>
+            </a:r>
+            <a:r>
+              <a:rPr lang="nl-NL" dirty="0"/>
+              <a:t> </a:t>
+            </a:r>
+            <a:r>
+              <a:rPr lang="nl-NL" dirty="0" err="1"/>
+              <a:t>nonprobability</a:t>
+            </a:r>
+            <a:r>
+              <a:rPr lang="nl-NL" dirty="0"/>
+              <a:t> samples. </a:t>
+            </a:r>
+            <a:r>
+              <a:rPr lang="nl-NL" i="1" dirty="0"/>
+              <a:t>Journal of Survey </a:t>
+            </a:r>
+            <a:r>
+              <a:rPr lang="nl-NL" i="1" dirty="0" err="1"/>
+              <a:t>Statistics</a:t>
+            </a:r>
+            <a:r>
+              <a:rPr lang="nl-NL" i="1" dirty="0"/>
+              <a:t> and Methodology</a:t>
+            </a:r>
+            <a:r>
+              <a:rPr lang="nl-NL" dirty="0"/>
+              <a:t>, </a:t>
+            </a:r>
+            <a:r>
+              <a:rPr lang="nl-NL" i="1" dirty="0"/>
+              <a:t>8</a:t>
+            </a:r>
+            <a:r>
+              <a:rPr lang="nl-NL" dirty="0"/>
+              <a:t>(2), 231-263.</a:t>
+            </a:r>
+          </a:p>
+          <a:p>
+            <a:r>
+              <a:rPr lang="en-US" dirty="0"/>
+              <a:t>West, B. T., &amp; </a:t>
+            </a:r>
+            <a:r>
+              <a:rPr lang="en-US" dirty="0" err="1"/>
+              <a:t>Andridge</a:t>
+            </a:r>
+            <a:r>
+              <a:rPr lang="en-US" dirty="0"/>
+              <a:t>, R. R. (2023). Evaluating Pre-Election Polling Estimates Using a New Measure of Non-Ignorable Selection Bias. </a:t>
+            </a:r>
+            <a:r>
+              <a:rPr lang="en-US" i="1" dirty="0"/>
+              <a:t>Public Opinion Quarterly</a:t>
+            </a:r>
+            <a:r>
+              <a:rPr lang="en-US" dirty="0"/>
+              <a:t>, nfad018.</a:t>
+            </a:r>
+            <a:endParaRPr lang="nl-NL" dirty="0"/>
+          </a:p>
+        </p:txBody>
+      </p:sp>
+      <p:sp>
+        <p:nvSpPr>
+          <p:cNvPr id="4" name="Tijdelijke aanduiding voor dianummer 3">
+            <a:extLst>
+              <a:ext uri="{FF2B5EF4-FFF2-40B4-BE49-F238E27FC236}">
+                <a16:creationId xmlns:a16="http://schemas.microsoft.com/office/drawing/2014/main" id="{46CD17B0-E9CD-2144-A066-E13E2E3F221D}"/>
+              </a:ext>
+            </a:extLst>
+          </p:cNvPr>
+          <p:cNvSpPr>
+            <a:spLocks noGrp="1"/>
+          </p:cNvSpPr>
+          <p:nvPr>
+            <p:ph type="sldNum" sz="quarter" idx="12"/>
+          </p:nvPr>
+        </p:nvSpPr>
+        <p:spPr/>
+        <p:txBody>
+          <a:bodyPr/>
+          <a:lstStyle/>
+          <a:p>
+            <a:fld id="{DBA3E7B4-B031-428C-A875-F1315D524DB8}" type="slidenum">
+              <a:rPr lang="nl-NL" smtClean="0"/>
+              <a:t>41</a:t>
+            </a:fld>
+            <a:endParaRPr lang="nl-NL"/>
+          </a:p>
+        </p:txBody>
+      </p:sp>
+    </p:spTree>
+    <p:extLst>
+      <p:ext uri="{BB962C8B-B14F-4D97-AF65-F5344CB8AC3E}">
+        <p14:creationId xmlns:p14="http://schemas.microsoft.com/office/powerpoint/2010/main" val="2118843225"/>
+      </p:ext>
+    </p:extLst>
+  </p:cSld>
+  <p:clrMapOvr>
+    <a:masterClrMapping/>
+  </p:clrMapOvr>
+</p:sld>
+</file>
+
 <file path=ppt/slides/slide5.xml><?xml version="1.0" encoding="utf-8"?>
 <p:sld xmlns:a="http://schemas.openxmlformats.org/drawingml/2006/main" xmlns:r="http://schemas.openxmlformats.org/officeDocument/2006/relationships" xmlns:p="http://schemas.openxmlformats.org/presentationml/2006/main">
   <p:cSld>
@@ -24524,16 +24781,6 @@
           <a:p>
             <a:r>
               <a:rPr lang="nl-NL" dirty="0" err="1"/>
-              <a:t>Cornesse</a:t>
-            </a:r>
-            <a:r>
-              <a:rPr lang="nl-NL" dirty="0"/>
-              <a:t> et al (2020)</a:t>
-            </a:r>
-          </a:p>
-          <a:p>
-            <a:r>
-              <a:rPr lang="nl-NL" dirty="0" err="1"/>
               <a:t>Mercer</a:t>
             </a:r>
             <a:r>
@@ -24545,6 +24792,16 @@
             <a:r>
               <a:rPr lang="nl-NL" dirty="0"/>
               <a:t>Meng (2018)</a:t>
+            </a:r>
+          </a:p>
+          <a:p>
+            <a:r>
+              <a:rPr lang="nl-NL" dirty="0" err="1"/>
+              <a:t>Valliant</a:t>
+            </a:r>
+            <a:r>
+              <a:rPr lang="nl-NL" dirty="0"/>
+              <a:t> (2020)</a:t>
             </a:r>
           </a:p>
           <a:p>
@@ -24714,14 +24971,14 @@
           <a:effectLst/>
           <a:extLst>
             <a:ext uri="{909E8E84-426E-40dd-AFC4-6F175D3DCCD1}">
-              <a14:hiddenFill xmlns:a14="http://schemas.microsoft.com/office/drawing/2010/main" xmlns="">
+              <a14:hiddenFill xmlns="" xmlns:a14="http://schemas.microsoft.com/office/drawing/2010/main">
                 <a:solidFill>
                   <a:schemeClr val="accent1"/>
                 </a:solidFill>
               </a14:hiddenFill>
             </a:ext>
             <a:ext uri="{91240B29-F687-4f45-9708-019B960494DF}">
-              <a14:hiddenLine xmlns:a14="http://schemas.microsoft.com/office/drawing/2010/main" xmlns="" w="9525">
+              <a14:hiddenLine xmlns="" xmlns:a14="http://schemas.microsoft.com/office/drawing/2010/main" w="9525">
                 <a:solidFill>
                   <a:schemeClr val="tx1"/>
                 </a:solidFill>
@@ -24731,7 +24988,7 @@
               </a14:hiddenLine>
             </a:ext>
             <a:ext uri="{AF507438-7753-43e0-B8FC-AC1667EBCBE1}">
-              <a14:hiddenEffects xmlns:a14="http://schemas.microsoft.com/office/drawing/2010/main" xmlns="">
+              <a14:hiddenEffects xmlns="" xmlns:a14="http://schemas.microsoft.com/office/drawing/2010/main">
                 <a:effectLst>
                   <a:outerShdw dist="35921" dir="2700000" algn="ctr" rotWithShape="0">
                     <a:schemeClr val="bg2"/>
@@ -25092,7 +25349,7 @@
           <p:cNvPr id="2" name="Titel 1">
             <a:extLst>
               <a:ext uri="{FF2B5EF4-FFF2-40B4-BE49-F238E27FC236}">
-                <a16:creationId xmlns:a16="http://schemas.microsoft.com/office/drawing/2014/main" id="{0654984B-CB37-5F49-8CDE-A4ABBF337DE6}"/>
+                <a16:creationId xmlns:a16="http://schemas.microsoft.com/office/drawing/2014/main" id="{EA39CBEB-3613-D243-8D99-5C5CBB63FA18}"/>
               </a:ext>
             </a:extLst>
           </p:cNvPr>
@@ -25110,11 +25367,11 @@
           <a:p>
             <a:r>
               <a:rPr lang="nl-NL" dirty="0" err="1"/>
-              <a:t>Cornesse</a:t>
-            </a:r>
-            <a:r>
-              <a:rPr lang="nl-NL" dirty="0"/>
-              <a:t> et al (2020)</a:t>
+              <a:t>Mercer</a:t>
+            </a:r>
+            <a:r>
+              <a:rPr lang="nl-NL" dirty="0"/>
+              <a:t> et al (2018)</a:t>
             </a:r>
           </a:p>
         </p:txBody>
@@ -25124,7 +25381,7 @@
           <p:cNvPr id="3" name="Tijdelijke aanduiding voor inhoud 2">
             <a:extLst>
               <a:ext uri="{FF2B5EF4-FFF2-40B4-BE49-F238E27FC236}">
-                <a16:creationId xmlns:a16="http://schemas.microsoft.com/office/drawing/2014/main" id="{323AB381-B320-5443-AECF-BC6C57A83709}"/>
+                <a16:creationId xmlns:a16="http://schemas.microsoft.com/office/drawing/2014/main" id="{E31142F6-7136-F74B-9C89-2133DF197A24}"/>
               </a:ext>
             </a:extLst>
           </p:cNvPr>
@@ -25137,147 +25394,56 @@
         </p:nvSpPr>
         <p:spPr/>
         <p:txBody>
-          <a:bodyPr>
-            <a:normAutofit/>
-          </a:bodyPr>
+          <a:bodyPr/>
           <a:lstStyle/>
           <a:p>
             <a:r>
               <a:rPr lang="nl-NL" dirty="0"/>
-              <a:t>Non-</a:t>
-            </a:r>
-            <a:r>
-              <a:rPr lang="nl-NL" dirty="0" err="1"/>
-              <a:t>probability</a:t>
-            </a:r>
-            <a:r>
-              <a:rPr lang="nl-NL" dirty="0"/>
-              <a:t> </a:t>
-            </a:r>
-            <a:r>
-              <a:rPr lang="nl-NL" dirty="0" err="1"/>
-              <a:t>surveys</a:t>
-            </a:r>
-            <a:r>
-              <a:rPr lang="nl-NL" dirty="0"/>
-              <a:t> do </a:t>
-            </a:r>
-            <a:r>
-              <a:rPr lang="nl-NL" dirty="0" err="1"/>
-              <a:t>worse</a:t>
-            </a:r>
-            <a:r>
-              <a:rPr lang="nl-NL" dirty="0"/>
-              <a:t> </a:t>
-            </a:r>
-            <a:r>
-              <a:rPr lang="nl-NL" dirty="0" err="1"/>
-              <a:t>than</a:t>
-            </a:r>
-            <a:r>
-              <a:rPr lang="nl-NL" dirty="0"/>
-              <a:t> </a:t>
-            </a:r>
-            <a:r>
-              <a:rPr lang="nl-NL" dirty="0" err="1"/>
-              <a:t>probability</a:t>
-            </a:r>
-            <a:r>
-              <a:rPr lang="nl-NL" dirty="0"/>
-              <a:t> </a:t>
-            </a:r>
-            <a:r>
-              <a:rPr lang="nl-NL" dirty="0" err="1"/>
-              <a:t>ones</a:t>
+              <a:t>Three </a:t>
+            </a:r>
+            <a:r>
+              <a:rPr lang="nl-NL" dirty="0" err="1"/>
+              <a:t>conditions</a:t>
+            </a:r>
+            <a:r>
+              <a:rPr lang="nl-NL" dirty="0"/>
+              <a:t> for </a:t>
+            </a:r>
+            <a:r>
+              <a:rPr lang="nl-NL" dirty="0" err="1"/>
+              <a:t>inference</a:t>
             </a:r>
             <a:endParaRPr lang="nl-NL" dirty="0"/>
           </a:p>
           <a:p>
+            <a:r>
+              <a:rPr lang="nl-NL" dirty="0" err="1"/>
+              <a:t>Which</a:t>
+            </a:r>
+            <a:r>
+              <a:rPr lang="nl-NL" dirty="0"/>
+              <a:t>? </a:t>
+            </a:r>
+            <a:r>
+              <a:rPr lang="nl-NL" dirty="0" err="1"/>
+              <a:t>Discuss</a:t>
+            </a:r>
+            <a:r>
+              <a:rPr lang="nl-NL" dirty="0"/>
+              <a:t> in pairs….</a:t>
+            </a:r>
+          </a:p>
+          <a:p>
+            <a:pPr lvl="2"/>
+            <a:endParaRPr lang="nl-NL" dirty="0"/>
+          </a:p>
+          <a:p>
             <a:pPr lvl="1"/>
-            <a:r>
-              <a:rPr lang="nl-NL" dirty="0"/>
-              <a:t>Fit </a:t>
-            </a:r>
-            <a:r>
-              <a:rPr lang="nl-NL" dirty="0" err="1"/>
-              <a:t>for</a:t>
-            </a:r>
-            <a:r>
-              <a:rPr lang="nl-NL" dirty="0"/>
-              <a:t> </a:t>
-            </a:r>
-            <a:r>
-              <a:rPr lang="nl-NL" dirty="0" err="1"/>
-              <a:t>purpose</a:t>
-            </a:r>
             <a:endParaRPr lang="nl-NL" dirty="0"/>
           </a:p>
           <a:p>
-            <a:r>
-              <a:rPr lang="nl-NL" dirty="0"/>
-              <a:t>In </a:t>
-            </a:r>
-            <a:r>
-              <a:rPr lang="nl-NL" dirty="0" err="1"/>
-              <a:t>what</a:t>
-            </a:r>
-            <a:r>
-              <a:rPr lang="nl-NL" dirty="0"/>
-              <a:t> </a:t>
-            </a:r>
-            <a:r>
-              <a:rPr lang="nl-NL" dirty="0" err="1"/>
-              <a:t>situation</a:t>
-            </a:r>
-            <a:r>
-              <a:rPr lang="nl-NL" dirty="0"/>
-              <a:t> is a non-</a:t>
-            </a:r>
-            <a:r>
-              <a:rPr lang="nl-NL" dirty="0" err="1"/>
-              <a:t>probability</a:t>
-            </a:r>
-            <a:r>
-              <a:rPr lang="nl-NL" dirty="0"/>
-              <a:t> sample </a:t>
-            </a:r>
-            <a:r>
-              <a:rPr lang="nl-NL" dirty="0" err="1"/>
-              <a:t>not</a:t>
-            </a:r>
-            <a:r>
-              <a:rPr lang="nl-NL" dirty="0"/>
-              <a:t> </a:t>
-            </a:r>
-            <a:r>
-              <a:rPr lang="nl-NL" dirty="0" err="1"/>
-              <a:t>too</a:t>
-            </a:r>
-            <a:r>
-              <a:rPr lang="nl-NL" dirty="0"/>
-              <a:t> bad? (in pairs – 3 minutes)</a:t>
-            </a:r>
-          </a:p>
-          <a:p>
             <a:pPr lvl="1"/>
-            <a:r>
-              <a:rPr lang="nl-NL" dirty="0"/>
-              <a:t> </a:t>
-            </a:r>
-          </a:p>
-          <a:p>
-            <a:pPr lvl="1"/>
-            <a:r>
-              <a:rPr lang="nl-NL" dirty="0"/>
-              <a:t> </a:t>
-            </a:r>
-          </a:p>
-          <a:p>
-            <a:pPr lvl="1"/>
-            <a:r>
-              <a:rPr lang="nl-NL" dirty="0"/>
-              <a:t> </a:t>
-            </a:r>
+            <a:endParaRPr lang="nl-NL" dirty="0"/>
           </a:p>
         </p:txBody>
       </p:sp>
@@ -25286,7 +25452,7 @@
           <p:cNvPr id="4" name="Tijdelijke aanduiding voor dianummer 3">
             <a:extLst>
               <a:ext uri="{FF2B5EF4-FFF2-40B4-BE49-F238E27FC236}">
-                <a16:creationId xmlns:a16="http://schemas.microsoft.com/office/drawing/2014/main" id="{1D981B05-3CDB-C94D-9633-F057C6BD9C9A}"/>
+                <a16:creationId xmlns:a16="http://schemas.microsoft.com/office/drawing/2014/main" id="{54ECB6BE-B7FD-224B-801A-D955E68FDD7A}"/>
               </a:ext>
             </a:extLst>
           </p:cNvPr>
@@ -25313,7 +25479,7 @@
     </p:spTree>
     <p:extLst>
       <p:ext uri="{BB962C8B-B14F-4D97-AF65-F5344CB8AC3E}">
-        <p14:creationId xmlns:p14="http://schemas.microsoft.com/office/powerpoint/2010/main" val="431653303"/>
+        <p14:creationId xmlns:p14="http://schemas.microsoft.com/office/powerpoint/2010/main" val="56267661"/>
       </p:ext>
     </p:extLst>
   </p:cSld>

</xml_diff>

<commit_message>
SDA week 14 + bio
</commit_message>
<xml_diff>
--- a/static/files/SDA/week13/lecture_week_13.pptx
+++ b/static/files/SDA/week13/lecture_week_13.pptx
@@ -50,7 +50,7 @@
     <p:sldId id="315" r:id="rId41"/>
     <p:sldId id="436" r:id="rId42"/>
   </p:sldIdLst>
-  <p:sldSz cx="9144000" cy="6858000" type="screen4x3"/>
+  <p:sldSz cx="12192000" cy="6858000"/>
   <p:notesSz cx="7099300" cy="10234613"/>
   <p:defaultTextStyle>
     <a:defPPr>
@@ -150,12 +150,12 @@
   <p:extLst>
     <p:ext uri="{EFAFB233-063F-42B5-8137-9DF3F51BA10A}">
       <p15:sldGuideLst xmlns:p15="http://schemas.microsoft.com/office/powerpoint/2012/main">
-        <p15:guide id="1" orient="horz" pos="2160">
+        <p15:guide id="1" orient="horz" pos="2160" userDrawn="1">
           <p15:clr>
             <a:srgbClr val="A4A3A4"/>
           </p15:clr>
         </p15:guide>
-        <p15:guide id="2" pos="2880">
+        <p15:guide id="2" pos="3840" userDrawn="1">
           <p15:clr>
             <a:srgbClr val="A4A3A4"/>
           </p15:clr>
@@ -266,8 +266,8 @@
         </p:nvSpPr>
         <p:spPr>
           <a:xfrm>
-            <a:off x="992188" y="768350"/>
-            <a:ext cx="5114925" cy="3836988"/>
+            <a:off x="139700" y="768350"/>
+            <a:ext cx="6819900" cy="3836988"/>
           </a:xfrm>
           <a:prstGeom prst="rect">
             <a:avLst/>
@@ -543,7 +543,12 @@
             <p:ph type="sldImg"/>
           </p:nvPr>
         </p:nvSpPr>
-        <p:spPr/>
+        <p:spPr>
+          <a:xfrm>
+            <a:off x="139700" y="768350"/>
+            <a:ext cx="6819900" cy="3836988"/>
+          </a:xfrm>
+        </p:spPr>
       </p:sp>
       <p:sp>
         <p:nvSpPr>
@@ -632,7 +637,12 @@
             <p:ph type="sldImg"/>
           </p:nvPr>
         </p:nvSpPr>
-        <p:spPr/>
+        <p:spPr>
+          <a:xfrm>
+            <a:off x="139700" y="768350"/>
+            <a:ext cx="6819900" cy="3836988"/>
+          </a:xfrm>
+        </p:spPr>
       </p:sp>
       <p:sp>
         <p:nvSpPr>
@@ -716,7 +726,12 @@
             <p:ph type="sldImg"/>
           </p:nvPr>
         </p:nvSpPr>
-        <p:spPr/>
+        <p:spPr>
+          <a:xfrm>
+            <a:off x="139700" y="768350"/>
+            <a:ext cx="6819900" cy="3836988"/>
+          </a:xfrm>
+        </p:spPr>
       </p:sp>
       <p:sp>
         <p:nvSpPr>
@@ -802,8 +817,8 @@
         </p:nvSpPr>
         <p:spPr>
           <a:xfrm>
-            <a:off x="685800" y="2130425"/>
-            <a:ext cx="7772400" cy="1470025"/>
+            <a:off x="914400" y="2130426"/>
+            <a:ext cx="10363200" cy="1470025"/>
           </a:xfrm>
         </p:spPr>
         <p:txBody>
@@ -830,8 +845,8 @@
         </p:nvSpPr>
         <p:spPr>
           <a:xfrm>
-            <a:off x="1371600" y="3886200"/>
-            <a:ext cx="6400800" cy="1752600"/>
+            <a:off x="1828800" y="3886200"/>
+            <a:ext cx="8534400" cy="1752600"/>
           </a:xfrm>
         </p:spPr>
         <p:txBody>
@@ -1214,8 +1229,8 @@
         </p:nvSpPr>
         <p:spPr>
           <a:xfrm>
-            <a:off x="6629400" y="274638"/>
-            <a:ext cx="2057400" cy="5851525"/>
+            <a:off x="8839200" y="274639"/>
+            <a:ext cx="2743200" cy="5851525"/>
           </a:xfrm>
         </p:spPr>
         <p:txBody>
@@ -1242,8 +1257,8 @@
         </p:nvSpPr>
         <p:spPr>
           <a:xfrm>
-            <a:off x="457200" y="274638"/>
-            <a:ext cx="6019800" cy="5851525"/>
+            <a:off x="609600" y="274639"/>
+            <a:ext cx="8026400" cy="5851525"/>
           </a:xfrm>
         </p:spPr>
         <p:txBody>
@@ -1564,8 +1579,8 @@
         </p:nvSpPr>
         <p:spPr>
           <a:xfrm>
-            <a:off x="722313" y="4406900"/>
-            <a:ext cx="7772400" cy="1362075"/>
+            <a:off x="963084" y="4406901"/>
+            <a:ext cx="10363200" cy="1362075"/>
           </a:xfrm>
         </p:spPr>
         <p:txBody>
@@ -1596,8 +1611,8 @@
         </p:nvSpPr>
         <p:spPr>
           <a:xfrm>
-            <a:off x="722313" y="2906713"/>
-            <a:ext cx="7772400" cy="1500187"/>
+            <a:off x="963084" y="2906713"/>
+            <a:ext cx="10363200" cy="1500187"/>
           </a:xfrm>
         </p:spPr>
         <p:txBody>
@@ -1833,8 +1848,8 @@
         </p:nvSpPr>
         <p:spPr>
           <a:xfrm>
-            <a:off x="457200" y="1600200"/>
-            <a:ext cx="4038600" cy="4525963"/>
+            <a:off x="609600" y="1600201"/>
+            <a:ext cx="5384800" cy="4525963"/>
           </a:xfrm>
         </p:spPr>
         <p:txBody>
@@ -1918,8 +1933,8 @@
         </p:nvSpPr>
         <p:spPr>
           <a:xfrm>
-            <a:off x="4648200" y="1600200"/>
-            <a:ext cx="4038600" cy="4525963"/>
+            <a:off x="6197600" y="1600201"/>
+            <a:ext cx="5384800" cy="4525963"/>
           </a:xfrm>
         </p:spPr>
         <p:txBody>
@@ -2125,8 +2140,8 @@
         </p:nvSpPr>
         <p:spPr>
           <a:xfrm>
-            <a:off x="457200" y="1535113"/>
-            <a:ext cx="4040188" cy="639762"/>
+            <a:off x="609600" y="1535113"/>
+            <a:ext cx="5386917" cy="639762"/>
           </a:xfrm>
         </p:spPr>
         <p:txBody>
@@ -2190,8 +2205,8 @@
         </p:nvSpPr>
         <p:spPr>
           <a:xfrm>
-            <a:off x="457200" y="2174875"/>
-            <a:ext cx="4040188" cy="3951288"/>
+            <a:off x="609600" y="2174875"/>
+            <a:ext cx="5386917" cy="3951288"/>
           </a:xfrm>
         </p:spPr>
         <p:txBody>
@@ -2275,8 +2290,8 @@
         </p:nvSpPr>
         <p:spPr>
           <a:xfrm>
-            <a:off x="4645025" y="1535113"/>
-            <a:ext cx="4041775" cy="639762"/>
+            <a:off x="6193368" y="1535113"/>
+            <a:ext cx="5389033" cy="639762"/>
           </a:xfrm>
         </p:spPr>
         <p:txBody>
@@ -2340,8 +2355,8 @@
         </p:nvSpPr>
         <p:spPr>
           <a:xfrm>
-            <a:off x="4645025" y="2174875"/>
-            <a:ext cx="4041775" cy="3951288"/>
+            <a:off x="6193368" y="2174875"/>
+            <a:ext cx="5389033" cy="3951288"/>
           </a:xfrm>
         </p:spPr>
         <p:txBody>
@@ -2733,8 +2748,8 @@
         </p:nvSpPr>
         <p:spPr>
           <a:xfrm>
-            <a:off x="457200" y="273050"/>
-            <a:ext cx="3008313" cy="1162050"/>
+            <a:off x="609601" y="273050"/>
+            <a:ext cx="4011084" cy="1162050"/>
           </a:xfrm>
         </p:spPr>
         <p:txBody>
@@ -2765,8 +2780,8 @@
         </p:nvSpPr>
         <p:spPr>
           <a:xfrm>
-            <a:off x="3575050" y="273050"/>
-            <a:ext cx="5111750" cy="5853113"/>
+            <a:off x="4766733" y="273051"/>
+            <a:ext cx="6815667" cy="5853113"/>
           </a:xfrm>
         </p:spPr>
         <p:txBody>
@@ -2850,8 +2865,8 @@
         </p:nvSpPr>
         <p:spPr>
           <a:xfrm>
-            <a:off x="457200" y="1435100"/>
-            <a:ext cx="3008313" cy="4691063"/>
+            <a:off x="609601" y="1435101"/>
+            <a:ext cx="4011084" cy="4691063"/>
           </a:xfrm>
         </p:spPr>
         <p:txBody>
@@ -3010,8 +3025,8 @@
         </p:nvSpPr>
         <p:spPr>
           <a:xfrm>
-            <a:off x="1792288" y="4800600"/>
-            <a:ext cx="5486400" cy="566738"/>
+            <a:off x="2389717" y="4800600"/>
+            <a:ext cx="7315200" cy="566738"/>
           </a:xfrm>
         </p:spPr>
         <p:txBody>
@@ -3042,8 +3057,8 @@
         </p:nvSpPr>
         <p:spPr>
           <a:xfrm>
-            <a:off x="1792288" y="612775"/>
-            <a:ext cx="5486400" cy="4114800"/>
+            <a:off x="2389717" y="612775"/>
+            <a:ext cx="7315200" cy="4114800"/>
           </a:xfrm>
         </p:spPr>
         <p:txBody>
@@ -3103,8 +3118,8 @@
         </p:nvSpPr>
         <p:spPr>
           <a:xfrm>
-            <a:off x="1792288" y="5367338"/>
-            <a:ext cx="5486400" cy="804862"/>
+            <a:off x="2389717" y="5367338"/>
+            <a:ext cx="7315200" cy="804862"/>
           </a:xfrm>
         </p:spPr>
         <p:txBody>
@@ -3268,8 +3283,8 @@
         </p:nvSpPr>
         <p:spPr>
           <a:xfrm>
-            <a:off x="457200" y="274638"/>
-            <a:ext cx="8229600" cy="1143000"/>
+            <a:off x="609600" y="274638"/>
+            <a:ext cx="10972800" cy="1143000"/>
           </a:xfrm>
           <a:prstGeom prst="rect">
             <a:avLst/>
@@ -3301,8 +3316,8 @@
         </p:nvSpPr>
         <p:spPr>
           <a:xfrm>
-            <a:off x="457200" y="1600200"/>
-            <a:ext cx="8229600" cy="4525963"/>
+            <a:off x="609600" y="1600201"/>
+            <a:ext cx="10972800" cy="4525963"/>
           </a:xfrm>
           <a:prstGeom prst="rect">
             <a:avLst/>
@@ -3363,8 +3378,8 @@
         </p:nvSpPr>
         <p:spPr>
           <a:xfrm>
-            <a:off x="457200" y="6356350"/>
-            <a:ext cx="2133600" cy="365125"/>
+            <a:off x="609600" y="6356351"/>
+            <a:ext cx="2844800" cy="365125"/>
           </a:xfrm>
           <a:prstGeom prst="rect">
             <a:avLst/>
@@ -3404,8 +3419,8 @@
         </p:nvSpPr>
         <p:spPr>
           <a:xfrm>
-            <a:off x="3124200" y="6356350"/>
-            <a:ext cx="2895600" cy="365125"/>
+            <a:off x="4165600" y="6356351"/>
+            <a:ext cx="3860800" cy="365125"/>
           </a:xfrm>
           <a:prstGeom prst="rect">
             <a:avLst/>
@@ -3441,8 +3456,8 @@
         </p:nvSpPr>
         <p:spPr>
           <a:xfrm>
-            <a:off x="6553200" y="6356350"/>
-            <a:ext cx="2133600" cy="365125"/>
+            <a:off x="8737600" y="6356351"/>
+            <a:ext cx="2844800" cy="365125"/>
           </a:xfrm>
           <a:prstGeom prst="rect">
             <a:avLst/>
@@ -4282,7 +4297,7 @@
         </p:nvSpPr>
         <p:spPr>
           <a:xfrm>
-            <a:off x="457200" y="1600201"/>
+            <a:off x="1981200" y="1600201"/>
             <a:ext cx="6491064" cy="2836912"/>
           </a:xfrm>
         </p:spPr>
@@ -4518,7 +4533,7 @@
         </p:nvSpPr>
         <p:spPr>
           <a:xfrm>
-            <a:off x="5652120" y="4086210"/>
+            <a:off x="7176120" y="4086211"/>
             <a:ext cx="1728192" cy="646331"/>
           </a:xfrm>
           <a:prstGeom prst="rect">
@@ -4554,7 +4569,7 @@
         </p:nvSpPr>
         <p:spPr>
           <a:xfrm>
-            <a:off x="5637548" y="6030426"/>
+            <a:off x="7161548" y="6030427"/>
             <a:ext cx="1728192" cy="646331"/>
           </a:xfrm>
           <a:prstGeom prst="rect">
@@ -4590,7 +4605,7 @@
         </p:nvSpPr>
         <p:spPr>
           <a:xfrm>
-            <a:off x="7380312" y="5958418"/>
+            <a:off x="8904312" y="5958419"/>
             <a:ext cx="1728192" cy="646331"/>
           </a:xfrm>
           <a:prstGeom prst="rect">
@@ -4626,7 +4641,7 @@
         </p:nvSpPr>
         <p:spPr>
           <a:xfrm>
-            <a:off x="7380312" y="4113947"/>
+            <a:off x="8904312" y="4113948"/>
             <a:ext cx="1728192" cy="646331"/>
           </a:xfrm>
           <a:prstGeom prst="rect">
@@ -4662,7 +4677,7 @@
         </p:nvCxnSpPr>
         <p:spPr>
           <a:xfrm>
-            <a:off x="5868144" y="4662274"/>
+            <a:off x="7392144" y="4662274"/>
             <a:ext cx="0" cy="1368152"/>
           </a:xfrm>
           <a:prstGeom prst="straightConnector1">
@@ -4701,7 +4716,7 @@
         </p:nvCxnSpPr>
         <p:spPr>
           <a:xfrm>
-            <a:off x="5868144" y="4662274"/>
+            <a:off x="7392144" y="4662274"/>
             <a:ext cx="1584176" cy="1368152"/>
           </a:xfrm>
           <a:prstGeom prst="straightConnector1">
@@ -4740,7 +4755,7 @@
         </p:nvCxnSpPr>
         <p:spPr>
           <a:xfrm>
-            <a:off x="7596336" y="4662274"/>
+            <a:off x="9120336" y="4662274"/>
             <a:ext cx="0" cy="1368152"/>
           </a:xfrm>
           <a:prstGeom prst="straightConnector1">
@@ -4781,7 +4796,7 @@
         </p:nvCxnSpPr>
         <p:spPr>
           <a:xfrm flipH="1" flipV="1">
-            <a:off x="6084168" y="6353591"/>
+            <a:off x="7608168" y="6353592"/>
             <a:ext cx="1281572" cy="1"/>
           </a:xfrm>
           <a:prstGeom prst="line">
@@ -4820,7 +4835,7 @@
         </p:nvSpPr>
         <p:spPr>
           <a:xfrm>
-            <a:off x="899592" y="4941168"/>
+            <a:off x="2423592" y="4941169"/>
             <a:ext cx="4464496" cy="646331"/>
           </a:xfrm>
           <a:prstGeom prst="rect">
@@ -5007,7 +5022,7 @@
         </p:nvSpPr>
         <p:spPr>
           <a:xfrm>
-            <a:off x="457200" y="1600201"/>
+            <a:off x="1981200" y="1600201"/>
             <a:ext cx="6491064" cy="2836912"/>
           </a:xfrm>
         </p:spPr>
@@ -5243,7 +5258,7 @@
         </p:nvSpPr>
         <p:spPr>
           <a:xfrm>
-            <a:off x="5652120" y="4086210"/>
+            <a:off x="7176120" y="4086211"/>
             <a:ext cx="1728192" cy="646331"/>
           </a:xfrm>
           <a:prstGeom prst="rect">
@@ -5279,7 +5294,7 @@
         </p:nvSpPr>
         <p:spPr>
           <a:xfrm>
-            <a:off x="5637548" y="6030426"/>
+            <a:off x="7161548" y="6030427"/>
             <a:ext cx="1728192" cy="646331"/>
           </a:xfrm>
           <a:prstGeom prst="rect">
@@ -5315,7 +5330,7 @@
         </p:nvSpPr>
         <p:spPr>
           <a:xfrm>
-            <a:off x="7380312" y="5958418"/>
+            <a:off x="8904312" y="5958419"/>
             <a:ext cx="1728192" cy="646331"/>
           </a:xfrm>
           <a:prstGeom prst="rect">
@@ -5351,7 +5366,7 @@
         </p:nvSpPr>
         <p:spPr>
           <a:xfrm>
-            <a:off x="7380312" y="4113947"/>
+            <a:off x="8904312" y="4113948"/>
             <a:ext cx="1728192" cy="646331"/>
           </a:xfrm>
           <a:prstGeom prst="rect">
@@ -5387,7 +5402,7 @@
         </p:nvCxnSpPr>
         <p:spPr>
           <a:xfrm>
-            <a:off x="5868144" y="4662274"/>
+            <a:off x="7392144" y="4662274"/>
             <a:ext cx="0" cy="1368152"/>
           </a:xfrm>
           <a:prstGeom prst="straightConnector1">
@@ -5426,7 +5441,7 @@
         </p:nvCxnSpPr>
         <p:spPr>
           <a:xfrm>
-            <a:off x="5868144" y="4662274"/>
+            <a:off x="7392144" y="4662274"/>
             <a:ext cx="1584176" cy="1368152"/>
           </a:xfrm>
           <a:prstGeom prst="straightConnector1">
@@ -5465,7 +5480,7 @@
         </p:nvCxnSpPr>
         <p:spPr>
           <a:xfrm>
-            <a:off x="7596336" y="4662274"/>
+            <a:off x="9120336" y="4662274"/>
             <a:ext cx="0" cy="1368152"/>
           </a:xfrm>
           <a:prstGeom prst="straightConnector1">
@@ -5506,7 +5521,7 @@
         </p:nvCxnSpPr>
         <p:spPr>
           <a:xfrm flipH="1" flipV="1">
-            <a:off x="6084168" y="6353591"/>
+            <a:off x="7608168" y="6353592"/>
             <a:ext cx="1281572" cy="1"/>
           </a:xfrm>
           <a:prstGeom prst="line">
@@ -5545,7 +5560,7 @@
         </p:nvSpPr>
         <p:spPr>
           <a:xfrm>
-            <a:off x="899592" y="4941168"/>
+            <a:off x="2423592" y="4941169"/>
             <a:ext cx="4464496" cy="646331"/>
           </a:xfrm>
           <a:prstGeom prst="rect">
@@ -5700,7 +5715,7 @@
         </p:nvSpPr>
         <p:spPr>
           <a:xfrm>
-            <a:off x="457200" y="274638"/>
+            <a:off x="1981200" y="274638"/>
             <a:ext cx="8723312" cy="1143000"/>
           </a:xfrm>
         </p:spPr>
@@ -5763,7 +5778,7 @@
         </p:nvSpPr>
         <p:spPr>
           <a:xfrm>
-            <a:off x="457200" y="1600200"/>
+            <a:off x="1981200" y="1600200"/>
             <a:ext cx="8229600" cy="4925144"/>
           </a:xfrm>
         </p:spPr>
@@ -5876,6 +5891,73 @@
             <a:pPr lvl="1"/>
             <a:r>
               <a:rPr lang="nl-NL" dirty="0"/>
+              <a:t>We want </a:t>
+            </a:r>
+            <a:r>
+              <a:rPr lang="nl-NL" dirty="0" err="1"/>
+              <a:t>to</a:t>
+            </a:r>
+            <a:r>
+              <a:rPr lang="nl-NL" dirty="0"/>
+              <a:t> test </a:t>
+            </a:r>
+            <a:r>
+              <a:rPr lang="nl-NL" dirty="0" err="1"/>
+              <a:t>causal</a:t>
+            </a:r>
+            <a:r>
+              <a:rPr lang="nl-NL" dirty="0"/>
+              <a:t> </a:t>
+            </a:r>
+            <a:r>
+              <a:rPr lang="nl-NL" dirty="0" err="1"/>
+              <a:t>mechanisms</a:t>
+            </a:r>
+            <a:endParaRPr lang="nl-NL" dirty="0"/>
+          </a:p>
+          <a:p>
+            <a:pPr lvl="2"/>
+            <a:r>
+              <a:rPr lang="nl-NL" dirty="0" err="1"/>
+              <a:t>Internal</a:t>
+            </a:r>
+            <a:r>
+              <a:rPr lang="nl-NL" dirty="0"/>
+              <a:t> </a:t>
+            </a:r>
+            <a:r>
+              <a:rPr lang="nl-NL" dirty="0" err="1"/>
+              <a:t>validity</a:t>
+            </a:r>
+            <a:endParaRPr lang="nl-NL" dirty="0"/>
+          </a:p>
+          <a:p>
+            <a:pPr lvl="2"/>
+            <a:r>
+              <a:rPr lang="nl-NL" dirty="0"/>
+              <a:t>More </a:t>
+            </a:r>
+            <a:r>
+              <a:rPr lang="nl-NL" dirty="0" err="1"/>
+              <a:t>psychological</a:t>
+            </a:r>
+            <a:r>
+              <a:rPr lang="nl-NL" dirty="0"/>
+              <a:t>/</a:t>
+            </a:r>
+            <a:r>
+              <a:rPr lang="nl-NL" dirty="0" err="1"/>
+              <a:t>medical</a:t>
+            </a:r>
+            <a:r>
+              <a:rPr lang="nl-NL" dirty="0"/>
+              <a:t> viewpoint</a:t>
+            </a:r>
+          </a:p>
+          <a:p>
+            <a:pPr lvl="1"/>
+            <a:r>
+              <a:rPr lang="nl-NL" dirty="0"/>
               <a:t>We </a:t>
             </a:r>
             <a:r>
@@ -5916,11 +5998,19 @@
             </a:r>
             <a:r>
               <a:rPr lang="nl-NL" dirty="0"/>
+              <a:t> and </a:t>
+            </a:r>
+            <a:r>
+              <a:rPr lang="nl-NL" dirty="0" err="1"/>
+              <a:t>models</a:t>
+            </a:r>
+            <a:r>
+              <a:rPr lang="nl-NL" dirty="0"/>
               <a:t> </a:t>
             </a:r>
             <a:r>
               <a:rPr lang="nl-NL" dirty="0" err="1"/>
-              <a:t>and</a:t>
+              <a:t>about</a:t>
             </a:r>
             <a:r>
               <a:rPr lang="nl-NL" dirty="0"/>
@@ -5928,7 +6018,7 @@
             </a:r>
             <a:r>
               <a:rPr lang="nl-NL" dirty="0" err="1"/>
-              <a:t>models</a:t>
+              <a:t>the</a:t>
             </a:r>
             <a:r>
               <a:rPr lang="nl-NL" dirty="0"/>
@@ -5936,7 +6026,15 @@
             </a:r>
             <a:r>
               <a:rPr lang="nl-NL" dirty="0" err="1"/>
-              <a:t>about</a:t>
+              <a:t>world</a:t>
+            </a:r>
+            <a:endParaRPr lang="nl-NL" dirty="0"/>
+          </a:p>
+          <a:p>
+            <a:pPr lvl="2"/>
+            <a:r>
+              <a:rPr lang="nl-NL" dirty="0" err="1"/>
+              <a:t>External</a:t>
             </a:r>
             <a:r>
               <a:rPr lang="nl-NL" dirty="0"/>
@@ -5944,123 +6042,36 @@
             </a:r>
             <a:r>
               <a:rPr lang="nl-NL" dirty="0" err="1"/>
-              <a:t>the</a:t>
-            </a:r>
-            <a:r>
-              <a:rPr lang="nl-NL" dirty="0"/>
-              <a:t> </a:t>
-            </a:r>
-            <a:r>
-              <a:rPr lang="nl-NL" dirty="0" err="1"/>
-              <a:t>world</a:t>
+              <a:t>validity</a:t>
             </a:r>
             <a:endParaRPr lang="nl-NL" dirty="0"/>
           </a:p>
           <a:p>
             <a:pPr lvl="2"/>
             <a:r>
-              <a:rPr lang="nl-NL" dirty="0" err="1"/>
-              <a:t>External</a:t>
-            </a:r>
-            <a:r>
-              <a:rPr lang="nl-NL" dirty="0"/>
-              <a:t> </a:t>
-            </a:r>
-            <a:r>
-              <a:rPr lang="nl-NL" dirty="0" err="1"/>
-              <a:t>validity</a:t>
-            </a:r>
+              <a:rPr lang="nl-NL" dirty="0"/>
+              <a:t>More </a:t>
+            </a:r>
+            <a:r>
+              <a:rPr lang="nl-NL" dirty="0" err="1"/>
+              <a:t>sociological</a:t>
+            </a:r>
+            <a:r>
+              <a:rPr lang="nl-NL" dirty="0"/>
+              <a:t>/</a:t>
+            </a:r>
+            <a:r>
+              <a:rPr lang="nl-NL" dirty="0" err="1"/>
+              <a:t>epidemiological</a:t>
+            </a:r>
+            <a:r>
+              <a:rPr lang="nl-NL" dirty="0"/>
+              <a:t> viewpoint</a:t>
+            </a:r>
+          </a:p>
+          <a:p>
+            <a:pPr lvl="2"/>
             <a:endParaRPr lang="nl-NL" dirty="0"/>
-          </a:p>
-          <a:p>
-            <a:pPr lvl="2"/>
-            <a:r>
-              <a:rPr lang="nl-NL" dirty="0"/>
-              <a:t>More </a:t>
-            </a:r>
-            <a:r>
-              <a:rPr lang="nl-NL" dirty="0" err="1"/>
-              <a:t>sociological</a:t>
-            </a:r>
-            <a:r>
-              <a:rPr lang="nl-NL" dirty="0"/>
-              <a:t>/</a:t>
-            </a:r>
-            <a:r>
-              <a:rPr lang="nl-NL" dirty="0" err="1"/>
-              <a:t>epidemiological</a:t>
-            </a:r>
-            <a:r>
-              <a:rPr lang="nl-NL" dirty="0"/>
-              <a:t> viewpoint</a:t>
-            </a:r>
-          </a:p>
-          <a:p>
-            <a:pPr lvl="1"/>
-            <a:r>
-              <a:rPr lang="nl-NL" dirty="0"/>
-              <a:t>We want </a:t>
-            </a:r>
-            <a:r>
-              <a:rPr lang="nl-NL" dirty="0" err="1"/>
-              <a:t>to</a:t>
-            </a:r>
-            <a:r>
-              <a:rPr lang="nl-NL" dirty="0"/>
-              <a:t> test </a:t>
-            </a:r>
-            <a:r>
-              <a:rPr lang="nl-NL" dirty="0" err="1"/>
-              <a:t>causal</a:t>
-            </a:r>
-            <a:r>
-              <a:rPr lang="nl-NL" dirty="0"/>
-              <a:t> </a:t>
-            </a:r>
-            <a:r>
-              <a:rPr lang="nl-NL" dirty="0" err="1"/>
-              <a:t>mechanisms</a:t>
-            </a:r>
-            <a:endParaRPr lang="nl-NL" dirty="0"/>
-          </a:p>
-          <a:p>
-            <a:pPr lvl="2"/>
-            <a:r>
-              <a:rPr lang="nl-NL" dirty="0" err="1"/>
-              <a:t>Internal</a:t>
-            </a:r>
-            <a:r>
-              <a:rPr lang="nl-NL" dirty="0"/>
-              <a:t> </a:t>
-            </a:r>
-            <a:r>
-              <a:rPr lang="nl-NL" dirty="0" err="1"/>
-              <a:t>validity</a:t>
-            </a:r>
-            <a:endParaRPr lang="nl-NL" dirty="0"/>
-          </a:p>
-          <a:p>
-            <a:pPr lvl="2"/>
-            <a:r>
-              <a:rPr lang="nl-NL" dirty="0"/>
-              <a:t>More </a:t>
-            </a:r>
-            <a:r>
-              <a:rPr lang="nl-NL" dirty="0" err="1"/>
-              <a:t>psychological</a:t>
-            </a:r>
-            <a:r>
-              <a:rPr lang="nl-NL" dirty="0"/>
-              <a:t>/</a:t>
-            </a:r>
-            <a:r>
-              <a:rPr lang="nl-NL" dirty="0" err="1"/>
-              <a:t>medical</a:t>
-            </a:r>
-            <a:r>
-              <a:rPr lang="nl-NL" dirty="0"/>
-              <a:t> viewpoint</a:t>
-            </a:r>
           </a:p>
         </p:txBody>
       </p:sp>
@@ -7052,7 +7063,7 @@
         <p:spPr/>
         <p:txBody>
           <a:bodyPr>
-            <a:normAutofit fontScale="90000"/>
+            <a:normAutofit/>
           </a:bodyPr>
           <a:lstStyle/>
           <a:p>
@@ -7088,7 +7099,7 @@
         </p:nvSpPr>
         <p:spPr>
           <a:xfrm>
-            <a:off x="504908" y="1472979"/>
+            <a:off x="2028908" y="1472980"/>
             <a:ext cx="8229600" cy="4525963"/>
           </a:xfrm>
         </p:spPr>
@@ -7342,7 +7353,7 @@
         </p:blipFill>
         <p:spPr>
           <a:xfrm>
-            <a:off x="3203848" y="3778002"/>
+            <a:off x="4727848" y="3778002"/>
             <a:ext cx="624448" cy="466254"/>
           </a:xfrm>
           <a:prstGeom prst="rect">
@@ -7366,7 +7377,7 @@
         </p:blipFill>
         <p:spPr>
           <a:xfrm>
-            <a:off x="1163324" y="4584644"/>
+            <a:off x="2687324" y="4584645"/>
             <a:ext cx="5226428" cy="979955"/>
           </a:xfrm>
           <a:prstGeom prst="rect">
@@ -7480,7 +7491,7 @@
         </p:nvSpPr>
         <p:spPr>
           <a:xfrm>
-            <a:off x="457200" y="2832625"/>
+            <a:off x="1981200" y="2832625"/>
             <a:ext cx="8229600" cy="3293538"/>
           </a:xfrm>
         </p:spPr>
@@ -7571,7 +7582,7 @@
         </p:blipFill>
         <p:spPr>
           <a:xfrm>
-            <a:off x="899592" y="1635154"/>
+            <a:off x="2423592" y="1635155"/>
             <a:ext cx="5226428" cy="979955"/>
           </a:xfrm>
           <a:prstGeom prst="rect">
@@ -7661,7 +7672,7 @@
         </p:nvSpPr>
         <p:spPr>
           <a:xfrm>
-            <a:off x="457200" y="1600200"/>
+            <a:off x="1981200" y="1600200"/>
             <a:ext cx="8229600" cy="5141168"/>
           </a:xfrm>
         </p:spPr>
@@ -7924,7 +7935,7 @@
         </p:blipFill>
         <p:spPr>
           <a:xfrm>
-            <a:off x="899592" y="4725144"/>
+            <a:off x="2423592" y="4725145"/>
             <a:ext cx="5226428" cy="979955"/>
           </a:xfrm>
           <a:prstGeom prst="rect">
@@ -8183,7 +8194,7 @@
         </p:nvSpPr>
         <p:spPr>
           <a:xfrm>
-            <a:off x="504908" y="1472979"/>
+            <a:off x="2028908" y="1472980"/>
             <a:ext cx="8229600" cy="4525963"/>
           </a:xfrm>
         </p:spPr>
@@ -8467,7 +8478,7 @@
         </p:blipFill>
         <p:spPr>
           <a:xfrm>
-            <a:off x="827584" y="5074328"/>
+            <a:off x="2351584" y="5074329"/>
             <a:ext cx="5226428" cy="979955"/>
           </a:xfrm>
           <a:prstGeom prst="rect">
@@ -9047,7 +9058,7 @@
         <p:spPr/>
         <p:txBody>
           <a:bodyPr>
-            <a:normAutofit fontScale="85000" lnSpcReduction="10000"/>
+            <a:normAutofit fontScale="92500" lnSpcReduction="20000"/>
           </a:bodyPr>
           <a:lstStyle/>
           <a:p>
@@ -9417,7 +9428,7 @@
           </p:nvPr>
         </p:nvGraphicFramePr>
         <p:xfrm>
-          <a:off x="251520" y="1628800"/>
+          <a:off x="1775520" y="1628800"/>
           <a:ext cx="3528392" cy="4932680"/>
         </p:xfrm>
         <a:graphic>
@@ -10487,7 +10498,7 @@
         </p:nvSpPr>
         <p:spPr>
           <a:xfrm>
-            <a:off x="251520" y="1268760"/>
+            <a:off x="1775520" y="1268760"/>
             <a:ext cx="2808312" cy="369332"/>
           </a:xfrm>
           <a:prstGeom prst="rect">
@@ -10531,7 +10542,7 @@
           <p:nvPr/>
         </p:nvGraphicFramePr>
         <p:xfrm>
-          <a:off x="3995936" y="1772816"/>
+          <a:off x="5519936" y="1772816"/>
           <a:ext cx="3672408" cy="2595880"/>
         </p:xfrm>
         <a:graphic>
@@ -10904,7 +10915,7 @@
           </p:nvPr>
         </p:nvGraphicFramePr>
         <p:xfrm>
-          <a:off x="251520" y="1628800"/>
+          <a:off x="1775520" y="1628800"/>
           <a:ext cx="2746650" cy="5100320"/>
         </p:xfrm>
         <a:graphic>
@@ -11974,7 +11985,7 @@
         </p:nvSpPr>
         <p:spPr>
           <a:xfrm>
-            <a:off x="251520" y="1268760"/>
+            <a:off x="1775520" y="1268760"/>
             <a:ext cx="2808312" cy="369332"/>
           </a:xfrm>
           <a:prstGeom prst="rect">
@@ -12023,7 +12034,7 @@
           <p:nvPr/>
         </p:nvGraphicFramePr>
         <p:xfrm>
-          <a:off x="4788024" y="1628800"/>
+          <a:off x="6312024" y="1628800"/>
           <a:ext cx="3898776" cy="4932680"/>
         </p:xfrm>
         <a:graphic>
@@ -13135,7 +13146,7 @@
         </p:nvSpPr>
         <p:spPr>
           <a:xfrm>
-            <a:off x="4932040" y="1232972"/>
+            <a:off x="6456040" y="1232972"/>
             <a:ext cx="4104456" cy="369332"/>
           </a:xfrm>
           <a:prstGeom prst="rect">
@@ -13194,7 +13205,7 @@
         </p:nvCxnSpPr>
         <p:spPr>
           <a:xfrm flipH="1">
-            <a:off x="3203848" y="4293096"/>
+            <a:off x="4727848" y="4293096"/>
             <a:ext cx="4248472" cy="0"/>
           </a:xfrm>
           <a:prstGeom prst="straightConnector1">
@@ -13233,7 +13244,7 @@
         </p:nvSpPr>
         <p:spPr>
           <a:xfrm>
-            <a:off x="7452320" y="2060848"/>
+            <a:off x="8976320" y="2060848"/>
             <a:ext cx="216024" cy="4464496"/>
           </a:xfrm>
           <a:prstGeom prst="leftBrace">
@@ -13306,7 +13317,7 @@
         </p:nvSpPr>
         <p:spPr>
           <a:xfrm>
-            <a:off x="3347864" y="3933056"/>
+            <a:off x="4871864" y="3933057"/>
             <a:ext cx="1224136" cy="646331"/>
           </a:xfrm>
           <a:prstGeom prst="rect">
@@ -13413,7 +13424,7 @@
           </p:nvPr>
         </p:nvGraphicFramePr>
         <p:xfrm>
-          <a:off x="251520" y="1628800"/>
+          <a:off x="1775521" y="1628800"/>
           <a:ext cx="3888433" cy="4876800"/>
         </p:xfrm>
         <a:graphic>
@@ -14853,7 +14864,7 @@
         </p:nvSpPr>
         <p:spPr>
           <a:xfrm>
-            <a:off x="251520" y="1268760"/>
+            <a:off x="1775520" y="1268760"/>
             <a:ext cx="2808312" cy="369332"/>
           </a:xfrm>
           <a:prstGeom prst="rect">
@@ -14908,7 +14919,7 @@
           </p:nvPr>
         </p:nvGraphicFramePr>
         <p:xfrm>
-          <a:off x="4788024" y="1645718"/>
+          <a:off x="6312024" y="1645718"/>
           <a:ext cx="3672408" cy="2743200"/>
         </p:xfrm>
         <a:graphic>
@@ -15437,7 +15448,7 @@
           </p:nvPr>
         </p:nvGraphicFramePr>
         <p:xfrm>
-          <a:off x="251520" y="1628800"/>
+          <a:off x="1775520" y="1628800"/>
           <a:ext cx="3600400" cy="5044440"/>
         </p:xfrm>
         <a:graphic>
@@ -16783,7 +16794,7 @@
         </p:nvSpPr>
         <p:spPr>
           <a:xfrm>
-            <a:off x="251520" y="1268760"/>
+            <a:off x="1775520" y="1268760"/>
             <a:ext cx="2808312" cy="369332"/>
           </a:xfrm>
           <a:prstGeom prst="rect">
@@ -16838,7 +16849,7 @@
           </p:nvPr>
         </p:nvGraphicFramePr>
         <p:xfrm>
-          <a:off x="4788024" y="1645718"/>
+          <a:off x="6312024" y="1645718"/>
           <a:ext cx="3672408" cy="3474720"/>
         </p:xfrm>
         <a:graphic>
@@ -18150,7 +18161,7 @@
         </p:blipFill>
         <p:spPr>
           <a:xfrm>
-            <a:off x="179512" y="1052736"/>
+            <a:off x="1703512" y="1052736"/>
             <a:ext cx="8479464" cy="5040560"/>
           </a:xfrm>
         </p:spPr>
@@ -18169,7 +18180,7 @@
         </p:nvSpPr>
         <p:spPr>
           <a:xfrm>
-            <a:off x="107504" y="6165304"/>
+            <a:off x="1631504" y="6165304"/>
             <a:ext cx="8856984" cy="369332"/>
           </a:xfrm>
           <a:prstGeom prst="rect">
@@ -18920,7 +18931,7 @@
         <p:spPr/>
         <p:txBody>
           <a:bodyPr>
-            <a:normAutofit lnSpcReduction="10000"/>
+            <a:normAutofit/>
           </a:bodyPr>
           <a:lstStyle/>
           <a:p>
@@ -19649,7 +19660,7 @@
         </p:nvSpPr>
         <p:spPr>
           <a:xfrm>
-            <a:off x="457200" y="1600200"/>
+            <a:off x="1981200" y="1600201"/>
             <a:ext cx="5410944" cy="4525963"/>
           </a:xfrm>
         </p:spPr>
@@ -19768,7 +19779,7 @@
         </p:blipFill>
         <p:spPr bwMode="auto">
           <a:xfrm>
-            <a:off x="5868144" y="1118964"/>
+            <a:off x="7392144" y="1118964"/>
             <a:ext cx="2670246" cy="5739036"/>
           </a:xfrm>
           <a:prstGeom prst="rect">
@@ -19802,7 +19813,7 @@
         </p:nvSpPr>
         <p:spPr>
           <a:xfrm>
-            <a:off x="0" y="5733256"/>
+            <a:off x="1524000" y="5733256"/>
             <a:ext cx="5719734" cy="936104"/>
           </a:xfrm>
           <a:prstGeom prst="rect">
@@ -20331,7 +20342,7 @@
         </p:nvSpPr>
         <p:spPr>
           <a:xfrm>
-            <a:off x="457200" y="1600200"/>
+            <a:off x="1981200" y="1600201"/>
             <a:ext cx="3682752" cy="4525963"/>
           </a:xfrm>
         </p:spPr>
@@ -20504,7 +20515,7 @@
           </p:nvPr>
         </p:nvGraphicFramePr>
         <p:xfrm>
-          <a:off x="4586726" y="188640"/>
+          <a:off x="6110727" y="188640"/>
           <a:ext cx="4449769" cy="5989320"/>
         </p:xfrm>
         <a:graphic>
@@ -22739,7 +22750,7 @@
         </p:nvSpPr>
         <p:spPr>
           <a:xfrm>
-            <a:off x="457200" y="1600200"/>
+            <a:off x="1981200" y="1600201"/>
             <a:ext cx="8686800" cy="4525963"/>
           </a:xfrm>
         </p:spPr>
@@ -23085,7 +23096,7 @@
         </p:blipFill>
         <p:spPr>
           <a:xfrm>
-            <a:off x="179512" y="1052736"/>
+            <a:off x="1703512" y="1052736"/>
             <a:ext cx="5832648" cy="3467178"/>
           </a:xfrm>
         </p:spPr>
@@ -23104,7 +23115,7 @@
         </p:nvSpPr>
         <p:spPr>
           <a:xfrm>
-            <a:off x="107504" y="4538860"/>
+            <a:off x="1631504" y="4538860"/>
             <a:ext cx="8856984" cy="1231106"/>
           </a:xfrm>
           <a:prstGeom prst="rect">
@@ -23294,13 +23305,13 @@
         <p:spPr/>
         <p:txBody>
           <a:bodyPr>
-            <a:normAutofit lnSpcReduction="10000"/>
+            <a:normAutofit/>
           </a:bodyPr>
           <a:lstStyle/>
           <a:p>
             <a:r>
               <a:rPr lang="en-US" dirty="0"/>
-              <a:t>Lecture on “designed big data”</a:t>
+              <a:t>Lecture on “data integration”</a:t>
             </a:r>
           </a:p>
           <a:p>
@@ -23333,7 +23344,15 @@
             <a:pPr lvl="1"/>
             <a:r>
               <a:rPr lang="en-US" dirty="0"/>
-              <a:t>Send around by December 9, 17:00</a:t>
+              <a:t>Send around by </a:t>
+            </a:r>
+            <a:r>
+              <a:rPr lang="en-US"/>
+              <a:t>December 8, </a:t>
+            </a:r>
+            <a:r>
+              <a:rPr lang="en-US" dirty="0"/>
+              <a:t>17:00</a:t>
             </a:r>
           </a:p>
           <a:p>
@@ -23457,7 +23476,7 @@
         <p:spPr/>
         <p:txBody>
           <a:bodyPr>
-            <a:normAutofit fontScale="55000" lnSpcReduction="20000"/>
+            <a:normAutofit fontScale="70000" lnSpcReduction="20000"/>
           </a:bodyPr>
           <a:lstStyle/>
           <a:p>
@@ -24083,7 +24102,7 @@
         </p:blipFill>
         <p:spPr>
           <a:xfrm>
-            <a:off x="179512" y="1052736"/>
+            <a:off x="1703512" y="1052736"/>
             <a:ext cx="5832648" cy="3467178"/>
           </a:xfrm>
         </p:spPr>
@@ -24102,7 +24121,7 @@
         </p:nvSpPr>
         <p:spPr>
           <a:xfrm>
-            <a:off x="107504" y="4538860"/>
+            <a:off x="1631504" y="4538861"/>
             <a:ext cx="8856984" cy="1846659"/>
           </a:xfrm>
           <a:prstGeom prst="rect">
@@ -24384,7 +24403,7 @@
         </p:blipFill>
         <p:spPr>
           <a:xfrm>
-            <a:off x="179512" y="1052736"/>
+            <a:off x="1703512" y="1052736"/>
             <a:ext cx="5832648" cy="3467178"/>
           </a:xfrm>
         </p:spPr>
@@ -24403,7 +24422,7 @@
         </p:nvSpPr>
         <p:spPr>
           <a:xfrm>
-            <a:off x="107504" y="4538860"/>
+            <a:off x="1631504" y="4538861"/>
             <a:ext cx="8856984" cy="2585323"/>
           </a:xfrm>
           <a:prstGeom prst="rect">
@@ -24958,7 +24977,7 @@
         </p:blipFill>
         <p:spPr bwMode="auto">
           <a:xfrm>
-            <a:off x="398910" y="898602"/>
+            <a:off x="1922910" y="898603"/>
             <a:ext cx="7914132" cy="5728543"/>
           </a:xfrm>
           <a:prstGeom prst="rect">
@@ -24971,14 +24990,14 @@
           <a:effectLst/>
           <a:extLst>
             <a:ext uri="{909E8E84-426E-40dd-AFC4-6F175D3DCCD1}">
-              <a14:hiddenFill xmlns="" xmlns:a14="http://schemas.microsoft.com/office/drawing/2010/main">
+              <a14:hiddenFill xmlns:a14="http://schemas.microsoft.com/office/drawing/2010/main" xmlns="">
                 <a:solidFill>
                   <a:schemeClr val="accent1"/>
                 </a:solidFill>
               </a14:hiddenFill>
             </a:ext>
             <a:ext uri="{91240B29-F687-4f45-9708-019B960494DF}">
-              <a14:hiddenLine xmlns="" xmlns:a14="http://schemas.microsoft.com/office/drawing/2010/main" w="9525">
+              <a14:hiddenLine xmlns:a14="http://schemas.microsoft.com/office/drawing/2010/main" xmlns="" w="9525">
                 <a:solidFill>
                   <a:schemeClr val="tx1"/>
                 </a:solidFill>
@@ -24988,7 +25007,7 @@
               </a14:hiddenLine>
             </a:ext>
             <a:ext uri="{AF507438-7753-43e0-B8FC-AC1667EBCBE1}">
-              <a14:hiddenEffects xmlns="" xmlns:a14="http://schemas.microsoft.com/office/drawing/2010/main">
+              <a14:hiddenEffects xmlns:a14="http://schemas.microsoft.com/office/drawing/2010/main" xmlns="">
                 <a:effectLst>
                   <a:outerShdw dist="35921" dir="2700000" algn="ctr" rotWithShape="0">
                     <a:schemeClr val="bg2"/>
@@ -25011,7 +25030,7 @@
         </p:nvSpPr>
         <p:spPr>
           <a:xfrm>
-            <a:off x="457200" y="152400"/>
+            <a:off x="1981200" y="152401"/>
             <a:ext cx="8229600" cy="696239"/>
           </a:xfrm>
         </p:spPr>
@@ -25058,7 +25077,7 @@
         </p:nvSpPr>
         <p:spPr>
           <a:xfrm>
-            <a:off x="4767487" y="6424739"/>
+            <a:off x="6291487" y="6424739"/>
             <a:ext cx="3550172" cy="404812"/>
           </a:xfrm>
           <a:prstGeom prst="rect">
@@ -25071,90 +25090,21 @@
           </a:bodyPr>
           <a:lstStyle/>
           <a:p>
-            <a:pPr marL="274320" marR="0" lvl="0" indent="-274320" algn="r" defTabSz="914400" rtl="0" eaLnBrk="1" fontAlgn="auto" latinLnBrk="0" hangingPunct="1">
-              <a:lnSpc>
-                <a:spcPct val="100000"/>
-              </a:lnSpc>
+            <a:pPr marL="274320" indent="-274320" algn="r">
               <a:spcBef>
                 <a:spcPct val="0"/>
               </a:spcBef>
-              <a:spcAft>
-                <a:spcPts val="0"/>
-              </a:spcAft>
               <a:buClr>
                 <a:srgbClr val="FCA914"/>
               </a:buClr>
               <a:buSzPct val="76000"/>
-              <a:buFont typeface="Webdings" pitchFamily="18" charset="2"/>
-              <a:buNone/>
-              <a:tabLst/>
               <a:defRPr/>
             </a:pPr>
             <a:r>
-              <a:rPr kumimoji="0" lang="en-US" sz="1800" b="0" i="0" u="none" strike="noStrike" kern="1200" cap="none" spc="0" normalizeH="0" baseline="0" noProof="0" dirty="0">
-                <a:ln>
-                  <a:noFill/>
-                </a:ln>
-                <a:solidFill>
-                  <a:schemeClr val="tx1"/>
-                </a:solidFill>
-                <a:effectLst/>
-                <a:uLnTx/>
-                <a:uFillTx/>
-                <a:latin typeface="+mn-lt"/>
-                <a:ea typeface="+mn-ea"/>
-                <a:cs typeface="+mn-cs"/>
-              </a:rPr>
-              <a:t>(Groves et al. 2009,</a:t>
-            </a:r>
-            <a:r>
-              <a:rPr kumimoji="0" lang="en-US" sz="1800" b="0" i="0" u="none" strike="noStrike" kern="1200" cap="none" spc="0" normalizeH="0" noProof="0" dirty="0">
-                <a:ln>
-                  <a:noFill/>
-                </a:ln>
-                <a:solidFill>
-                  <a:schemeClr val="tx1"/>
-                </a:solidFill>
-                <a:effectLst/>
-                <a:uLnTx/>
-                <a:uFillTx/>
-                <a:latin typeface="+mn-lt"/>
-                <a:ea typeface="+mn-ea"/>
-                <a:cs typeface="+mn-cs"/>
-              </a:rPr>
-              <a:t> p.48</a:t>
-            </a:r>
-            <a:r>
-              <a:rPr kumimoji="0" lang="en-US" sz="1800" b="0" i="0" u="none" strike="noStrike" kern="1200" cap="none" spc="0" normalizeH="0" baseline="0" noProof="0" dirty="0">
-                <a:ln>
-                  <a:noFill/>
-                </a:ln>
-                <a:solidFill>
-                  <a:schemeClr val="tx1"/>
-                </a:solidFill>
-                <a:effectLst/>
-                <a:uLnTx/>
-                <a:uFillTx/>
-                <a:latin typeface="+mn-lt"/>
-                <a:ea typeface="+mn-ea"/>
-                <a:cs typeface="+mn-cs"/>
-              </a:rPr>
-              <a:t>)</a:t>
-            </a:r>
-            <a:endParaRPr kumimoji="0" lang="de-DE" sz="1800" b="0" i="0" u="none" strike="noStrike" kern="1200" cap="none" spc="0" normalizeH="0" baseline="0" noProof="0" dirty="0">
-              <a:ln>
-                <a:noFill/>
-              </a:ln>
-              <a:solidFill>
-                <a:schemeClr val="tx1"/>
-              </a:solidFill>
-              <a:effectLst/>
-              <a:uLnTx/>
-              <a:uFillTx/>
-              <a:latin typeface="+mn-lt"/>
-              <a:ea typeface="+mn-ea"/>
-              <a:cs typeface="+mn-cs"/>
-            </a:endParaRPr>
+              <a:rPr lang="en-US" dirty="0"/>
+              <a:t>(Groves et al. 2009, p.48)</a:t>
+            </a:r>
+            <a:endParaRPr lang="de-DE" dirty="0"/>
           </a:p>
         </p:txBody>
       </p:sp>
@@ -25166,7 +25116,7 @@
         </p:nvSpPr>
         <p:spPr>
           <a:xfrm>
-            <a:off x="4211960" y="1196752"/>
+            <a:off x="5735960" y="1196752"/>
             <a:ext cx="4824536" cy="5112568"/>
           </a:xfrm>
           <a:prstGeom prst="ellipse">

</xml_diff>